<commit_message>
little updates and beautification of 2018
</commit_message>
<xml_diff>
--- a/MoLOverviewPoster2018.pptx
+++ b/MoLOverviewPoster2018.pptx
@@ -193,7 +193,7 @@
           <a:p>
             <a:fld id="{B179243D-0E3E-4D4F-90E9-F9F1DBB34143}" type="datetimeFigureOut">
               <a:rPr lang="en-US" smtClean="0"/>
-              <a:t>5/29/18</a:t>
+              <a:t>5/30/18</a:t>
             </a:fld>
             <a:endParaRPr lang="en-US"/>
           </a:p>
@@ -2319,7 +2319,7 @@
           </a:ln>
           <a:extLst>
             <a:ext uri="{C572A759-6A51-4108-AA02-DFA0A04FC94B}">
-              <ma14:wrappingTextBoxFlag xmlns:ma14="http://schemas.microsoft.com/office/mac/drawingml/2011/main" xmlns="" val="1"/>
+              <ma14:wrappingTextBoxFlag xmlns="" xmlns:ma14="http://schemas.microsoft.com/office/mac/drawingml/2011/main" val="1"/>
             </a:ext>
           </a:extLst>
         </p:spPr>
@@ -2362,7 +2362,7 @@
           </a:ln>
           <a:extLst>
             <a:ext uri="{C572A759-6A51-4108-AA02-DFA0A04FC94B}">
-              <ma14:wrappingTextBoxFlag xmlns:ma14="http://schemas.microsoft.com/office/mac/drawingml/2011/main" xmlns="" val="1"/>
+              <ma14:wrappingTextBoxFlag xmlns="" xmlns:ma14="http://schemas.microsoft.com/office/mac/drawingml/2011/main" val="1"/>
             </a:ext>
           </a:extLst>
         </p:spPr>
@@ -2884,7 +2884,7 @@
                 <a:ea typeface="Calibri"/>
                 <a:cs typeface="Calibri"/>
               </a:rPr>
-              <a:t>version: June 2018: </a:t>
+              <a:t>version: 30 May 2018: </a:t>
             </a:r>
             <a:br>
               <a:rPr lang="en-US" sz="2800" dirty="0">
@@ -2941,10 +2941,10 @@
         </p:nvGrpSpPr>
         <p:grpSpPr>
           <a:xfrm>
-            <a:off x="308802" y="364829"/>
-            <a:ext cx="42185534" cy="29603656"/>
-            <a:chOff x="1132722" y="281816"/>
-            <a:chExt cx="42185535" cy="29603655"/>
+            <a:off x="308802" y="364830"/>
+            <a:ext cx="42330068" cy="29603654"/>
+            <a:chOff x="1132722" y="281817"/>
+            <a:chExt cx="42330069" cy="29603653"/>
           </a:xfrm>
         </p:grpSpPr>
         <p:sp>
@@ -2955,8 +2955,8 @@
           </p:nvSpPr>
           <p:spPr>
             <a:xfrm rot="5400000">
-              <a:off x="10135483" y="-3537804"/>
-              <a:ext cx="13023273" cy="20662514"/>
+              <a:off x="10197787" y="-3600107"/>
+              <a:ext cx="13023273" cy="20787122"/>
             </a:xfrm>
             <a:prstGeom prst="roundRect">
               <a:avLst>
@@ -3012,7 +3012,7 @@
           <p:spPr>
             <a:xfrm>
               <a:off x="1132722" y="10065286"/>
-              <a:ext cx="26520783" cy="19538068"/>
+              <a:ext cx="26274649" cy="19538068"/>
             </a:xfrm>
             <a:prstGeom prst="corner">
               <a:avLst>
@@ -3071,8 +3071,8 @@
           </p:nvSpPr>
           <p:spPr>
             <a:xfrm rot="10800000">
-              <a:off x="17223219" y="3528887"/>
-              <a:ext cx="21556936" cy="12265788"/>
+              <a:off x="18959059" y="3446439"/>
+              <a:ext cx="19821093" cy="12348236"/>
             </a:xfrm>
             <a:prstGeom prst="corner">
               <a:avLst>
@@ -3130,8 +3130,8 @@
           </p:nvSpPr>
           <p:spPr>
             <a:xfrm>
-              <a:off x="1999942" y="6831931"/>
-              <a:ext cx="24636538" cy="10361838"/>
+              <a:off x="1999942" y="6733921"/>
+              <a:ext cx="24773948" cy="10459848"/>
             </a:xfrm>
             <a:prstGeom prst="roundRect">
               <a:avLst>
@@ -3186,8 +3186,8 @@
           </p:nvSpPr>
           <p:spPr>
             <a:xfrm rot="16200000">
-              <a:off x="25848184" y="12415399"/>
-              <a:ext cx="11742805" cy="23197340"/>
+              <a:off x="25793640" y="12216319"/>
+              <a:ext cx="11742805" cy="23595497"/>
             </a:xfrm>
             <a:prstGeom prst="corner">
               <a:avLst>
@@ -3751,7 +3751,7 @@
           </a:ln>
           <a:extLst>
             <a:ext uri="{C572A759-6A51-4108-AA02-DFA0A04FC94B}">
-              <ma14:wrappingTextBoxFlag xmlns:ma14="http://schemas.microsoft.com/office/mac/drawingml/2011/main" xmlns="" val="1"/>
+              <ma14:wrappingTextBoxFlag xmlns="" xmlns:ma14="http://schemas.microsoft.com/office/mac/drawingml/2011/main" val="1"/>
             </a:ext>
           </a:extLst>
         </p:spPr>
@@ -3803,7 +3803,7 @@
           </a:ln>
           <a:extLst>
             <a:ext uri="{C572A759-6A51-4108-AA02-DFA0A04FC94B}">
-              <ma14:wrappingTextBoxFlag xmlns:ma14="http://schemas.microsoft.com/office/mac/drawingml/2011/main" xmlns="" val="1"/>
+              <ma14:wrappingTextBoxFlag xmlns="" xmlns:ma14="http://schemas.microsoft.com/office/mac/drawingml/2011/main" val="1"/>
             </a:ext>
           </a:extLst>
         </p:spPr>
@@ -3836,7 +3836,7 @@
         </p:nvSpPr>
         <p:spPr>
           <a:xfrm>
-            <a:off x="38511884" y="2095732"/>
+            <a:off x="38511884" y="2234601"/>
             <a:ext cx="3866684" cy="2828082"/>
           </a:xfrm>
           <a:prstGeom prst="rect">
@@ -3847,7 +3847,7 @@
           </a:ln>
           <a:extLst>
             <a:ext uri="{C572A759-6A51-4108-AA02-DFA0A04FC94B}">
-              <ma14:wrappingTextBoxFlag xmlns:ma14="http://schemas.microsoft.com/office/mac/drawingml/2011/main" xmlns="" val="1"/>
+              <ma14:wrappingTextBoxFlag xmlns="" xmlns:ma14="http://schemas.microsoft.com/office/mac/drawingml/2011/main" val="1"/>
             </a:ext>
           </a:extLst>
         </p:spPr>
@@ -3907,7 +3907,7 @@
           </a:ln>
           <a:extLst>
             <a:ext uri="{C572A759-6A51-4108-AA02-DFA0A04FC94B}">
-              <ma14:wrappingTextBoxFlag xmlns:ma14="http://schemas.microsoft.com/office/mac/drawingml/2011/main" xmlns="" val="1"/>
+              <ma14:wrappingTextBoxFlag xmlns="" xmlns:ma14="http://schemas.microsoft.com/office/mac/drawingml/2011/main" val="1"/>
             </a:ext>
           </a:extLst>
         </p:spPr>
@@ -4224,7 +4224,7 @@
               </a:ln>
               <a:extLst>
                 <a:ext uri="{C572A759-6A51-4108-AA02-DFA0A04FC94B}">
-                  <ma14:wrappingTextBoxFlag xmlns:ma14="http://schemas.microsoft.com/office/mac/drawingml/2011/main" xmlns="" val="1"/>
+                  <ma14:wrappingTextBoxFlag xmlns="" xmlns:ma14="http://schemas.microsoft.com/office/mac/drawingml/2011/main" val="1"/>
                 </a:ext>
               </a:extLst>
             </p:spPr>
@@ -4267,8 +4267,8 @@
         </p:nvSpPr>
         <p:spPr>
           <a:xfrm flipH="1" flipV="1">
-            <a:off x="3914249" y="21659865"/>
-            <a:ext cx="1359862" cy="1205677"/>
+            <a:off x="2719912" y="21752093"/>
+            <a:ext cx="0" cy="1233809"/>
           </a:xfrm>
           <a:prstGeom prst="line">
             <a:avLst/>
@@ -4309,8 +4309,8 @@
         </p:nvSpPr>
         <p:spPr>
           <a:xfrm flipH="1" flipV="1">
-            <a:off x="4820138" y="20172044"/>
-            <a:ext cx="1098897" cy="384775"/>
+            <a:off x="4834357" y="20100807"/>
+            <a:ext cx="888898" cy="276340"/>
           </a:xfrm>
           <a:prstGeom prst="line">
             <a:avLst/>
@@ -4362,7 +4362,7 @@
           </a:ln>
           <a:extLst>
             <a:ext uri="{C572A759-6A51-4108-AA02-DFA0A04FC94B}">
-              <ma14:wrappingTextBoxFlag xmlns:ma14="http://schemas.microsoft.com/office/mac/drawingml/2011/main" xmlns="" val="1"/>
+              <ma14:wrappingTextBoxFlag xmlns="" xmlns:ma14="http://schemas.microsoft.com/office/mac/drawingml/2011/main" val="1"/>
             </a:ext>
           </a:extLst>
         </p:spPr>
@@ -4406,7 +4406,7 @@
           </a:ln>
           <a:extLst>
             <a:ext uri="{C572A759-6A51-4108-AA02-DFA0A04FC94B}">
-              <ma14:wrappingTextBoxFlag xmlns:ma14="http://schemas.microsoft.com/office/mac/drawingml/2011/main" xmlns="" val="1"/>
+              <ma14:wrappingTextBoxFlag xmlns="" xmlns:ma14="http://schemas.microsoft.com/office/mac/drawingml/2011/main" val="1"/>
             </a:ext>
           </a:extLst>
         </p:spPr>
@@ -4562,7 +4562,7 @@
             </a:ln>
             <a:extLst>
               <a:ext uri="{C572A759-6A51-4108-AA02-DFA0A04FC94B}">
-                <ma14:wrappingTextBoxFlag xmlns:ma14="http://schemas.microsoft.com/office/mac/drawingml/2011/main" xmlns="" val="1"/>
+                <ma14:wrappingTextBoxFlag xmlns="" xmlns:ma14="http://schemas.microsoft.com/office/mac/drawingml/2011/main" val="1"/>
               </a:ext>
             </a:extLst>
           </p:spPr>
@@ -4615,7 +4615,7 @@
           </a:ln>
           <a:extLst>
             <a:ext uri="{C572A759-6A51-4108-AA02-DFA0A04FC94B}">
-              <ma14:wrappingTextBoxFlag xmlns:ma14="http://schemas.microsoft.com/office/mac/drawingml/2011/main" xmlns="" val="1"/>
+              <ma14:wrappingTextBoxFlag xmlns="" xmlns:ma14="http://schemas.microsoft.com/office/mac/drawingml/2011/main" val="1"/>
             </a:ext>
           </a:extLst>
         </p:spPr>
@@ -4734,14 +4734,14 @@
         <p:nvSpPr>
           <p:cNvPr id="197" name="Shape 61"/>
           <p:cNvSpPr>
-            <a:spLocks noChangeAspect="1"/>
+            <a:spLocks/>
           </p:cNvSpPr>
           <p:nvPr/>
         </p:nvSpPr>
         <p:spPr>
           <a:xfrm>
-            <a:off x="38669130" y="22241187"/>
-            <a:ext cx="3740404" cy="3006525"/>
+            <a:off x="38596611" y="25148194"/>
+            <a:ext cx="3240000" cy="3240000"/>
           </a:xfrm>
           <a:prstGeom prst="ellipse">
             <a:avLst/>
@@ -4829,9 +4829,9 @@
         <p:grpSpPr>
           <a:xfrm>
             <a:off x="26896042" y="4354032"/>
-            <a:ext cx="15215807" cy="11825246"/>
+            <a:ext cx="15283151" cy="11294007"/>
             <a:chOff x="26896042" y="4354032"/>
-            <a:chExt cx="15215807" cy="11825246"/>
+            <a:chExt cx="15283151" cy="11294007"/>
           </a:xfrm>
         </p:grpSpPr>
         <p:sp>
@@ -4842,8 +4842,8 @@
           </p:nvSpPr>
           <p:spPr>
             <a:xfrm>
-              <a:off x="38835848" y="13429163"/>
-              <a:ext cx="3276000" cy="2750115"/>
+              <a:off x="38350098" y="13212804"/>
+              <a:ext cx="3829095" cy="2430000"/>
             </a:xfrm>
             <a:prstGeom prst="roundRect">
               <a:avLst>
@@ -5675,7 +5675,7 @@
         </p:nvSpPr>
         <p:spPr>
           <a:xfrm>
-            <a:off x="17187392" y="3817287"/>
+            <a:off x="18562021" y="3817287"/>
             <a:ext cx="3276000" cy="2430000"/>
           </a:xfrm>
           <a:prstGeom prst="roundRect">
@@ -5772,7 +5772,7 @@
         </p:nvSpPr>
         <p:spPr>
           <a:xfrm>
-            <a:off x="13021784" y="432692"/>
+            <a:off x="14295290" y="577113"/>
             <a:ext cx="3235119" cy="3002856"/>
           </a:xfrm>
           <a:prstGeom prst="ellipse">
@@ -5852,7 +5852,7 @@
         </p:nvSpPr>
         <p:spPr>
           <a:xfrm>
-            <a:off x="21853124" y="3790383"/>
+            <a:off x="22371311" y="3790383"/>
             <a:ext cx="3276000" cy="2430000"/>
           </a:xfrm>
           <a:prstGeom prst="roundRect">
@@ -5943,7 +5943,7 @@
         </p:nvSpPr>
         <p:spPr>
           <a:xfrm>
-            <a:off x="5972140" y="7283625"/>
+            <a:off x="5972140" y="7164561"/>
             <a:ext cx="3465687" cy="2430000"/>
           </a:xfrm>
           <a:prstGeom prst="roundRect">
@@ -6045,7 +6045,7 @@
         </p:nvSpPr>
         <p:spPr>
           <a:xfrm>
-            <a:off x="11250241" y="4011425"/>
+            <a:off x="10177688" y="4011425"/>
             <a:ext cx="3276000" cy="2430000"/>
           </a:xfrm>
           <a:prstGeom prst="roundRect">
@@ -6130,7 +6130,7 @@
         </p:nvSpPr>
         <p:spPr>
           <a:xfrm>
-            <a:off x="17173575" y="7125010"/>
+            <a:off x="18548204" y="7164561"/>
             <a:ext cx="3276000" cy="2430000"/>
           </a:xfrm>
           <a:prstGeom prst="roundRect">
@@ -6221,7 +6221,7 @@
         </p:nvSpPr>
         <p:spPr>
           <a:xfrm>
-            <a:off x="10671603" y="15636939"/>
+            <a:off x="11297695" y="14045334"/>
             <a:ext cx="3276000" cy="2430000"/>
           </a:xfrm>
           <a:prstGeom prst="roundRect">
@@ -6310,8 +6310,8 @@
         </p:nvSpPr>
         <p:spPr>
           <a:xfrm>
-            <a:off x="21857429" y="7138534"/>
-            <a:ext cx="3435443" cy="2430000"/>
+            <a:off x="22375616" y="7164561"/>
+            <a:ext cx="3276000" cy="2430000"/>
           </a:xfrm>
           <a:prstGeom prst="roundRect">
             <a:avLst>
@@ -6473,8 +6473,8 @@
         </p:nvSpPr>
         <p:spPr>
           <a:xfrm>
-            <a:off x="38665632" y="25343333"/>
-            <a:ext cx="3635322" cy="3160520"/>
+            <a:off x="38557348" y="21786852"/>
+            <a:ext cx="3240000" cy="3129368"/>
           </a:xfrm>
           <a:prstGeom prst="ellipse">
             <a:avLst/>
@@ -6601,7 +6601,7 @@
         </p:nvSpPr>
         <p:spPr>
           <a:xfrm>
-            <a:off x="23272979" y="21560736"/>
+            <a:off x="23014565" y="21560736"/>
             <a:ext cx="3276000" cy="2430000"/>
           </a:xfrm>
           <a:prstGeom prst="roundRect">
@@ -6695,7 +6695,7 @@
         </p:nvSpPr>
         <p:spPr>
           <a:xfrm>
-            <a:off x="23258713" y="24383947"/>
+            <a:off x="23000299" y="24383947"/>
             <a:ext cx="3276000" cy="2430000"/>
           </a:xfrm>
           <a:prstGeom prst="roundRect">
@@ -6762,7 +6762,7 @@
         </p:nvSpPr>
         <p:spPr>
           <a:xfrm>
-            <a:off x="19612107" y="24324004"/>
+            <a:off x="19353693" y="24324004"/>
             <a:ext cx="3276000" cy="2430000"/>
           </a:xfrm>
           <a:prstGeom prst="roundRect">
@@ -6855,8 +6855,8 @@
         </p:nvSpPr>
         <p:spPr>
           <a:xfrm>
-            <a:off x="34577300" y="27139718"/>
-            <a:ext cx="3632245" cy="2430000"/>
+            <a:off x="34295825" y="27173194"/>
+            <a:ext cx="3420000" cy="2430000"/>
           </a:xfrm>
           <a:prstGeom prst="roundRect">
             <a:avLst>
@@ -6942,8 +6942,8 @@
         </p:nvSpPr>
         <p:spPr>
           <a:xfrm>
-            <a:off x="30582925" y="21656390"/>
-            <a:ext cx="2962766" cy="2181491"/>
+            <a:off x="30522548" y="21656389"/>
+            <a:ext cx="3276000" cy="2232000"/>
           </a:xfrm>
           <a:prstGeom prst="roundRect">
             <a:avLst>
@@ -7053,7 +7053,7 @@
         </p:nvSpPr>
         <p:spPr>
           <a:xfrm>
-            <a:off x="30787545" y="24469241"/>
+            <a:off x="30681909" y="24410745"/>
             <a:ext cx="3276000" cy="2430000"/>
           </a:xfrm>
           <a:prstGeom prst="roundRect">
@@ -7151,8 +7151,8 @@
         </p:nvGrpSpPr>
         <p:grpSpPr>
           <a:xfrm>
-            <a:off x="34636114" y="21535724"/>
-            <a:ext cx="3632245" cy="2579668"/>
+            <a:off x="34354639" y="21535724"/>
+            <a:ext cx="3420000" cy="2579668"/>
             <a:chOff x="34965653" y="21815433"/>
             <a:chExt cx="3632244" cy="2579668"/>
           </a:xfrm>
@@ -7251,7 +7251,7 @@
             </a:ln>
             <a:extLst>
               <a:ext uri="{C572A759-6A51-4108-AA02-DFA0A04FC94B}">
-                <ma14:wrappingTextBoxFlag xmlns:ma14="http://schemas.microsoft.com/office/mac/drawingml/2011/main" xmlns="" val="1"/>
+                <ma14:wrappingTextBoxFlag xmlns="" xmlns:ma14="http://schemas.microsoft.com/office/mac/drawingml/2011/main" val="1"/>
               </a:ext>
             </a:extLst>
           </p:spPr>
@@ -7285,10 +7285,10 @@
         </p:nvGrpSpPr>
         <p:grpSpPr>
           <a:xfrm>
-            <a:off x="34577301" y="24045267"/>
-            <a:ext cx="3632245" cy="2800283"/>
-            <a:chOff x="43107253" y="30674714"/>
-            <a:chExt cx="3632245" cy="2800283"/>
+            <a:off x="34295826" y="24097082"/>
+            <a:ext cx="3420000" cy="2748468"/>
+            <a:chOff x="43107253" y="30726529"/>
+            <a:chExt cx="3632245" cy="2748468"/>
           </a:xfrm>
         </p:grpSpPr>
         <p:sp>
@@ -7462,7 +7462,7 @@
           </p:nvSpPr>
           <p:spPr>
             <a:xfrm>
-              <a:off x="43837318" y="30674714"/>
+              <a:off x="44088010" y="30726529"/>
               <a:ext cx="1497972" cy="1204325"/>
             </a:xfrm>
             <a:prstGeom prst="rect">
@@ -7473,7 +7473,7 @@
             </a:ln>
             <a:extLst>
               <a:ext uri="{C572A759-6A51-4108-AA02-DFA0A04FC94B}">
-                <ma14:wrappingTextBoxFlag xmlns:ma14="http://schemas.microsoft.com/office/mac/drawingml/2011/main" xmlns="" val="1"/>
+                <ma14:wrappingTextBoxFlag xmlns="" xmlns:ma14="http://schemas.microsoft.com/office/mac/drawingml/2011/main" val="1"/>
               </a:ext>
             </a:extLst>
           </p:spPr>
@@ -7515,7 +7515,7 @@
         </p:nvSpPr>
         <p:spPr>
           <a:xfrm>
-            <a:off x="19603673" y="21610774"/>
+            <a:off x="19345259" y="21610774"/>
             <a:ext cx="3276000" cy="2430000"/>
           </a:xfrm>
           <a:prstGeom prst="roundRect">
@@ -7668,8 +7668,8 @@
         </p:nvSpPr>
         <p:spPr>
           <a:xfrm>
-            <a:off x="6064711" y="19681144"/>
-            <a:ext cx="3373117" cy="2429822"/>
+            <a:off x="5883991" y="19700486"/>
+            <a:ext cx="3276000" cy="2429822"/>
           </a:xfrm>
           <a:prstGeom prst="roundRect">
             <a:avLst>
@@ -7817,7 +7817,7 @@
         </p:nvSpPr>
         <p:spPr>
           <a:xfrm>
-            <a:off x="8314640" y="26658072"/>
+            <a:off x="7908108" y="26653874"/>
             <a:ext cx="3204000" cy="2376000"/>
           </a:xfrm>
           <a:prstGeom prst="roundRect">
@@ -7825,35 +7825,22 @@
               <a:gd name="adj" fmla="val 16667"/>
             </a:avLst>
           </a:prstGeom>
-          <a:gradFill flip="none" rotWithShape="1">
-            <a:gsLst>
-              <a:gs pos="0">
-                <a:srgbClr val="FFD1BB"/>
-              </a:gs>
-              <a:gs pos="35000">
-                <a:srgbClr val="FFDECF"/>
-              </a:gs>
-              <a:gs pos="100000">
-                <a:srgbClr val="FFF2ED"/>
-              </a:gs>
-            </a:gsLst>
-            <a:lin ang="16200000" scaled="0"/>
-          </a:gradFill>
-          <a:ln w="9525" cap="flat">
-            <a:solidFill>
-              <a:srgbClr val="F69240"/>
-            </a:solidFill>
-            <a:prstDash val="solid"/>
-            <a:bevel/>
-          </a:ln>
-          <a:effectLst>
-            <a:outerShdw blurRad="38100" dist="20000" dir="5400000" rotWithShape="0">
-              <a:srgbClr val="000000">
-                <a:alpha val="38000"/>
-              </a:srgbClr>
-            </a:outerShdw>
-          </a:effectLst>
+          <a:ln/>
         </p:spPr>
+        <p:style>
+          <a:lnRef idx="1">
+            <a:schemeClr val="accent1"/>
+          </a:lnRef>
+          <a:fillRef idx="3">
+            <a:schemeClr val="accent1"/>
+          </a:fillRef>
+          <a:effectRef idx="2">
+            <a:schemeClr val="accent1"/>
+          </a:effectRef>
+          <a:fontRef idx="minor">
+            <a:schemeClr val="lt1"/>
+          </a:fontRef>
+        </p:style>
         <p:txBody>
           <a:bodyPr wrap="square" lIns="0" tIns="0" rIns="0" bIns="0" numCol="1" anchor="ctr">
             <a:noAutofit/>
@@ -7863,22 +7850,34 @@
             <a:pPr algn="ctr"/>
             <a:r>
               <a:rPr lang="en-US" sz="2900" dirty="0">
-                <a:latin typeface="Calibri"/>
-                <a:cs typeface="Calibri"/>
+                <a:solidFill>
+                  <a:schemeClr val="lt1"/>
+                </a:solidFill>
+                <a:latin typeface="+mn-lt"/>
+                <a:ea typeface="+mn-ea"/>
+                <a:cs typeface="+mn-cs"/>
               </a:rPr>
               <a:t>[</a:t>
             </a:r>
             <a:r>
               <a:rPr lang="en-US" sz="2900" dirty="0" err="1">
-                <a:latin typeface="Calibri"/>
-                <a:cs typeface="Calibri"/>
+                <a:solidFill>
+                  <a:schemeClr val="lt1"/>
+                </a:solidFill>
+                <a:latin typeface="+mn-lt"/>
+                <a:ea typeface="+mn-ea"/>
+                <a:cs typeface="+mn-cs"/>
               </a:rPr>
               <a:t>MoL</a:t>
             </a:r>
             <a:r>
               <a:rPr lang="en-US" sz="2900" dirty="0">
-                <a:latin typeface="Calibri"/>
-                <a:cs typeface="Calibri"/>
+                <a:solidFill>
+                  <a:schemeClr val="lt1"/>
+                </a:solidFill>
+                <a:latin typeface="+mn-lt"/>
+                <a:ea typeface="+mn-ea"/>
+                <a:cs typeface="+mn-cs"/>
               </a:rPr>
               <a:t>-FNWI] Category Theory (van den Berg)</a:t>
             </a:r>
@@ -7893,7 +7892,7 @@
         </p:nvSpPr>
         <p:spPr>
           <a:xfrm>
-            <a:off x="11933578" y="26622676"/>
+            <a:off x="11552039" y="26653948"/>
             <a:ext cx="3203234" cy="2375852"/>
           </a:xfrm>
           <a:prstGeom prst="roundRect">
@@ -8044,7 +8043,7 @@
         </p:nvSpPr>
         <p:spPr>
           <a:xfrm>
-            <a:off x="4738875" y="23304936"/>
+            <a:off x="632135" y="23177217"/>
             <a:ext cx="3276000" cy="2429822"/>
           </a:xfrm>
           <a:prstGeom prst="roundRect">
@@ -8098,7 +8097,7 @@
         </p:nvGrpSpPr>
         <p:grpSpPr>
           <a:xfrm>
-            <a:off x="8242640" y="23120161"/>
+            <a:off x="7909987" y="23084830"/>
             <a:ext cx="3276000" cy="2614597"/>
             <a:chOff x="5469489" y="19448043"/>
             <a:chExt cx="3276001" cy="2614597"/>
@@ -8203,7 +8202,7 @@
             </a:ln>
             <a:extLst>
               <a:ext uri="{C572A759-6A51-4108-AA02-DFA0A04FC94B}">
-                <ma14:wrappingTextBoxFlag xmlns:ma14="http://schemas.microsoft.com/office/mac/drawingml/2011/main" xmlns="" val="1"/>
+                <ma14:wrappingTextBoxFlag xmlns="" xmlns:ma14="http://schemas.microsoft.com/office/mac/drawingml/2011/main" val="1"/>
               </a:ext>
             </a:extLst>
           </p:spPr>
@@ -8243,7 +8242,7 @@
         </p:nvGrpSpPr>
         <p:grpSpPr>
           <a:xfrm>
-            <a:off x="11864412" y="23125777"/>
+            <a:off x="11548913" y="23087549"/>
             <a:ext cx="3272400" cy="2609159"/>
             <a:chOff x="13622607" y="23125777"/>
             <a:chExt cx="3272400" cy="2609159"/>
@@ -8391,7 +8390,7 @@
             </a:ln>
             <a:extLst>
               <a:ext uri="{C572A759-6A51-4108-AA02-DFA0A04FC94B}">
-                <ma14:wrappingTextBoxFlag xmlns:ma14="http://schemas.microsoft.com/office/mac/drawingml/2011/main" xmlns="" val="1"/>
+                <ma14:wrappingTextBoxFlag xmlns="" xmlns:ma14="http://schemas.microsoft.com/office/mac/drawingml/2011/main" val="1"/>
               </a:ext>
             </a:extLst>
           </p:spPr>
@@ -8430,7 +8429,7 @@
           </a:ln>
           <a:extLst>
             <a:ext uri="{C572A759-6A51-4108-AA02-DFA0A04FC94B}">
-              <ma14:wrappingTextBoxFlag xmlns:ma14="http://schemas.microsoft.com/office/mac/drawingml/2011/main" xmlns="" val="1"/>
+              <ma14:wrappingTextBoxFlag xmlns="" xmlns:ma14="http://schemas.microsoft.com/office/mac/drawingml/2011/main" val="1"/>
             </a:ext>
           </a:extLst>
         </p:spPr>
@@ -8464,205 +8463,226 @@
           </a:p>
         </p:txBody>
       </p:sp>
-      <p:sp>
-        <p:nvSpPr>
-          <p:cNvPr id="162" name="Shape 157"/>
-          <p:cNvSpPr/>
+      <p:grpSp>
+        <p:nvGrpSpPr>
+          <p:cNvPr id="3" name="Group 2">
+            <a:extLst>
+              <a:ext uri="{FF2B5EF4-FFF2-40B4-BE49-F238E27FC236}">
+                <a16:creationId xmlns:a16="http://schemas.microsoft.com/office/drawing/2014/main" id="{A768833A-A0EA-A144-8100-7DF2B2D2AA6B}"/>
+              </a:ext>
+            </a:extLst>
+          </p:cNvPr>
+          <p:cNvGrpSpPr/>
           <p:nvPr/>
-        </p:nvSpPr>
-        <p:spPr>
+        </p:nvGrpSpPr>
+        <p:grpSpPr>
           <a:xfrm>
-            <a:off x="655501" y="23228457"/>
-            <a:ext cx="3655886" cy="2898808"/>
+            <a:off x="4271061" y="23055851"/>
+            <a:ext cx="3276000" cy="2672554"/>
+            <a:chOff x="914116" y="22985903"/>
+            <a:chExt cx="3276000" cy="2672554"/>
           </a:xfrm>
-          <a:prstGeom prst="roundRect">
-            <a:avLst>
-              <a:gd name="adj" fmla="val 16667"/>
-            </a:avLst>
-          </a:prstGeom>
-          <a:gradFill flip="none" rotWithShape="1">
-            <a:gsLst>
-              <a:gs pos="0">
-                <a:schemeClr val="accent3"/>
-              </a:gs>
-              <a:gs pos="100000">
-                <a:schemeClr val="accent1">
-                  <a:lumMod val="75000"/>
-                </a:schemeClr>
-              </a:gs>
-            </a:gsLst>
-            <a:lin ang="16200000" scaled="0"/>
-          </a:gradFill>
-          <a:ln w="76200" cap="flat">
-            <a:solidFill>
-              <a:schemeClr val="tx1"/>
-            </a:solidFill>
-            <a:prstDash val="solid"/>
-            <a:bevel/>
-          </a:ln>
-          <a:effectLst>
-            <a:outerShdw blurRad="38100" dist="23000" dir="5400000" rotWithShape="0">
-              <a:srgbClr val="000000">
-                <a:alpha val="35000"/>
-              </a:srgbClr>
-            </a:outerShdw>
-          </a:effectLst>
-        </p:spPr>
-        <p:txBody>
-          <a:bodyPr wrap="square" lIns="0" tIns="0" rIns="0" bIns="0" numCol="1" anchor="ctr">
-            <a:noAutofit/>
-          </a:bodyPr>
-          <a:lstStyle/>
-          <a:p>
-            <a:pPr algn="ctr"/>
-            <a:endParaRPr lang="en-US" sz="2900" dirty="0">
+        </p:grpSpPr>
+        <p:sp>
+          <p:nvSpPr>
+            <p:cNvPr id="162" name="Shape 157"/>
+            <p:cNvSpPr/>
+            <p:nvPr/>
+          </p:nvSpPr>
+          <p:spPr>
+            <a:xfrm>
+              <a:off x="914116" y="23228457"/>
+              <a:ext cx="3276000" cy="2430000"/>
+            </a:xfrm>
+            <a:prstGeom prst="roundRect">
+              <a:avLst>
+                <a:gd name="adj" fmla="val 16667"/>
+              </a:avLst>
+            </a:prstGeom>
+            <a:gradFill flip="none" rotWithShape="1">
+              <a:gsLst>
+                <a:gs pos="0">
+                  <a:schemeClr val="accent3"/>
+                </a:gs>
+                <a:gs pos="100000">
+                  <a:schemeClr val="accent1">
+                    <a:lumMod val="75000"/>
+                  </a:schemeClr>
+                </a:gs>
+              </a:gsLst>
+              <a:lin ang="16200000" scaled="0"/>
+            </a:gradFill>
+            <a:ln w="76200" cap="flat">
               <a:solidFill>
-                <a:srgbClr val="FFFFFF"/>
+                <a:schemeClr val="tx1"/>
               </a:solidFill>
-            </a:endParaRPr>
-          </a:p>
-          <a:p>
-            <a:pPr algn="ctr"/>
-            <a:r>
-              <a:rPr lang="en-US" sz="2900" dirty="0">
+              <a:prstDash val="solid"/>
+              <a:bevel/>
+            </a:ln>
+            <a:effectLst>
+              <a:outerShdw blurRad="38100" dist="23000" dir="5400000" rotWithShape="0">
+                <a:srgbClr val="000000">
+                  <a:alpha val="35000"/>
+                </a:srgbClr>
+              </a:outerShdw>
+            </a:effectLst>
+          </p:spPr>
+          <p:txBody>
+            <a:bodyPr wrap="square" lIns="0" tIns="0" rIns="0" bIns="0" numCol="1" anchor="ctr">
+              <a:noAutofit/>
+            </a:bodyPr>
+            <a:lstStyle/>
+            <a:p>
+              <a:pPr algn="ctr"/>
+              <a:endParaRPr lang="en-US" sz="2900" dirty="0">
                 <a:solidFill>
                   <a:srgbClr val="FFFFFF"/>
                 </a:solidFill>
-              </a:rPr>
-              <a:t>[</a:t>
-            </a:r>
-            <a:r>
-              <a:rPr lang="en-US" sz="2900" dirty="0" err="1">
-                <a:solidFill>
-                  <a:srgbClr val="FFFFFF"/>
-                </a:solidFill>
-              </a:rPr>
-              <a:t>MastMath-UvA</a:t>
-            </a:r>
-            <a:r>
-              <a:rPr lang="en-US" sz="2900" dirty="0">
-                <a:solidFill>
-                  <a:srgbClr val="FFFFFF"/>
-                </a:solidFill>
-              </a:rPr>
-              <a:t>] </a:t>
-            </a:r>
-            <a:br>
-              <a:rPr lang="en-US" sz="2900" dirty="0">
-                <a:solidFill>
-                  <a:srgbClr val="FFFFFF"/>
-                </a:solidFill>
-              </a:rPr>
-            </a:br>
-            <a:r>
-              <a:rPr lang="en-US" sz="2900" dirty="0">
-                <a:solidFill>
-                  <a:srgbClr val="FFFFFF"/>
-                </a:solidFill>
-              </a:rPr>
-              <a:t>Set Theory </a:t>
-            </a:r>
-            <a:br>
-              <a:rPr lang="en-US" sz="2900" dirty="0">
-                <a:solidFill>
-                  <a:srgbClr val="FFFFFF"/>
-                </a:solidFill>
-              </a:rPr>
-            </a:br>
-            <a:r>
-              <a:rPr lang="en-US" sz="2900" dirty="0">
-                <a:solidFill>
-                  <a:srgbClr val="FFFFFF"/>
-                </a:solidFill>
-              </a:rPr>
-              <a:t>(Hart, </a:t>
-            </a:r>
-            <a:r>
-              <a:rPr lang="en-US" sz="2900" dirty="0" err="1">
-                <a:solidFill>
-                  <a:srgbClr val="FFFFFF"/>
-                </a:solidFill>
-              </a:rPr>
-              <a:t>Löwe</a:t>
-            </a:r>
-            <a:r>
-              <a:rPr lang="en-US" sz="2900" dirty="0">
-                <a:solidFill>
-                  <a:srgbClr val="FFFFFF"/>
-                </a:solidFill>
-              </a:rPr>
-              <a:t>) </a:t>
-            </a:r>
-            <a:br>
-              <a:rPr lang="en-US" sz="2900" dirty="0">
-                <a:solidFill>
-                  <a:srgbClr val="FFFFFF"/>
-                </a:solidFill>
-              </a:rPr>
-            </a:br>
-            <a:r>
-              <a:rPr lang="en-US" sz="2900" dirty="0">
-                <a:solidFill>
-                  <a:srgbClr val="FFFFFF"/>
-                </a:solidFill>
-              </a:rPr>
-              <a:t>[8EC]</a:t>
-            </a:r>
-          </a:p>
-        </p:txBody>
-      </p:sp>
-      <p:sp>
-        <p:nvSpPr>
-          <p:cNvPr id="174" name="Shape 230"/>
-          <p:cNvSpPr/>
-          <p:nvPr/>
-        </p:nvSpPr>
-        <p:spPr>
-          <a:xfrm>
-            <a:off x="2182313" y="22940229"/>
-            <a:ext cx="1497972" cy="1204325"/>
-          </a:xfrm>
-          <a:prstGeom prst="rect">
-            <a:avLst/>
-          </a:prstGeom>
-          <a:ln w="12700">
-            <a:miter lim="400000"/>
-          </a:ln>
-          <a:extLst>
-            <a:ext uri="{C572A759-6A51-4108-AA02-DFA0A04FC94B}">
-              <ma14:wrappingTextBoxFlag xmlns:ma14="http://schemas.microsoft.com/office/mac/drawingml/2011/main" xmlns="" val="1"/>
-            </a:ext>
-          </a:extLst>
-        </p:spPr>
-        <p:txBody>
-          <a:bodyPr lIns="208805" tIns="208805" rIns="208805" bIns="208805" anchor="ctr">
-            <a:normAutofit/>
-          </a:bodyPr>
-          <a:lstStyle>
-            <a:lvl1pPr>
-              <a:defRPr sz="4000"/>
-            </a:lvl1pPr>
-          </a:lstStyle>
-          <a:p>
-            <a:pPr algn="ctr">
-              <a:defRPr sz="1800"/>
-            </a:pPr>
-            <a:r>
-              <a:rPr lang="en-US" sz="3300" b="1" dirty="0">
+              </a:endParaRPr>
+            </a:p>
+            <a:p>
+              <a:pPr algn="ctr"/>
+              <a:r>
+                <a:rPr lang="en-US" sz="2900" dirty="0">
+                  <a:solidFill>
+                    <a:srgbClr val="FFFFFF"/>
+                  </a:solidFill>
+                </a:rPr>
+                <a:t>[</a:t>
+              </a:r>
+              <a:r>
+                <a:rPr lang="en-US" sz="2900" dirty="0" err="1">
+                  <a:solidFill>
+                    <a:srgbClr val="FFFFFF"/>
+                  </a:solidFill>
+                </a:rPr>
+                <a:t>MastMath-UvA</a:t>
+              </a:r>
+              <a:r>
+                <a:rPr lang="en-US" sz="2900" dirty="0">
+                  <a:solidFill>
+                    <a:srgbClr val="FFFFFF"/>
+                  </a:solidFill>
+                </a:rPr>
+                <a:t>] </a:t>
+              </a:r>
+              <a:br>
+                <a:rPr lang="en-US" sz="2900" dirty="0">
+                  <a:solidFill>
+                    <a:srgbClr val="FFFFFF"/>
+                  </a:solidFill>
+                </a:rPr>
+              </a:br>
+              <a:r>
+                <a:rPr lang="en-US" sz="2900" dirty="0">
+                  <a:solidFill>
+                    <a:srgbClr val="FFFFFF"/>
+                  </a:solidFill>
+                </a:rPr>
+                <a:t>Set Theory </a:t>
+              </a:r>
+              <a:br>
+                <a:rPr lang="en-US" sz="2900" dirty="0">
+                  <a:solidFill>
+                    <a:srgbClr val="FFFFFF"/>
+                  </a:solidFill>
+                </a:rPr>
+              </a:br>
+              <a:r>
+                <a:rPr lang="en-US" sz="2900" dirty="0">
+                  <a:solidFill>
+                    <a:srgbClr val="FFFFFF"/>
+                  </a:solidFill>
+                </a:rPr>
+                <a:t>(Hart, </a:t>
+              </a:r>
+              <a:r>
+                <a:rPr lang="en-US" sz="2900" dirty="0" err="1">
+                  <a:solidFill>
+                    <a:srgbClr val="FFFFFF"/>
+                  </a:solidFill>
+                </a:rPr>
+                <a:t>Löwe</a:t>
+              </a:r>
+              <a:r>
+                <a:rPr lang="en-US" sz="2900" dirty="0">
+                  <a:solidFill>
+                    <a:srgbClr val="FFFFFF"/>
+                  </a:solidFill>
+                </a:rPr>
+                <a:t>) </a:t>
+              </a:r>
+              <a:br>
+                <a:rPr lang="en-US" sz="2900" dirty="0">
+                  <a:solidFill>
+                    <a:srgbClr val="FFFFFF"/>
+                  </a:solidFill>
+                </a:rPr>
+              </a:br>
+              <a:r>
+                <a:rPr lang="en-US" sz="2900" dirty="0">
+                  <a:solidFill>
+                    <a:srgbClr val="FFFFFF"/>
+                  </a:solidFill>
+                </a:rPr>
+                <a:t>[8EC]</a:t>
+              </a:r>
+            </a:p>
+          </p:txBody>
+        </p:sp>
+        <p:sp>
+          <p:nvSpPr>
+            <p:cNvPr id="174" name="Shape 230"/>
+            <p:cNvSpPr/>
+            <p:nvPr/>
+          </p:nvSpPr>
+          <p:spPr>
+            <a:xfrm>
+              <a:off x="1797512" y="22985903"/>
+              <a:ext cx="1497972" cy="1204325"/>
+            </a:xfrm>
+            <a:prstGeom prst="rect">
+              <a:avLst/>
+            </a:prstGeom>
+            <a:ln w="12700">
+              <a:miter lim="400000"/>
+            </a:ln>
+            <a:extLst>
+              <a:ext uri="{C572A759-6A51-4108-AA02-DFA0A04FC94B}">
+                <ma14:wrappingTextBoxFlag xmlns="" xmlns:ma14="http://schemas.microsoft.com/office/mac/drawingml/2011/main" val="1"/>
+              </a:ext>
+            </a:extLst>
+          </p:spPr>
+          <p:txBody>
+            <a:bodyPr lIns="208805" tIns="208805" rIns="208805" bIns="208805" anchor="ctr">
+              <a:normAutofit/>
+            </a:bodyPr>
+            <a:lstStyle>
+              <a:lvl1pPr>
+                <a:defRPr sz="4000"/>
+              </a:lvl1pPr>
+            </a:lstStyle>
+            <a:p>
+              <a:pPr algn="ctr">
+                <a:defRPr sz="1800"/>
+              </a:pPr>
+              <a:r>
+                <a:rPr lang="en-US" sz="3300" b="1" dirty="0">
+                  <a:solidFill>
+                    <a:schemeClr val="bg1"/>
+                  </a:solidFill>
+                </a:rPr>
+                <a:t>L&amp;M</a:t>
+              </a:r>
+              <a:endParaRPr sz="3300" b="1" dirty="0">
                 <a:solidFill>
                   <a:schemeClr val="bg1"/>
                 </a:solidFill>
-              </a:rPr>
-              <a:t>L&amp;M</a:t>
-            </a:r>
-            <a:endParaRPr sz="3300" b="1" dirty="0">
-              <a:solidFill>
-                <a:schemeClr val="bg1"/>
-              </a:solidFill>
-            </a:endParaRPr>
-          </a:p>
-        </p:txBody>
-      </p:sp>
+              </a:endParaRPr>
+            </a:p>
+          </p:txBody>
+        </p:sp>
+      </p:grpSp>
       <p:sp>
         <p:nvSpPr>
           <p:cNvPr id="164" name="Shape 157"/>
@@ -8671,7 +8691,7 @@
         </p:nvSpPr>
         <p:spPr>
           <a:xfrm>
-            <a:off x="15383021" y="23300604"/>
+            <a:off x="15184241" y="23143253"/>
             <a:ext cx="3671804" cy="2497750"/>
           </a:xfrm>
           <a:prstGeom prst="roundRect">
@@ -8851,7 +8871,7 @@
         </p:nvSpPr>
         <p:spPr>
           <a:xfrm>
-            <a:off x="15651425" y="26631072"/>
+            <a:off x="15302985" y="26626874"/>
             <a:ext cx="3276000" cy="2430000"/>
           </a:xfrm>
           <a:prstGeom prst="roundRect">
@@ -9023,7 +9043,7 @@
         </p:nvSpPr>
         <p:spPr>
           <a:xfrm>
-            <a:off x="4551428" y="26658220"/>
+            <a:off x="4209678" y="26653948"/>
             <a:ext cx="3410273" cy="2375852"/>
           </a:xfrm>
           <a:prstGeom prst="roundRect">
@@ -9170,7 +9190,7 @@
         </p:nvSpPr>
         <p:spPr>
           <a:xfrm>
-            <a:off x="17251571" y="14045334"/>
+            <a:off x="14987194" y="14055760"/>
             <a:ext cx="3276000" cy="2430000"/>
           </a:xfrm>
           <a:prstGeom prst="roundRect">
@@ -9253,7 +9273,7 @@
         </p:nvGrpSpPr>
         <p:grpSpPr>
           <a:xfrm>
-            <a:off x="21853124" y="13659566"/>
+            <a:off x="18689588" y="13759407"/>
             <a:ext cx="3276000" cy="2734537"/>
             <a:chOff x="24809283" y="13838554"/>
             <a:chExt cx="3276000" cy="2734646"/>
@@ -9389,7 +9409,7 @@
             </a:ln>
             <a:extLst>
               <a:ext uri="{C572A759-6A51-4108-AA02-DFA0A04FC94B}">
-                <ma14:wrappingTextBoxFlag xmlns:ma14="http://schemas.microsoft.com/office/mac/drawingml/2011/main" xmlns="" val="1"/>
+                <ma14:wrappingTextBoxFlag xmlns="" xmlns:ma14="http://schemas.microsoft.com/office/mac/drawingml/2011/main" val="1"/>
               </a:ext>
             </a:extLst>
           </p:spPr>
@@ -9745,7 +9765,7 @@
               </a:ln>
               <a:extLst>
                 <a:ext uri="{C572A759-6A51-4108-AA02-DFA0A04FC94B}">
-                  <ma14:wrappingTextBoxFlag xmlns:ma14="http://schemas.microsoft.com/office/mac/drawingml/2011/main" xmlns="" val="1"/>
+                  <ma14:wrappingTextBoxFlag xmlns="" xmlns:ma14="http://schemas.microsoft.com/office/mac/drawingml/2011/main" val="1"/>
                 </a:ext>
               </a:extLst>
             </p:spPr>
@@ -9873,7 +9893,7 @@
         </p:nvSpPr>
         <p:spPr>
           <a:xfrm>
-            <a:off x="21858954" y="17712983"/>
+            <a:off x="19653359" y="17712983"/>
             <a:ext cx="3276000" cy="2430000"/>
           </a:xfrm>
           <a:prstGeom prst="roundRect">
@@ -9975,7 +9995,7 @@
         </p:nvSpPr>
         <p:spPr>
           <a:xfrm>
-            <a:off x="17187392" y="17712983"/>
+            <a:off x="14981797" y="17712983"/>
             <a:ext cx="3276000" cy="2430000"/>
           </a:xfrm>
           <a:prstGeom prst="roundRect">
@@ -10064,7 +10084,7 @@
           </a:ln>
           <a:extLst>
             <a:ext uri="{C572A759-6A51-4108-AA02-DFA0A04FC94B}">
-              <ma14:wrappingTextBoxFlag xmlns:ma14="http://schemas.microsoft.com/office/mac/drawingml/2011/main" xmlns="" val="1"/>
+              <ma14:wrappingTextBoxFlag xmlns="" xmlns:ma14="http://schemas.microsoft.com/office/mac/drawingml/2011/main" val="1"/>
             </a:ext>
           </a:extLst>
         </p:spPr>
@@ -10158,7 +10178,7 @@
           </a:ln>
           <a:extLst>
             <a:ext uri="{C572A759-6A51-4108-AA02-DFA0A04FC94B}">
-              <ma14:wrappingTextBoxFlag xmlns:ma14="http://schemas.microsoft.com/office/mac/drawingml/2011/main" xmlns="" val="1"/>
+              <ma14:wrappingTextBoxFlag xmlns="" xmlns:ma14="http://schemas.microsoft.com/office/mac/drawingml/2011/main" val="1"/>
             </a:ext>
           </a:extLst>
         </p:spPr>
@@ -10580,7 +10600,7 @@
           </a:ln>
           <a:extLst>
             <a:ext uri="{C572A759-6A51-4108-AA02-DFA0A04FC94B}">
-              <ma14:wrappingTextBoxFlag xmlns:ma14="http://schemas.microsoft.com/office/mac/drawingml/2011/main" xmlns="" val="1"/>
+              <ma14:wrappingTextBoxFlag xmlns="" xmlns:ma14="http://schemas.microsoft.com/office/mac/drawingml/2011/main" val="1"/>
             </a:ext>
           </a:extLst>
         </p:spPr>
@@ -10632,7 +10652,7 @@
           </a:ln>
           <a:extLst>
             <a:ext uri="{C572A759-6A51-4108-AA02-DFA0A04FC94B}">
-              <ma14:wrappingTextBoxFlag xmlns:ma14="http://schemas.microsoft.com/office/mac/drawingml/2011/main" xmlns="" val="1"/>
+              <ma14:wrappingTextBoxFlag xmlns="" xmlns:ma14="http://schemas.microsoft.com/office/mac/drawingml/2011/main" val="1"/>
             </a:ext>
           </a:extLst>
         </p:spPr>
@@ -10763,7 +10783,7 @@
         </p:nvSpPr>
         <p:spPr>
           <a:xfrm flipH="1">
-            <a:off x="20681780" y="18974555"/>
+            <a:off x="18476185" y="18974555"/>
             <a:ext cx="955898" cy="1623"/>
           </a:xfrm>
           <a:prstGeom prst="line">
@@ -10853,7 +10873,7 @@
         </p:nvSpPr>
         <p:spPr>
           <a:xfrm>
-            <a:off x="14105476" y="15647278"/>
+            <a:off x="10097966" y="1031926"/>
             <a:ext cx="3435443" cy="2430000"/>
           </a:xfrm>
           <a:prstGeom prst="roundRect">
@@ -10935,7 +10955,7 @@
         </p:nvSpPr>
         <p:spPr>
           <a:xfrm>
-            <a:off x="27144695" y="24413661"/>
+            <a:off x="27064299" y="24413661"/>
             <a:ext cx="3276000" cy="2430000"/>
           </a:xfrm>
           <a:prstGeom prst="roundRect">
@@ -11010,7 +11030,7 @@
         </p:nvSpPr>
         <p:spPr>
           <a:xfrm>
-            <a:off x="30787545" y="27206670"/>
+            <a:off x="30681909" y="27173194"/>
             <a:ext cx="3276000" cy="2430000"/>
           </a:xfrm>
           <a:prstGeom prst="roundRect">
@@ -11107,7 +11127,7 @@
         </p:nvSpPr>
         <p:spPr>
           <a:xfrm>
-            <a:off x="8324493" y="977314"/>
+            <a:off x="6113595" y="1047075"/>
             <a:ext cx="3276000" cy="2430000"/>
           </a:xfrm>
           <a:prstGeom prst="roundRect">
@@ -11293,7 +11313,7 @@
         </p:nvSpPr>
         <p:spPr>
           <a:xfrm>
-            <a:off x="11217608" y="7346056"/>
+            <a:off x="10183776" y="7164561"/>
             <a:ext cx="3276000" cy="2430000"/>
           </a:xfrm>
           <a:prstGeom prst="roundRect">
@@ -11382,7 +11402,7 @@
         </p:nvSpPr>
         <p:spPr>
           <a:xfrm>
-            <a:off x="27220272" y="27191073"/>
+            <a:off x="27064299" y="27173194"/>
             <a:ext cx="3276000" cy="2430000"/>
           </a:xfrm>
           <a:prstGeom prst="roundRect">
@@ -11472,7 +11492,7 @@
         </p:nvSpPr>
         <p:spPr>
           <a:xfrm>
-            <a:off x="21454271" y="27053861"/>
+            <a:off x="21195857" y="27053861"/>
             <a:ext cx="3276000" cy="2430000"/>
           </a:xfrm>
           <a:prstGeom prst="roundRect">

</xml_diff>

<commit_message>
adding arrow, correcting typo
</commit_message>
<xml_diff>
--- a/MoLOverviewPoster2018.pptx
+++ b/MoLOverviewPoster2018.pptx
@@ -2319,7 +2319,7 @@
           </a:ln>
           <a:extLst>
             <a:ext uri="{C572A759-6A51-4108-AA02-DFA0A04FC94B}">
-              <ma14:wrappingTextBoxFlag xmlns="" xmlns:ma14="http://schemas.microsoft.com/office/mac/drawingml/2011/main" val="1"/>
+              <ma14:wrappingTextBoxFlag xmlns:ma14="http://schemas.microsoft.com/office/mac/drawingml/2011/main" xmlns="" val="1"/>
             </a:ext>
           </a:extLst>
         </p:spPr>
@@ -2362,7 +2362,7 @@
           </a:ln>
           <a:extLst>
             <a:ext uri="{C572A759-6A51-4108-AA02-DFA0A04FC94B}">
-              <ma14:wrappingTextBoxFlag xmlns="" xmlns:ma14="http://schemas.microsoft.com/office/mac/drawingml/2011/main" val="1"/>
+              <ma14:wrappingTextBoxFlag xmlns:ma14="http://schemas.microsoft.com/office/mac/drawingml/2011/main" xmlns="" val="1"/>
             </a:ext>
           </a:extLst>
         </p:spPr>
@@ -2884,7 +2884,29 @@
                 <a:ea typeface="Calibri"/>
                 <a:cs typeface="Calibri"/>
               </a:rPr>
-              <a:t>version: 30 May 2018: </a:t>
+              <a:t>version</a:t>
+            </a:r>
+            <a:r>
+              <a:rPr lang="en-US" sz="2800">
+                <a:solidFill>
+                  <a:sysClr val="windowText" lastClr="000000"/>
+                </a:solidFill>
+                <a:latin typeface="Calibri"/>
+                <a:ea typeface="Calibri"/>
+                <a:cs typeface="Calibri"/>
+              </a:rPr>
+              <a:t>: 1 June 2018</a:t>
+            </a:r>
+            <a:r>
+              <a:rPr lang="en-US" sz="2800" dirty="0">
+                <a:solidFill>
+                  <a:sysClr val="windowText" lastClr="000000"/>
+                </a:solidFill>
+                <a:latin typeface="Calibri"/>
+                <a:ea typeface="Calibri"/>
+                <a:cs typeface="Calibri"/>
+              </a:rPr>
+              <a:t>: </a:t>
             </a:r>
             <a:br>
               <a:rPr lang="en-US" sz="2800" dirty="0">
@@ -3481,7 +3503,23 @@
                     <a:srgbClr val="FFFFFF"/>
                   </a:solidFill>
                 </a:rPr>
-                <a:t>Sep/Okt 2018</a:t>
+                <a:t>Sep/</a:t>
+              </a:r>
+              <a:r>
+                <a:rPr lang="de-DE" sz="2900" dirty="0" err="1">
+                  <a:solidFill>
+                    <a:srgbClr val="FFFFFF"/>
+                  </a:solidFill>
+                </a:rPr>
+                <a:t>Oct</a:t>
+              </a:r>
+              <a:r>
+                <a:rPr lang="de-DE" sz="2900" dirty="0">
+                  <a:solidFill>
+                    <a:srgbClr val="FFFFFF"/>
+                  </a:solidFill>
+                </a:rPr>
+                <a:t> 2018</a:t>
               </a:r>
             </a:p>
           </p:txBody>
@@ -3751,7 +3789,7 @@
           </a:ln>
           <a:extLst>
             <a:ext uri="{C572A759-6A51-4108-AA02-DFA0A04FC94B}">
-              <ma14:wrappingTextBoxFlag xmlns="" xmlns:ma14="http://schemas.microsoft.com/office/mac/drawingml/2011/main" val="1"/>
+              <ma14:wrappingTextBoxFlag xmlns:ma14="http://schemas.microsoft.com/office/mac/drawingml/2011/main" xmlns="" val="1"/>
             </a:ext>
           </a:extLst>
         </p:spPr>
@@ -3803,7 +3841,7 @@
           </a:ln>
           <a:extLst>
             <a:ext uri="{C572A759-6A51-4108-AA02-DFA0A04FC94B}">
-              <ma14:wrappingTextBoxFlag xmlns="" xmlns:ma14="http://schemas.microsoft.com/office/mac/drawingml/2011/main" val="1"/>
+              <ma14:wrappingTextBoxFlag xmlns:ma14="http://schemas.microsoft.com/office/mac/drawingml/2011/main" xmlns="" val="1"/>
             </a:ext>
           </a:extLst>
         </p:spPr>
@@ -3847,7 +3885,7 @@
           </a:ln>
           <a:extLst>
             <a:ext uri="{C572A759-6A51-4108-AA02-DFA0A04FC94B}">
-              <ma14:wrappingTextBoxFlag xmlns="" xmlns:ma14="http://schemas.microsoft.com/office/mac/drawingml/2011/main" val="1"/>
+              <ma14:wrappingTextBoxFlag xmlns:ma14="http://schemas.microsoft.com/office/mac/drawingml/2011/main" xmlns="" val="1"/>
             </a:ext>
           </a:extLst>
         </p:spPr>
@@ -3907,7 +3945,7 @@
           </a:ln>
           <a:extLst>
             <a:ext uri="{C572A759-6A51-4108-AA02-DFA0A04FC94B}">
-              <ma14:wrappingTextBoxFlag xmlns="" xmlns:ma14="http://schemas.microsoft.com/office/mac/drawingml/2011/main" val="1"/>
+              <ma14:wrappingTextBoxFlag xmlns:ma14="http://schemas.microsoft.com/office/mac/drawingml/2011/main" xmlns="" val="1"/>
             </a:ext>
           </a:extLst>
         </p:spPr>
@@ -4224,7 +4262,7 @@
               </a:ln>
               <a:extLst>
                 <a:ext uri="{C572A759-6A51-4108-AA02-DFA0A04FC94B}">
-                  <ma14:wrappingTextBoxFlag xmlns="" xmlns:ma14="http://schemas.microsoft.com/office/mac/drawingml/2011/main" val="1"/>
+                  <ma14:wrappingTextBoxFlag xmlns:ma14="http://schemas.microsoft.com/office/mac/drawingml/2011/main" xmlns="" val="1"/>
                 </a:ext>
               </a:extLst>
             </p:spPr>
@@ -4362,7 +4400,7 @@
           </a:ln>
           <a:extLst>
             <a:ext uri="{C572A759-6A51-4108-AA02-DFA0A04FC94B}">
-              <ma14:wrappingTextBoxFlag xmlns="" xmlns:ma14="http://schemas.microsoft.com/office/mac/drawingml/2011/main" val="1"/>
+              <ma14:wrappingTextBoxFlag xmlns:ma14="http://schemas.microsoft.com/office/mac/drawingml/2011/main" xmlns="" val="1"/>
             </a:ext>
           </a:extLst>
         </p:spPr>
@@ -4406,7 +4444,7 @@
           </a:ln>
           <a:extLst>
             <a:ext uri="{C572A759-6A51-4108-AA02-DFA0A04FC94B}">
-              <ma14:wrappingTextBoxFlag xmlns="" xmlns:ma14="http://schemas.microsoft.com/office/mac/drawingml/2011/main" val="1"/>
+              <ma14:wrappingTextBoxFlag xmlns:ma14="http://schemas.microsoft.com/office/mac/drawingml/2011/main" xmlns="" val="1"/>
             </a:ext>
           </a:extLst>
         </p:spPr>
@@ -4562,7 +4600,7 @@
             </a:ln>
             <a:extLst>
               <a:ext uri="{C572A759-6A51-4108-AA02-DFA0A04FC94B}">
-                <ma14:wrappingTextBoxFlag xmlns="" xmlns:ma14="http://schemas.microsoft.com/office/mac/drawingml/2011/main" val="1"/>
+                <ma14:wrappingTextBoxFlag xmlns:ma14="http://schemas.microsoft.com/office/mac/drawingml/2011/main" xmlns="" val="1"/>
               </a:ext>
             </a:extLst>
           </p:spPr>
@@ -4615,7 +4653,7 @@
           </a:ln>
           <a:extLst>
             <a:ext uri="{C572A759-6A51-4108-AA02-DFA0A04FC94B}">
-              <ma14:wrappingTextBoxFlag xmlns="" xmlns:ma14="http://schemas.microsoft.com/office/mac/drawingml/2011/main" val="1"/>
+              <ma14:wrappingTextBoxFlag xmlns:ma14="http://schemas.microsoft.com/office/mac/drawingml/2011/main" xmlns="" val="1"/>
             </a:ext>
           </a:extLst>
         </p:spPr>
@@ -7251,7 +7289,7 @@
             </a:ln>
             <a:extLst>
               <a:ext uri="{C572A759-6A51-4108-AA02-DFA0A04FC94B}">
-                <ma14:wrappingTextBoxFlag xmlns="" xmlns:ma14="http://schemas.microsoft.com/office/mac/drawingml/2011/main" val="1"/>
+                <ma14:wrappingTextBoxFlag xmlns:ma14="http://schemas.microsoft.com/office/mac/drawingml/2011/main" xmlns="" val="1"/>
               </a:ext>
             </a:extLst>
           </p:spPr>
@@ -7473,7 +7511,7 @@
             </a:ln>
             <a:extLst>
               <a:ext uri="{C572A759-6A51-4108-AA02-DFA0A04FC94B}">
-                <ma14:wrappingTextBoxFlag xmlns="" xmlns:ma14="http://schemas.microsoft.com/office/mac/drawingml/2011/main" val="1"/>
+                <ma14:wrappingTextBoxFlag xmlns:ma14="http://schemas.microsoft.com/office/mac/drawingml/2011/main" xmlns="" val="1"/>
               </a:ext>
             </a:extLst>
           </p:spPr>
@@ -8202,7 +8240,7 @@
             </a:ln>
             <a:extLst>
               <a:ext uri="{C572A759-6A51-4108-AA02-DFA0A04FC94B}">
-                <ma14:wrappingTextBoxFlag xmlns="" xmlns:ma14="http://schemas.microsoft.com/office/mac/drawingml/2011/main" val="1"/>
+                <ma14:wrappingTextBoxFlag xmlns:ma14="http://schemas.microsoft.com/office/mac/drawingml/2011/main" xmlns="" val="1"/>
               </a:ext>
             </a:extLst>
           </p:spPr>
@@ -8390,7 +8428,7 @@
             </a:ln>
             <a:extLst>
               <a:ext uri="{C572A759-6A51-4108-AA02-DFA0A04FC94B}">
-                <ma14:wrappingTextBoxFlag xmlns="" xmlns:ma14="http://schemas.microsoft.com/office/mac/drawingml/2011/main" val="1"/>
+                <ma14:wrappingTextBoxFlag xmlns:ma14="http://schemas.microsoft.com/office/mac/drawingml/2011/main" xmlns="" val="1"/>
               </a:ext>
             </a:extLst>
           </p:spPr>
@@ -8429,7 +8467,7 @@
           </a:ln>
           <a:extLst>
             <a:ext uri="{C572A759-6A51-4108-AA02-DFA0A04FC94B}">
-              <ma14:wrappingTextBoxFlag xmlns="" xmlns:ma14="http://schemas.microsoft.com/office/mac/drawingml/2011/main" val="1"/>
+              <ma14:wrappingTextBoxFlag xmlns:ma14="http://schemas.microsoft.com/office/mac/drawingml/2011/main" xmlns="" val="1"/>
             </a:ext>
           </a:extLst>
         </p:spPr>
@@ -8649,7 +8687,7 @@
             </a:ln>
             <a:extLst>
               <a:ext uri="{C572A759-6A51-4108-AA02-DFA0A04FC94B}">
-                <ma14:wrappingTextBoxFlag xmlns="" xmlns:ma14="http://schemas.microsoft.com/office/mac/drawingml/2011/main" val="1"/>
+                <ma14:wrappingTextBoxFlag xmlns:ma14="http://schemas.microsoft.com/office/mac/drawingml/2011/main" xmlns="" val="1"/>
               </a:ext>
             </a:extLst>
           </p:spPr>
@@ -9409,7 +9447,7 @@
             </a:ln>
             <a:extLst>
               <a:ext uri="{C572A759-6A51-4108-AA02-DFA0A04FC94B}">
-                <ma14:wrappingTextBoxFlag xmlns="" xmlns:ma14="http://schemas.microsoft.com/office/mac/drawingml/2011/main" val="1"/>
+                <ma14:wrappingTextBoxFlag xmlns:ma14="http://schemas.microsoft.com/office/mac/drawingml/2011/main" xmlns="" val="1"/>
               </a:ext>
             </a:extLst>
           </p:spPr>
@@ -9765,7 +9803,7 @@
               </a:ln>
               <a:extLst>
                 <a:ext uri="{C572A759-6A51-4108-AA02-DFA0A04FC94B}">
-                  <ma14:wrappingTextBoxFlag xmlns="" xmlns:ma14="http://schemas.microsoft.com/office/mac/drawingml/2011/main" val="1"/>
+                  <ma14:wrappingTextBoxFlag xmlns:ma14="http://schemas.microsoft.com/office/mac/drawingml/2011/main" xmlns="" val="1"/>
                 </a:ext>
               </a:extLst>
             </p:spPr>
@@ -10084,7 +10122,7 @@
           </a:ln>
           <a:extLst>
             <a:ext uri="{C572A759-6A51-4108-AA02-DFA0A04FC94B}">
-              <ma14:wrappingTextBoxFlag xmlns="" xmlns:ma14="http://schemas.microsoft.com/office/mac/drawingml/2011/main" val="1"/>
+              <ma14:wrappingTextBoxFlag xmlns:ma14="http://schemas.microsoft.com/office/mac/drawingml/2011/main" xmlns="" val="1"/>
             </a:ext>
           </a:extLst>
         </p:spPr>
@@ -10178,7 +10216,7 @@
           </a:ln>
           <a:extLst>
             <a:ext uri="{C572A759-6A51-4108-AA02-DFA0A04FC94B}">
-              <ma14:wrappingTextBoxFlag xmlns="" xmlns:ma14="http://schemas.microsoft.com/office/mac/drawingml/2011/main" val="1"/>
+              <ma14:wrappingTextBoxFlag xmlns:ma14="http://schemas.microsoft.com/office/mac/drawingml/2011/main" xmlns="" val="1"/>
             </a:ext>
           </a:extLst>
         </p:spPr>
@@ -10600,7 +10638,7 @@
           </a:ln>
           <a:extLst>
             <a:ext uri="{C572A759-6A51-4108-AA02-DFA0A04FC94B}">
-              <ma14:wrappingTextBoxFlag xmlns="" xmlns:ma14="http://schemas.microsoft.com/office/mac/drawingml/2011/main" val="1"/>
+              <ma14:wrappingTextBoxFlag xmlns:ma14="http://schemas.microsoft.com/office/mac/drawingml/2011/main" xmlns="" val="1"/>
             </a:ext>
           </a:extLst>
         </p:spPr>
@@ -10652,7 +10690,7 @@
           </a:ln>
           <a:extLst>
             <a:ext uri="{C572A759-6A51-4108-AA02-DFA0A04FC94B}">
-              <ma14:wrappingTextBoxFlag xmlns="" xmlns:ma14="http://schemas.microsoft.com/office/mac/drawingml/2011/main" val="1"/>
+              <ma14:wrappingTextBoxFlag xmlns:ma14="http://schemas.microsoft.com/office/mac/drawingml/2011/main" xmlns="" val="1"/>
             </a:ext>
           </a:extLst>
         </p:spPr>
@@ -11564,6 +11602,54 @@
               <a:rPr lang="en-US" sz="2900" dirty="0"/>
               <a:t>(TBC)</a:t>
             </a:r>
+          </a:p>
+        </p:txBody>
+      </p:sp>
+      <p:sp>
+        <p:nvSpPr>
+          <p:cNvPr id="134" name="Shape 248">
+            <a:extLst>
+              <a:ext uri="{FF2B5EF4-FFF2-40B4-BE49-F238E27FC236}">
+                <a16:creationId xmlns:a16="http://schemas.microsoft.com/office/drawing/2014/main" id="{9214EF80-EB54-2548-8428-81867880DB76}"/>
+              </a:ext>
+            </a:extLst>
+          </p:cNvPr>
+          <p:cNvSpPr/>
+          <p:nvPr/>
+        </p:nvSpPr>
+        <p:spPr>
+          <a:xfrm flipH="1">
+            <a:off x="3004617" y="16530868"/>
+            <a:ext cx="25773" cy="1402557"/>
+          </a:xfrm>
+          <a:prstGeom prst="line">
+            <a:avLst/>
+          </a:prstGeom>
+          <a:ln w="76200">
+            <a:solidFill/>
+            <a:headEnd type="triangle"/>
+          </a:ln>
+          <a:effectLst>
+            <a:outerShdw blurRad="38100" dist="20000" dir="5400000" rotWithShape="0">
+              <a:srgbClr val="000000">
+                <a:alpha val="38000"/>
+              </a:srgbClr>
+            </a:outerShdw>
+          </a:effectLst>
+        </p:spPr>
+        <p:txBody>
+          <a:bodyPr lIns="0" tIns="0" rIns="0" bIns="0"/>
+          <a:lstStyle/>
+          <a:p>
+            <a:pPr algn="ctr" defTabSz="457097">
+              <a:defRPr sz="1200">
+                <a:latin typeface="+mn-lt"/>
+                <a:ea typeface="+mn-ea"/>
+                <a:cs typeface="+mn-cs"/>
+                <a:sym typeface="Helvetica"/>
+              </a:defRPr>
+            </a:pPr>
+            <a:endParaRPr/>
           </a:p>
         </p:txBody>
       </p:sp>

</xml_diff>

<commit_message>
move BP to white space
</commit_message>
<xml_diff>
--- a/MoLOverviewPoster2018.pptx
+++ b/MoLOverviewPoster2018.pptx
@@ -2805,156 +2805,6 @@
           <a:chExt cx="0" cy="0"/>
         </a:xfrm>
       </p:grpSpPr>
-      <p:sp>
-        <p:nvSpPr>
-          <p:cNvPr id="48" name="Shape 48"/>
-          <p:cNvSpPr>
-            <a:spLocks noGrp="1"/>
-          </p:cNvSpPr>
-          <p:nvPr>
-            <p:ph type="title"/>
-          </p:nvPr>
-        </p:nvSpPr>
-        <p:spPr>
-          <a:xfrm>
-            <a:off x="26759186" y="390894"/>
-            <a:ext cx="11987193" cy="2625862"/>
-          </a:xfrm>
-          <a:prstGeom prst="roundRect">
-            <a:avLst>
-              <a:gd name="adj" fmla="val 1358"/>
-            </a:avLst>
-          </a:prstGeom>
-          <a:ln w="76200">
-            <a:noFill/>
-          </a:ln>
-        </p:spPr>
-        <p:style>
-          <a:lnRef idx="2">
-            <a:schemeClr val="dk1"/>
-          </a:lnRef>
-          <a:fillRef idx="1">
-            <a:schemeClr val="lt1"/>
-          </a:fillRef>
-          <a:effectRef idx="0">
-            <a:schemeClr val="dk1"/>
-          </a:effectRef>
-          <a:fontRef idx="minor">
-            <a:schemeClr val="dk1"/>
-          </a:fontRef>
-        </p:style>
-        <p:txBody>
-          <a:bodyPr>
-            <a:noAutofit/>
-          </a:bodyPr>
-          <a:lstStyle>
-            <a:lvl1pPr algn="l">
-              <a:defRPr sz="6000"/>
-            </a:lvl1pPr>
-          </a:lstStyle>
-          <a:p>
-            <a:pPr lvl="0">
-              <a:defRPr sz="1800"/>
-            </a:pPr>
-            <a:r>
-              <a:rPr sz="8000" dirty="0"/>
-              <a:t>Master of Logic 201</a:t>
-            </a:r>
-            <a:r>
-              <a:rPr lang="en-US" sz="8000" dirty="0"/>
-              <a:t>8</a:t>
-            </a:r>
-            <a:r>
-              <a:rPr sz="8000" dirty="0"/>
-              <a:t>/1</a:t>
-            </a:r>
-            <a:r>
-              <a:rPr lang="en-US" sz="8000" dirty="0"/>
-              <a:t>9</a:t>
-            </a:r>
-            <a:br>
-              <a:rPr lang="en-US" sz="8000" dirty="0"/>
-            </a:br>
-            <a:r>
-              <a:rPr lang="en-US" sz="2800" dirty="0">
-                <a:solidFill>
-                  <a:sysClr val="windowText" lastClr="000000"/>
-                </a:solidFill>
-                <a:latin typeface="Calibri"/>
-                <a:ea typeface="Calibri"/>
-                <a:cs typeface="Calibri"/>
-              </a:rPr>
-              <a:t>version</a:t>
-            </a:r>
-            <a:r>
-              <a:rPr lang="en-US" sz="2800">
-                <a:solidFill>
-                  <a:sysClr val="windowText" lastClr="000000"/>
-                </a:solidFill>
-                <a:latin typeface="Calibri"/>
-                <a:ea typeface="Calibri"/>
-                <a:cs typeface="Calibri"/>
-              </a:rPr>
-              <a:t>: 1 June 2018</a:t>
-            </a:r>
-            <a:r>
-              <a:rPr lang="en-US" sz="2800" dirty="0">
-                <a:solidFill>
-                  <a:sysClr val="windowText" lastClr="000000"/>
-                </a:solidFill>
-                <a:latin typeface="Calibri"/>
-                <a:ea typeface="Calibri"/>
-                <a:cs typeface="Calibri"/>
-              </a:rPr>
-              <a:t>: </a:t>
-            </a:r>
-            <a:br>
-              <a:rPr lang="en-US" sz="2800" dirty="0">
-                <a:solidFill>
-                  <a:sysClr val="windowText" lastClr="000000"/>
-                </a:solidFill>
-                <a:latin typeface="Calibri"/>
-                <a:ea typeface="Calibri"/>
-                <a:cs typeface="Calibri"/>
-              </a:rPr>
-            </a:br>
-            <a:r>
-              <a:rPr lang="en-US" sz="2800" dirty="0">
-                <a:solidFill>
-                  <a:sysClr val="windowText" lastClr="000000"/>
-                </a:solidFill>
-                <a:latin typeface="Calibri"/>
-                <a:ea typeface="Calibri"/>
-                <a:cs typeface="Calibri"/>
-                <a:hlinkClick r:id="rId3"/>
-              </a:rPr>
-              <a:t>https://github.com/cschaffner/MoLOverviewPoster</a:t>
-            </a:r>
-            <a:br>
-              <a:rPr lang="en-US" sz="2800" dirty="0">
-                <a:solidFill>
-                  <a:sysClr val="windowText" lastClr="000000"/>
-                </a:solidFill>
-                <a:latin typeface="Calibri"/>
-                <a:ea typeface="Calibri"/>
-                <a:cs typeface="Calibri"/>
-              </a:rPr>
-            </a:br>
-            <a:r>
-              <a:rPr lang="en-US" sz="2800" dirty="0">
-                <a:solidFill>
-                  <a:sysClr val="windowText" lastClr="000000"/>
-                </a:solidFill>
-                <a:latin typeface="Calibri"/>
-                <a:ea typeface="Calibri"/>
-                <a:cs typeface="Calibri"/>
-              </a:rPr>
-              <a:t>Suggestions and comments are welcome! </a:t>
-            </a:r>
-            <a:endParaRPr sz="9100" dirty="0"/>
-          </a:p>
-        </p:txBody>
-      </p:sp>
       <p:grpSp>
         <p:nvGrpSpPr>
           <p:cNvPr id="28" name="Group 27"/>
@@ -2964,9 +2814,9 @@
         <p:grpSpPr>
           <a:xfrm>
             <a:off x="308802" y="364830"/>
-            <a:ext cx="42330068" cy="29603654"/>
+            <a:ext cx="42310995" cy="29542094"/>
             <a:chOff x="1132722" y="281817"/>
-            <a:chExt cx="42330069" cy="29603653"/>
+            <a:chExt cx="42310996" cy="29542093"/>
           </a:xfrm>
         </p:grpSpPr>
         <p:sp>
@@ -3208,13 +3058,13 @@
           </p:nvSpPr>
           <p:spPr>
             <a:xfrm rot="16200000">
-              <a:off x="25793640" y="12216319"/>
-              <a:ext cx="11742805" cy="23595497"/>
+              <a:off x="25949484" y="12329676"/>
+              <a:ext cx="11392971" cy="23595497"/>
             </a:xfrm>
             <a:prstGeom prst="corner">
               <a:avLst>
-                <a:gd name="adj1" fmla="val 35903"/>
-                <a:gd name="adj2" fmla="val 73563"/>
+                <a:gd name="adj1" fmla="val 37010"/>
+                <a:gd name="adj2" fmla="val 74670"/>
               </a:avLst>
             </a:prstGeom>
             <a:solidFill>
@@ -3265,8 +3115,8 @@
           </p:nvSpPr>
           <p:spPr>
             <a:xfrm rot="10800000">
-              <a:off x="11843893" y="9976141"/>
-              <a:ext cx="22945172" cy="13928833"/>
+              <a:off x="11843892" y="9976140"/>
+              <a:ext cx="22945172" cy="14148692"/>
             </a:xfrm>
             <a:prstGeom prst="corner">
               <a:avLst>
@@ -3322,8 +3172,8 @@
           </p:nvSpPr>
           <p:spPr>
             <a:xfrm rot="16200000">
-              <a:off x="26151103" y="4375143"/>
-              <a:ext cx="18553787" cy="15548980"/>
+              <a:off x="25571817" y="3897090"/>
+              <a:ext cx="19712359" cy="15548980"/>
             </a:xfrm>
             <a:prstGeom prst="corner">
               <a:avLst>
@@ -3380,7 +3230,7 @@
         </p:nvSpPr>
         <p:spPr>
           <a:xfrm>
-            <a:off x="31667875" y="16038471"/>
+            <a:off x="31667875" y="16164595"/>
             <a:ext cx="6495403" cy="4984556"/>
           </a:xfrm>
           <a:prstGeom prst="roundRect">
@@ -3874,7 +3724,7 @@
         </p:nvSpPr>
         <p:spPr>
           <a:xfrm>
-            <a:off x="38511884" y="2234601"/>
+            <a:off x="38435170" y="1334973"/>
             <a:ext cx="3866684" cy="2828082"/>
           </a:xfrm>
           <a:prstGeom prst="rect">
@@ -4686,7 +4536,7 @@
         </p:nvSpPr>
         <p:spPr>
           <a:xfrm>
-            <a:off x="38282753" y="508314"/>
+            <a:off x="26525199" y="1116511"/>
             <a:ext cx="4110918" cy="2093607"/>
           </a:xfrm>
           <a:prstGeom prst="roundRect">
@@ -4778,7 +4628,7 @@
         </p:nvSpPr>
         <p:spPr>
           <a:xfrm>
-            <a:off x="38596611" y="25148194"/>
+            <a:off x="38873052" y="3404083"/>
             <a:ext cx="3240000" cy="3240000"/>
           </a:xfrm>
           <a:prstGeom prst="ellipse">
@@ -4858,853 +4708,838 @@
           </a:p>
         </p:txBody>
       </p:sp>
-      <p:grpSp>
-        <p:nvGrpSpPr>
-          <p:cNvPr id="9" name="Group 8"/>
-          <p:cNvGrpSpPr/>
+      <p:sp>
+        <p:nvSpPr>
+          <p:cNvPr id="82" name="Shape 82"/>
+          <p:cNvSpPr/>
           <p:nvPr/>
-        </p:nvGrpSpPr>
-        <p:grpSpPr>
+        </p:nvSpPr>
+        <p:spPr>
           <a:xfrm>
-            <a:off x="26896042" y="4354032"/>
-            <a:ext cx="15283151" cy="11294007"/>
-            <a:chOff x="26896042" y="4354032"/>
-            <a:chExt cx="15283151" cy="11294007"/>
+            <a:off x="38409413" y="15860807"/>
+            <a:ext cx="3829095" cy="2430000"/>
           </a:xfrm>
-        </p:grpSpPr>
-        <p:sp>
-          <p:nvSpPr>
-            <p:cNvPr id="82" name="Shape 82"/>
-            <p:cNvSpPr/>
-            <p:nvPr/>
-          </p:nvSpPr>
-          <p:spPr>
-            <a:xfrm>
-              <a:off x="38350098" y="13212804"/>
-              <a:ext cx="3829095" cy="2430000"/>
-            </a:xfrm>
-            <a:prstGeom prst="roundRect">
-              <a:avLst>
-                <a:gd name="adj" fmla="val 16667"/>
-              </a:avLst>
-            </a:prstGeom>
-            <a:gradFill flip="none" rotWithShape="1">
-              <a:gsLst>
-                <a:gs pos="0">
-                  <a:srgbClr val="C8B2E9"/>
-                </a:gs>
-                <a:gs pos="35000">
-                  <a:srgbClr val="D8C9EE"/>
-                </a:gs>
-                <a:gs pos="100000">
-                  <a:srgbClr val="F0EAF9"/>
-                </a:gs>
-              </a:gsLst>
-              <a:lin ang="16200000" scaled="0"/>
-            </a:gradFill>
-            <a:ln w="9525" cap="flat">
-              <a:solidFill>
-                <a:srgbClr val="7D60A0"/>
-              </a:solidFill>
-              <a:prstDash val="solid"/>
-              <a:bevel/>
-            </a:ln>
-            <a:effectLst>
-              <a:outerShdw blurRad="38100" dist="20000" dir="5400000" rotWithShape="0">
-                <a:srgbClr val="000000">
-                  <a:alpha val="38000"/>
-                </a:srgbClr>
-              </a:outerShdw>
-            </a:effectLst>
-          </p:spPr>
-          <p:txBody>
-            <a:bodyPr wrap="square" lIns="0" tIns="0" rIns="0" bIns="0" numCol="1" anchor="ctr">
-              <a:noAutofit/>
-            </a:bodyPr>
-            <a:lstStyle/>
-            <a:p>
-              <a:pPr algn="ctr"/>
-              <a:r>
-                <a:rPr lang="en-US" sz="2900" dirty="0"/>
-                <a:t>[</a:t>
-              </a:r>
-              <a:r>
-                <a:rPr lang="en-US" sz="2900" dirty="0" err="1"/>
-                <a:t>MScB&amp;CS</a:t>
-              </a:r>
-              <a:r>
-                <a:rPr lang="en-US" sz="2900" dirty="0"/>
-                <a:t>] </a:t>
-              </a:r>
-              <a:br>
-                <a:rPr lang="en-US" sz="2900" dirty="0"/>
-              </a:br>
-              <a:r>
-                <a:rPr lang="en-US" sz="2900" dirty="0"/>
-                <a:t>Seminar Combining Symbolic and Statistical Methods in AI </a:t>
-              </a:r>
-              <a:br>
-                <a:rPr lang="en-US" sz="2900" dirty="0"/>
-              </a:br>
-              <a:r>
-                <a:rPr lang="en-US" sz="2900" dirty="0"/>
-                <a:t>(van </a:t>
-              </a:r>
-              <a:r>
-                <a:rPr lang="en-US" sz="2900" dirty="0" err="1"/>
-                <a:t>Harmelen</a:t>
-              </a:r>
-              <a:r>
-                <a:rPr lang="en-US" sz="2900" dirty="0"/>
-                <a:t>)</a:t>
-              </a:r>
-            </a:p>
-          </p:txBody>
-        </p:sp>
-        <p:sp>
-          <p:nvSpPr>
-            <p:cNvPr id="109" name="Shape 109"/>
-            <p:cNvSpPr/>
-            <p:nvPr/>
-          </p:nvSpPr>
-          <p:spPr>
-            <a:xfrm>
-              <a:off x="38835849" y="4354032"/>
-              <a:ext cx="3276000" cy="2430000"/>
-            </a:xfrm>
-            <a:prstGeom prst="roundRect">
-              <a:avLst>
-                <a:gd name="adj" fmla="val 16667"/>
-              </a:avLst>
-            </a:prstGeom>
-            <a:gradFill flip="none" rotWithShape="1">
-              <a:gsLst>
-                <a:gs pos="0">
-                  <a:srgbClr val="DAFEA4"/>
-                </a:gs>
-                <a:gs pos="35000">
-                  <a:srgbClr val="E4FDBF"/>
-                </a:gs>
-                <a:gs pos="100000">
-                  <a:srgbClr val="F5FFE6"/>
-                </a:gs>
-              </a:gsLst>
-              <a:lin ang="16200000" scaled="0"/>
-            </a:gradFill>
-            <a:ln w="9525" cap="flat">
-              <a:solidFill>
-                <a:srgbClr val="98B955"/>
-              </a:solidFill>
-              <a:prstDash val="solid"/>
-              <a:bevel/>
-            </a:ln>
-            <a:effectLst>
-              <a:outerShdw blurRad="38100" dist="20000" dir="5400000" rotWithShape="0">
-                <a:srgbClr val="000000">
-                  <a:alpha val="38000"/>
-                </a:srgbClr>
-              </a:outerShdw>
-            </a:effectLst>
-          </p:spPr>
-          <p:txBody>
-            <a:bodyPr wrap="square" lIns="0" tIns="0" rIns="0" bIns="0" numCol="1" anchor="ctr">
-              <a:noAutofit/>
-            </a:bodyPr>
-            <a:lstStyle/>
-            <a:p>
-              <a:pPr lvl="0" algn="ctr">
-                <a:defRPr sz="1800"/>
-              </a:pPr>
-              <a:r>
-                <a:rPr lang="en-US" sz="2900" dirty="0"/>
-                <a:t>[</a:t>
-              </a:r>
-              <a:r>
-                <a:rPr lang="en-US" sz="2900" dirty="0" err="1"/>
-                <a:t>MScAI</a:t>
-              </a:r>
-              <a:r>
-                <a:rPr lang="en-US" sz="2900" dirty="0"/>
-                <a:t>]</a:t>
-              </a:r>
-              <a:br>
-                <a:rPr lang="en-US" sz="2900" dirty="0"/>
-              </a:br>
-              <a:r>
-                <a:rPr lang="en-US" sz="2900" dirty="0"/>
-                <a:t>Natural Language Processing 1 (</a:t>
-              </a:r>
-              <a:r>
-                <a:rPr lang="en-US" sz="2900" dirty="0" err="1"/>
-                <a:t>Shutova</a:t>
-              </a:r>
-              <a:r>
-                <a:rPr lang="en-US" sz="2900" dirty="0"/>
-                <a:t>)</a:t>
-              </a:r>
-            </a:p>
-          </p:txBody>
-        </p:sp>
-        <p:sp>
-          <p:nvSpPr>
-            <p:cNvPr id="127" name="Shape 127"/>
-            <p:cNvSpPr/>
-            <p:nvPr/>
-          </p:nvSpPr>
-          <p:spPr>
-            <a:xfrm>
-              <a:off x="34500505" y="10300960"/>
-              <a:ext cx="3276000" cy="2430000"/>
-            </a:xfrm>
-            <a:prstGeom prst="roundRect">
-              <a:avLst>
-                <a:gd name="adj" fmla="val 16667"/>
-              </a:avLst>
-            </a:prstGeom>
-            <a:gradFill flip="none" rotWithShape="1">
-              <a:gsLst>
-                <a:gs pos="0">
-                  <a:srgbClr val="DAFEA4"/>
-                </a:gs>
-                <a:gs pos="35000">
-                  <a:srgbClr val="E4FDBF"/>
-                </a:gs>
-                <a:gs pos="100000">
-                  <a:srgbClr val="F5FFE6"/>
-                </a:gs>
-              </a:gsLst>
-              <a:lin ang="16200000" scaled="0"/>
-            </a:gradFill>
-            <a:ln w="9525" cap="flat">
-              <a:solidFill>
-                <a:srgbClr val="98B955"/>
-              </a:solidFill>
-              <a:prstDash val="solid"/>
-              <a:bevel/>
-            </a:ln>
-            <a:effectLst>
-              <a:outerShdw blurRad="38100" dist="20000" dir="5400000" rotWithShape="0">
-                <a:srgbClr val="000000">
-                  <a:alpha val="38000"/>
-                </a:srgbClr>
-              </a:outerShdw>
-            </a:effectLst>
-          </p:spPr>
-          <p:txBody>
-            <a:bodyPr wrap="square" lIns="0" tIns="0" rIns="0" bIns="0" numCol="1" anchor="ctr">
-              <a:noAutofit/>
-            </a:bodyPr>
-            <a:lstStyle/>
-            <a:p>
-              <a:pPr lvl="0" algn="ctr">
-                <a:defRPr sz="1800"/>
-              </a:pPr>
-              <a:r>
-                <a:rPr lang="en-US" sz="2900" dirty="0"/>
-                <a:t>[</a:t>
-              </a:r>
-              <a:r>
-                <a:rPr lang="en-US" sz="2900" dirty="0" err="1"/>
-                <a:t>MScB&amp;CS</a:t>
-              </a:r>
-              <a:r>
-                <a:rPr lang="en-US" sz="2900" dirty="0"/>
-                <a:t>] Foundations of Neural and Cognitive Modelling </a:t>
-              </a:r>
-            </a:p>
-            <a:p>
-              <a:pPr lvl="0" algn="ctr">
-                <a:defRPr sz="1800"/>
-              </a:pPr>
-              <a:r>
-                <a:rPr lang="en-US" sz="2900" dirty="0"/>
-                <a:t>(</a:t>
-              </a:r>
-              <a:r>
-                <a:rPr lang="en-US" sz="2900" dirty="0" err="1"/>
-                <a:t>Zuidema</a:t>
-              </a:r>
-              <a:r>
-                <a:rPr lang="en-US" sz="2900" dirty="0"/>
-                <a:t>)</a:t>
-              </a:r>
-            </a:p>
-          </p:txBody>
-        </p:sp>
-        <p:sp>
-          <p:nvSpPr>
-            <p:cNvPr id="151" name="Shape 151"/>
-            <p:cNvSpPr/>
-            <p:nvPr/>
-          </p:nvSpPr>
-          <p:spPr>
-            <a:xfrm>
-              <a:off x="30574537" y="10276853"/>
-              <a:ext cx="3193199" cy="2430000"/>
-            </a:xfrm>
-            <a:prstGeom prst="roundRect">
-              <a:avLst>
-                <a:gd name="adj" fmla="val 16667"/>
-              </a:avLst>
-            </a:prstGeom>
-            <a:ln/>
-          </p:spPr>
-          <p:style>
-            <a:lnRef idx="1">
-              <a:schemeClr val="accent1"/>
-            </a:lnRef>
-            <a:fillRef idx="3">
-              <a:schemeClr val="accent1"/>
-            </a:fillRef>
-            <a:effectRef idx="2">
-              <a:schemeClr val="accent1"/>
-            </a:effectRef>
-            <a:fontRef idx="minor">
-              <a:schemeClr val="lt1"/>
-            </a:fontRef>
-          </p:style>
-          <p:txBody>
-            <a:bodyPr wrap="square" lIns="0" tIns="0" rIns="0" bIns="0" numCol="1" anchor="ctr">
-              <a:noAutofit/>
-            </a:bodyPr>
-            <a:lstStyle/>
-            <a:p>
-              <a:pPr algn="ctr"/>
-              <a:r>
-                <a:rPr lang="en-US" sz="2900" dirty="0">
-                  <a:solidFill>
-                    <a:schemeClr val="lt1"/>
-                  </a:solidFill>
-                  <a:latin typeface="Calibri" charset="0"/>
-                  <a:cs typeface="Calibri" charset="0"/>
-                </a:rPr>
-                <a:t>[</a:t>
-              </a:r>
-              <a:r>
-                <a:rPr lang="en-US" sz="2900" dirty="0" err="1">
-                  <a:solidFill>
-                    <a:schemeClr val="lt1"/>
-                  </a:solidFill>
-                  <a:latin typeface="Calibri" charset="0"/>
-                  <a:cs typeface="Calibri" charset="0"/>
-                </a:rPr>
-                <a:t>MoL</a:t>
-              </a:r>
-              <a:r>
-                <a:rPr lang="en-US" sz="2900" dirty="0">
-                  <a:solidFill>
-                    <a:schemeClr val="lt1"/>
-                  </a:solidFill>
-                  <a:latin typeface="Calibri" charset="0"/>
-                  <a:cs typeface="Calibri" charset="0"/>
-                </a:rPr>
-                <a:t>-FNWI] </a:t>
-              </a:r>
-              <a:br>
-                <a:rPr lang="en-US" sz="2900" dirty="0">
-                  <a:solidFill>
-                    <a:schemeClr val="lt1"/>
-                  </a:solidFill>
-                  <a:latin typeface="Calibri" charset="0"/>
-                  <a:cs typeface="Calibri" charset="0"/>
-                </a:rPr>
-              </a:br>
-              <a:r>
-                <a:rPr lang="en-US" sz="2900" dirty="0">
-                  <a:solidFill>
-                    <a:schemeClr val="lt1"/>
-                  </a:solidFill>
-                  <a:latin typeface="Calibri" charset="0"/>
-                  <a:cs typeface="Calibri" charset="0"/>
-                </a:rPr>
-                <a:t>Logical Methods in Cognitive Science (</a:t>
-              </a:r>
-              <a:r>
-                <a:rPr lang="en-US" sz="2900" dirty="0" err="1">
-                  <a:solidFill>
-                    <a:schemeClr val="lt1"/>
-                  </a:solidFill>
-                  <a:latin typeface="Calibri" charset="0"/>
-                  <a:cs typeface="Calibri" charset="0"/>
-                </a:rPr>
-                <a:t>Szymanik</a:t>
-              </a:r>
-              <a:r>
-                <a:rPr lang="en-US" sz="2900" dirty="0">
-                  <a:solidFill>
-                    <a:schemeClr val="lt1"/>
-                  </a:solidFill>
-                  <a:latin typeface="Calibri" charset="0"/>
-                  <a:cs typeface="Calibri" charset="0"/>
-                </a:rPr>
-                <a:t>)</a:t>
-              </a:r>
-            </a:p>
-          </p:txBody>
-        </p:sp>
-        <p:sp>
-          <p:nvSpPr>
-            <p:cNvPr id="166" name="Shape 166"/>
-            <p:cNvSpPr/>
-            <p:nvPr/>
-          </p:nvSpPr>
-          <p:spPr>
-            <a:xfrm>
-              <a:off x="30522548" y="13218039"/>
-              <a:ext cx="3276000" cy="2430000"/>
-            </a:xfrm>
-            <a:prstGeom prst="roundRect">
-              <a:avLst>
-                <a:gd name="adj" fmla="val 16667"/>
-              </a:avLst>
-            </a:prstGeom>
-            <a:gradFill flip="none" rotWithShape="1">
-              <a:gsLst>
-                <a:gs pos="0">
-                  <a:srgbClr val="C8B2E9"/>
-                </a:gs>
-                <a:gs pos="35000">
-                  <a:srgbClr val="D8C9EE"/>
-                </a:gs>
-                <a:gs pos="100000">
-                  <a:srgbClr val="F0EAF9"/>
-                </a:gs>
-              </a:gsLst>
-              <a:lin ang="16200000" scaled="0"/>
-            </a:gradFill>
-            <a:ln w="9525" cap="flat">
-              <a:solidFill>
-                <a:srgbClr val="7D60A0"/>
-              </a:solidFill>
-              <a:prstDash val="solid"/>
-              <a:bevel/>
-            </a:ln>
-            <a:effectLst>
-              <a:outerShdw blurRad="38100" dist="20000" dir="5400000" rotWithShape="0">
-                <a:srgbClr val="000000">
-                  <a:alpha val="38000"/>
-                </a:srgbClr>
-              </a:outerShdw>
-            </a:effectLst>
-          </p:spPr>
-          <p:txBody>
-            <a:bodyPr wrap="square" lIns="0" tIns="0" rIns="0" bIns="0" numCol="1" anchor="ctr">
-              <a:noAutofit/>
-            </a:bodyPr>
-            <a:lstStyle/>
-            <a:p>
-              <a:pPr lvl="0" algn="ctr">
-                <a:defRPr sz="1800"/>
-              </a:pPr>
-              <a:r>
-                <a:rPr lang="en-US" sz="2900" dirty="0"/>
-                <a:t>[</a:t>
-              </a:r>
-              <a:r>
-                <a:rPr lang="en-US" sz="2900" dirty="0" err="1"/>
-                <a:t>MScB&amp;CS</a:t>
-              </a:r>
-              <a:r>
-                <a:rPr lang="en-US" sz="2900" dirty="0"/>
-                <a:t>] Cognitive Models of Language and Music </a:t>
-              </a:r>
-            </a:p>
-            <a:p>
-              <a:pPr lvl="0" algn="ctr">
-                <a:defRPr sz="1800"/>
-              </a:pPr>
-              <a:r>
-                <a:rPr lang="en-US" sz="2900" dirty="0"/>
-                <a:t>(Lentz)</a:t>
-              </a:r>
-            </a:p>
-          </p:txBody>
-        </p:sp>
-        <p:sp>
-          <p:nvSpPr>
-            <p:cNvPr id="208" name="Shape 208"/>
-            <p:cNvSpPr/>
-            <p:nvPr/>
-          </p:nvSpPr>
-          <p:spPr>
-            <a:xfrm>
-              <a:off x="34519621" y="13218039"/>
-              <a:ext cx="3276000" cy="2430000"/>
-            </a:xfrm>
-            <a:prstGeom prst="roundRect">
-              <a:avLst>
-                <a:gd name="adj" fmla="val 16667"/>
-              </a:avLst>
-            </a:prstGeom>
-            <a:gradFill flip="none" rotWithShape="1">
-              <a:gsLst>
-                <a:gs pos="0">
-                  <a:srgbClr val="FFD1BB"/>
-                </a:gs>
-                <a:gs pos="35000">
-                  <a:srgbClr val="FFDECF"/>
-                </a:gs>
-                <a:gs pos="100000">
-                  <a:srgbClr val="FFF2ED"/>
-                </a:gs>
-              </a:gsLst>
-              <a:lin ang="16200000" scaled="0"/>
-            </a:gradFill>
-            <a:ln w="9525" cap="flat">
-              <a:solidFill>
-                <a:srgbClr val="F69240"/>
-              </a:solidFill>
-              <a:prstDash val="solid"/>
-              <a:bevel/>
-            </a:ln>
-            <a:effectLst>
-              <a:outerShdw blurRad="38100" dist="20000" dir="5400000" rotWithShape="0">
-                <a:srgbClr val="000000">
-                  <a:alpha val="38000"/>
-                </a:srgbClr>
-              </a:outerShdw>
-            </a:effectLst>
-          </p:spPr>
-          <p:txBody>
-            <a:bodyPr wrap="square" lIns="0" tIns="0" rIns="0" bIns="0" numCol="1" anchor="ctr">
-              <a:noAutofit/>
-            </a:bodyPr>
-            <a:lstStyle/>
-            <a:p>
-              <a:pPr lvl="0" algn="ctr">
-                <a:defRPr sz="1800"/>
-              </a:pPr>
-              <a:r>
-                <a:rPr lang="en-US" sz="2900" dirty="0"/>
-                <a:t>[</a:t>
-              </a:r>
-              <a:r>
-                <a:rPr lang="en-US" sz="2900" dirty="0" err="1"/>
-                <a:t>MScB&amp;CS</a:t>
-              </a:r>
-              <a:r>
-                <a:rPr lang="en-US" sz="2900" dirty="0"/>
-                <a:t>] </a:t>
-              </a:r>
-              <a:br>
-                <a:rPr lang="en-US" sz="2900" dirty="0"/>
-              </a:br>
-              <a:r>
-                <a:rPr lang="en-US" sz="2900" dirty="0"/>
-                <a:t>How Music Works: Music Cognition (Honing)</a:t>
-              </a:r>
-            </a:p>
-          </p:txBody>
-        </p:sp>
-        <p:sp>
-          <p:nvSpPr>
-            <p:cNvPr id="135" name="Shape 85"/>
-            <p:cNvSpPr/>
-            <p:nvPr/>
-          </p:nvSpPr>
-          <p:spPr>
-            <a:xfrm>
-              <a:off x="27064299" y="13218039"/>
-              <a:ext cx="3276000" cy="2430000"/>
-            </a:xfrm>
-            <a:prstGeom prst="roundRect">
-              <a:avLst>
-                <a:gd name="adj" fmla="val 16667"/>
-              </a:avLst>
-            </a:prstGeom>
-            <a:ln/>
-          </p:spPr>
-          <p:style>
-            <a:lnRef idx="1">
-              <a:schemeClr val="accent1"/>
-            </a:lnRef>
-            <a:fillRef idx="3">
-              <a:schemeClr val="accent1"/>
-            </a:fillRef>
-            <a:effectRef idx="2">
-              <a:schemeClr val="accent1"/>
-            </a:effectRef>
-            <a:fontRef idx="minor">
-              <a:schemeClr val="lt1"/>
-            </a:fontRef>
-          </p:style>
-          <p:txBody>
-            <a:bodyPr wrap="square" lIns="0" tIns="0" rIns="0" bIns="0" numCol="1" anchor="ctr">
-              <a:noAutofit/>
-            </a:bodyPr>
-            <a:lstStyle/>
-            <a:p>
-              <a:pPr algn="ctr"/>
-              <a:r>
-                <a:rPr lang="en-US" sz="2900" dirty="0">
-                  <a:solidFill>
-                    <a:schemeClr val="lt1"/>
-                  </a:solidFill>
-                  <a:latin typeface="Calibri" charset="0"/>
-                  <a:cs typeface="Calibri" charset="0"/>
-                </a:rPr>
-                <a:t>[</a:t>
-              </a:r>
-              <a:r>
-                <a:rPr lang="en-US" sz="2900" dirty="0" err="1">
-                  <a:solidFill>
-                    <a:schemeClr val="lt1"/>
-                  </a:solidFill>
-                  <a:latin typeface="Calibri" charset="0"/>
-                  <a:cs typeface="Calibri" charset="0"/>
-                </a:rPr>
-                <a:t>MoL</a:t>
-              </a:r>
-              <a:r>
-                <a:rPr lang="en-US" sz="2900" dirty="0">
-                  <a:solidFill>
-                    <a:schemeClr val="lt1"/>
-                  </a:solidFill>
-                  <a:latin typeface="Calibri" charset="0"/>
-                  <a:cs typeface="Calibri" charset="0"/>
-                </a:rPr>
-                <a:t>-FNWI] Computational Semantics and Pragmatics (Fernandez)</a:t>
-              </a:r>
-            </a:p>
-          </p:txBody>
-        </p:sp>
-        <p:sp>
-          <p:nvSpPr>
-            <p:cNvPr id="196" name="Shape 196"/>
-            <p:cNvSpPr/>
-            <p:nvPr/>
-          </p:nvSpPr>
-          <p:spPr>
-            <a:xfrm>
-              <a:off x="38835849" y="10299806"/>
-              <a:ext cx="3276000" cy="2430000"/>
-            </a:xfrm>
-            <a:prstGeom prst="roundRect">
-              <a:avLst>
-                <a:gd name="adj" fmla="val 16667"/>
-              </a:avLst>
-            </a:prstGeom>
-            <a:gradFill flip="none" rotWithShape="1">
-              <a:gsLst>
-                <a:gs pos="0">
-                  <a:srgbClr val="FFD1BB"/>
-                </a:gs>
-                <a:gs pos="35000">
-                  <a:srgbClr val="FFDECF"/>
-                </a:gs>
-                <a:gs pos="100000">
-                  <a:srgbClr val="FFF2ED"/>
-                </a:gs>
-              </a:gsLst>
-              <a:lin ang="16200000" scaled="0"/>
-            </a:gradFill>
-            <a:ln w="9525" cap="flat">
-              <a:solidFill>
-                <a:srgbClr val="F69240"/>
-              </a:solidFill>
-              <a:prstDash val="solid"/>
-              <a:bevel/>
-            </a:ln>
-            <a:effectLst>
-              <a:outerShdw blurRad="38100" dist="20000" dir="5400000" rotWithShape="0">
-                <a:srgbClr val="000000">
-                  <a:alpha val="38000"/>
-                </a:srgbClr>
-              </a:outerShdw>
-            </a:effectLst>
-          </p:spPr>
-          <p:txBody>
-            <a:bodyPr wrap="square" lIns="0" tIns="0" rIns="0" bIns="0" numCol="1" anchor="ctr">
-              <a:noAutofit/>
-            </a:bodyPr>
-            <a:lstStyle/>
-            <a:p>
-              <a:pPr lvl="0" algn="ctr">
-                <a:defRPr sz="1800"/>
-              </a:pPr>
-              <a:r>
-                <a:rPr lang="en-US" sz="2900" dirty="0"/>
-                <a:t>[</a:t>
-              </a:r>
-              <a:r>
-                <a:rPr lang="en-US" sz="2900" dirty="0" err="1"/>
-                <a:t>MScAI</a:t>
-              </a:r>
-              <a:r>
-                <a:rPr lang="en-US" sz="2900" dirty="0"/>
-                <a:t>] </a:t>
-              </a:r>
-              <a:br>
-                <a:rPr lang="en-US" sz="2900" dirty="0"/>
-              </a:br>
-              <a:r>
-                <a:rPr lang="en-US" sz="2900" dirty="0"/>
-                <a:t>Statistical Methods for Natural Language Semantics</a:t>
-              </a:r>
-              <a:br>
-                <a:rPr lang="en-US" sz="2900" dirty="0"/>
-              </a:br>
-              <a:r>
-                <a:rPr lang="en-US" sz="2900" dirty="0"/>
-                <a:t>(</a:t>
-              </a:r>
-              <a:r>
-                <a:rPr lang="en-US" sz="2900" dirty="0" err="1"/>
-                <a:t>Shutova</a:t>
-              </a:r>
-              <a:r>
-                <a:rPr lang="en-US" sz="2900" dirty="0"/>
-                <a:t>)</a:t>
-              </a:r>
-            </a:p>
-          </p:txBody>
-        </p:sp>
-        <p:sp>
-          <p:nvSpPr>
-            <p:cNvPr id="199" name="Shape 199"/>
-            <p:cNvSpPr/>
-            <p:nvPr/>
-          </p:nvSpPr>
-          <p:spPr>
-            <a:xfrm>
-              <a:off x="38503340" y="7599371"/>
-              <a:ext cx="3118829" cy="2430000"/>
-            </a:xfrm>
-            <a:prstGeom prst="roundRect">
-              <a:avLst>
-                <a:gd name="adj" fmla="val 16667"/>
-              </a:avLst>
-            </a:prstGeom>
-            <a:gradFill flip="none" rotWithShape="1">
-              <a:gsLst>
-                <a:gs pos="0">
-                  <a:srgbClr val="FFD1BB"/>
-                </a:gs>
-                <a:gs pos="35000">
-                  <a:srgbClr val="FFDECF"/>
-                </a:gs>
-                <a:gs pos="100000">
-                  <a:srgbClr val="FFF2ED"/>
-                </a:gs>
-              </a:gsLst>
-              <a:lin ang="16200000" scaled="0"/>
-            </a:gradFill>
-            <a:ln w="9525" cap="flat">
-              <a:solidFill>
-                <a:srgbClr val="F69240"/>
-              </a:solidFill>
-              <a:prstDash val="solid"/>
-              <a:bevel/>
-            </a:ln>
-            <a:effectLst>
-              <a:outerShdw blurRad="38100" dist="20000" dir="5400000" rotWithShape="0">
-                <a:srgbClr val="000000">
-                  <a:alpha val="38000"/>
-                </a:srgbClr>
-              </a:outerShdw>
-            </a:effectLst>
-          </p:spPr>
-          <p:txBody>
-            <a:bodyPr wrap="square" lIns="0" tIns="0" rIns="0" bIns="0" numCol="1" anchor="ctr">
-              <a:noAutofit/>
-            </a:bodyPr>
-            <a:lstStyle/>
-            <a:p>
-              <a:pPr lvl="0" algn="ctr">
-                <a:defRPr sz="1800"/>
-              </a:pPr>
-              <a:r>
-                <a:rPr lang="en-US" sz="2900" dirty="0"/>
-                <a:t>[</a:t>
-              </a:r>
-              <a:r>
-                <a:rPr lang="en-US" sz="2900" dirty="0" err="1"/>
-                <a:t>MScAI</a:t>
-              </a:r>
-              <a:r>
-                <a:rPr lang="en-US" sz="2900" dirty="0"/>
-                <a:t>] </a:t>
-              </a:r>
-              <a:br>
-                <a:rPr lang="en-US" sz="2900" dirty="0"/>
-              </a:br>
-              <a:r>
-                <a:rPr lang="en-US" sz="2900" dirty="0"/>
-                <a:t>Natural Language Processing 2 (Sima'an)</a:t>
-              </a:r>
-            </a:p>
-          </p:txBody>
-        </p:sp>
-        <p:sp>
-          <p:nvSpPr>
-            <p:cNvPr id="204" name="Shape 127"/>
-            <p:cNvSpPr/>
-            <p:nvPr/>
-          </p:nvSpPr>
-          <p:spPr>
-            <a:xfrm>
-              <a:off x="26896042" y="10272584"/>
-              <a:ext cx="3276000" cy="2430000"/>
-            </a:xfrm>
-            <a:prstGeom prst="roundRect">
-              <a:avLst>
-                <a:gd name="adj" fmla="val 16667"/>
-              </a:avLst>
-            </a:prstGeom>
-            <a:gradFill flip="none" rotWithShape="1">
-              <a:gsLst>
-                <a:gs pos="0">
-                  <a:srgbClr val="DAFEA4"/>
-                </a:gs>
-                <a:gs pos="35000">
-                  <a:srgbClr val="E4FDBF"/>
-                </a:gs>
-                <a:gs pos="100000">
-                  <a:srgbClr val="F5FFE6"/>
-                </a:gs>
-              </a:gsLst>
-              <a:lin ang="16200000" scaled="0"/>
-            </a:gradFill>
-            <a:ln w="9525" cap="flat">
-              <a:solidFill>
-                <a:srgbClr val="98B955"/>
-              </a:solidFill>
-              <a:prstDash val="solid"/>
-              <a:bevel/>
-            </a:ln>
-            <a:effectLst>
-              <a:outerShdw blurRad="38100" dist="20000" dir="5400000" rotWithShape="0">
-                <a:srgbClr val="000000">
-                  <a:alpha val="38000"/>
-                </a:srgbClr>
-              </a:outerShdw>
-            </a:effectLst>
-          </p:spPr>
-          <p:txBody>
-            <a:bodyPr wrap="square" lIns="0" tIns="0" rIns="0" bIns="0" numCol="1" anchor="ctr">
-              <a:noAutofit/>
-            </a:bodyPr>
-            <a:lstStyle/>
-            <a:p>
-              <a:pPr lvl="0" algn="ctr">
-                <a:defRPr sz="1800"/>
-              </a:pPr>
-              <a:r>
-                <a:rPr lang="en-US" sz="2900" dirty="0"/>
-                <a:t>[</a:t>
-              </a:r>
-              <a:r>
-                <a:rPr lang="en-US" sz="2900" dirty="0" err="1"/>
-                <a:t>MScB&amp;CS</a:t>
-              </a:r>
-              <a:r>
-                <a:rPr lang="en-US" sz="2900" dirty="0"/>
-                <a:t>]  Cognition and Language Development (Schaeffer)</a:t>
-              </a:r>
-            </a:p>
-          </p:txBody>
-        </p:sp>
-      </p:grpSp>
+          <a:prstGeom prst="roundRect">
+            <a:avLst>
+              <a:gd name="adj" fmla="val 16667"/>
+            </a:avLst>
+          </a:prstGeom>
+          <a:gradFill flip="none" rotWithShape="1">
+            <a:gsLst>
+              <a:gs pos="0">
+                <a:srgbClr val="C8B2E9"/>
+              </a:gs>
+              <a:gs pos="35000">
+                <a:srgbClr val="D8C9EE"/>
+              </a:gs>
+              <a:gs pos="100000">
+                <a:srgbClr val="F0EAF9"/>
+              </a:gs>
+            </a:gsLst>
+            <a:lin ang="16200000" scaled="0"/>
+          </a:gradFill>
+          <a:ln w="9525" cap="flat">
+            <a:solidFill>
+              <a:srgbClr val="7D60A0"/>
+            </a:solidFill>
+            <a:prstDash val="solid"/>
+            <a:bevel/>
+          </a:ln>
+          <a:effectLst>
+            <a:outerShdw blurRad="38100" dist="20000" dir="5400000" rotWithShape="0">
+              <a:srgbClr val="000000">
+                <a:alpha val="38000"/>
+              </a:srgbClr>
+            </a:outerShdw>
+          </a:effectLst>
+        </p:spPr>
+        <p:txBody>
+          <a:bodyPr wrap="square" lIns="0" tIns="0" rIns="0" bIns="0" numCol="1" anchor="ctr">
+            <a:noAutofit/>
+          </a:bodyPr>
+          <a:lstStyle/>
+          <a:p>
+            <a:pPr algn="ctr"/>
+            <a:r>
+              <a:rPr lang="en-US" sz="2900" dirty="0"/>
+              <a:t>[</a:t>
+            </a:r>
+            <a:r>
+              <a:rPr lang="en-US" sz="2900" dirty="0" err="1"/>
+              <a:t>MScB&amp;CS</a:t>
+            </a:r>
+            <a:r>
+              <a:rPr lang="en-US" sz="2900" dirty="0"/>
+              <a:t>] </a:t>
+            </a:r>
+            <a:br>
+              <a:rPr lang="en-US" sz="2900" dirty="0"/>
+            </a:br>
+            <a:r>
+              <a:rPr lang="en-US" sz="2900" dirty="0"/>
+              <a:t>Seminar Combining Symbolic and Statistical Methods in AI </a:t>
+            </a:r>
+            <a:br>
+              <a:rPr lang="en-US" sz="2900" dirty="0"/>
+            </a:br>
+            <a:r>
+              <a:rPr lang="en-US" sz="2900" dirty="0"/>
+              <a:t>(van </a:t>
+            </a:r>
+            <a:r>
+              <a:rPr lang="en-US" sz="2900" dirty="0" err="1"/>
+              <a:t>Harmelen</a:t>
+            </a:r>
+            <a:r>
+              <a:rPr lang="en-US" sz="2900" dirty="0"/>
+              <a:t>)</a:t>
+            </a:r>
+          </a:p>
+        </p:txBody>
+      </p:sp>
+      <p:sp>
+        <p:nvSpPr>
+          <p:cNvPr id="109" name="Shape 109"/>
+          <p:cNvSpPr/>
+          <p:nvPr/>
+        </p:nvSpPr>
+        <p:spPr>
+          <a:xfrm>
+            <a:off x="38835849" y="7004554"/>
+            <a:ext cx="3276000" cy="2430000"/>
+          </a:xfrm>
+          <a:prstGeom prst="roundRect">
+            <a:avLst>
+              <a:gd name="adj" fmla="val 16667"/>
+            </a:avLst>
+          </a:prstGeom>
+          <a:gradFill flip="none" rotWithShape="1">
+            <a:gsLst>
+              <a:gs pos="0">
+                <a:srgbClr val="DAFEA4"/>
+              </a:gs>
+              <a:gs pos="35000">
+                <a:srgbClr val="E4FDBF"/>
+              </a:gs>
+              <a:gs pos="100000">
+                <a:srgbClr val="F5FFE6"/>
+              </a:gs>
+            </a:gsLst>
+            <a:lin ang="16200000" scaled="0"/>
+          </a:gradFill>
+          <a:ln w="9525" cap="flat">
+            <a:solidFill>
+              <a:srgbClr val="98B955"/>
+            </a:solidFill>
+            <a:prstDash val="solid"/>
+            <a:bevel/>
+          </a:ln>
+          <a:effectLst>
+            <a:outerShdw blurRad="38100" dist="20000" dir="5400000" rotWithShape="0">
+              <a:srgbClr val="000000">
+                <a:alpha val="38000"/>
+              </a:srgbClr>
+            </a:outerShdw>
+          </a:effectLst>
+        </p:spPr>
+        <p:txBody>
+          <a:bodyPr wrap="square" lIns="0" tIns="0" rIns="0" bIns="0" numCol="1" anchor="ctr">
+            <a:noAutofit/>
+          </a:bodyPr>
+          <a:lstStyle/>
+          <a:p>
+            <a:pPr lvl="0" algn="ctr">
+              <a:defRPr sz="1800"/>
+            </a:pPr>
+            <a:r>
+              <a:rPr lang="en-US" sz="2900" dirty="0"/>
+              <a:t>[</a:t>
+            </a:r>
+            <a:r>
+              <a:rPr lang="en-US" sz="2900" dirty="0" err="1"/>
+              <a:t>MScAI</a:t>
+            </a:r>
+            <a:r>
+              <a:rPr lang="en-US" sz="2900" dirty="0"/>
+              <a:t>]</a:t>
+            </a:r>
+            <a:br>
+              <a:rPr lang="en-US" sz="2900" dirty="0"/>
+            </a:br>
+            <a:r>
+              <a:rPr lang="en-US" sz="2900" dirty="0"/>
+              <a:t>Natural Language Processing 1 (</a:t>
+            </a:r>
+            <a:r>
+              <a:rPr lang="en-US" sz="2900" dirty="0" err="1"/>
+              <a:t>Shutova</a:t>
+            </a:r>
+            <a:r>
+              <a:rPr lang="en-US" sz="2900" dirty="0"/>
+              <a:t>)</a:t>
+            </a:r>
+          </a:p>
+        </p:txBody>
+      </p:sp>
+      <p:sp>
+        <p:nvSpPr>
+          <p:cNvPr id="127" name="Shape 127"/>
+          <p:cNvSpPr/>
+          <p:nvPr/>
+        </p:nvSpPr>
+        <p:spPr>
+          <a:xfrm>
+            <a:off x="34500505" y="10300960"/>
+            <a:ext cx="3276000" cy="2430000"/>
+          </a:xfrm>
+          <a:prstGeom prst="roundRect">
+            <a:avLst>
+              <a:gd name="adj" fmla="val 16667"/>
+            </a:avLst>
+          </a:prstGeom>
+          <a:gradFill flip="none" rotWithShape="1">
+            <a:gsLst>
+              <a:gs pos="0">
+                <a:srgbClr val="DAFEA4"/>
+              </a:gs>
+              <a:gs pos="35000">
+                <a:srgbClr val="E4FDBF"/>
+              </a:gs>
+              <a:gs pos="100000">
+                <a:srgbClr val="F5FFE6"/>
+              </a:gs>
+            </a:gsLst>
+            <a:lin ang="16200000" scaled="0"/>
+          </a:gradFill>
+          <a:ln w="9525" cap="flat">
+            <a:solidFill>
+              <a:srgbClr val="98B955"/>
+            </a:solidFill>
+            <a:prstDash val="solid"/>
+            <a:bevel/>
+          </a:ln>
+          <a:effectLst>
+            <a:outerShdw blurRad="38100" dist="20000" dir="5400000" rotWithShape="0">
+              <a:srgbClr val="000000">
+                <a:alpha val="38000"/>
+              </a:srgbClr>
+            </a:outerShdw>
+          </a:effectLst>
+        </p:spPr>
+        <p:txBody>
+          <a:bodyPr wrap="square" lIns="0" tIns="0" rIns="0" bIns="0" numCol="1" anchor="ctr">
+            <a:noAutofit/>
+          </a:bodyPr>
+          <a:lstStyle/>
+          <a:p>
+            <a:pPr lvl="0" algn="ctr">
+              <a:defRPr sz="1800"/>
+            </a:pPr>
+            <a:r>
+              <a:rPr lang="en-US" sz="2900" dirty="0"/>
+              <a:t>[</a:t>
+            </a:r>
+            <a:r>
+              <a:rPr lang="en-US" sz="2900" dirty="0" err="1"/>
+              <a:t>MScB&amp;CS</a:t>
+            </a:r>
+            <a:r>
+              <a:rPr lang="en-US" sz="2900" dirty="0"/>
+              <a:t>] Foundations of Neural and Cognitive Modelling </a:t>
+            </a:r>
+          </a:p>
+          <a:p>
+            <a:pPr lvl="0" algn="ctr">
+              <a:defRPr sz="1800"/>
+            </a:pPr>
+            <a:r>
+              <a:rPr lang="en-US" sz="2900" dirty="0"/>
+              <a:t>(</a:t>
+            </a:r>
+            <a:r>
+              <a:rPr lang="en-US" sz="2900" dirty="0" err="1"/>
+              <a:t>Zuidema</a:t>
+            </a:r>
+            <a:r>
+              <a:rPr lang="en-US" sz="2900" dirty="0"/>
+              <a:t>)</a:t>
+            </a:r>
+          </a:p>
+        </p:txBody>
+      </p:sp>
+      <p:sp>
+        <p:nvSpPr>
+          <p:cNvPr id="151" name="Shape 151"/>
+          <p:cNvSpPr/>
+          <p:nvPr/>
+        </p:nvSpPr>
+        <p:spPr>
+          <a:xfrm>
+            <a:off x="30539815" y="10435498"/>
+            <a:ext cx="3193199" cy="2430000"/>
+          </a:xfrm>
+          <a:prstGeom prst="roundRect">
+            <a:avLst>
+              <a:gd name="adj" fmla="val 16667"/>
+            </a:avLst>
+          </a:prstGeom>
+          <a:ln/>
+        </p:spPr>
+        <p:style>
+          <a:lnRef idx="1">
+            <a:schemeClr val="accent1"/>
+          </a:lnRef>
+          <a:fillRef idx="3">
+            <a:schemeClr val="accent1"/>
+          </a:fillRef>
+          <a:effectRef idx="2">
+            <a:schemeClr val="accent1"/>
+          </a:effectRef>
+          <a:fontRef idx="minor">
+            <a:schemeClr val="lt1"/>
+          </a:fontRef>
+        </p:style>
+        <p:txBody>
+          <a:bodyPr wrap="square" lIns="0" tIns="0" rIns="0" bIns="0" numCol="1" anchor="ctr">
+            <a:noAutofit/>
+          </a:bodyPr>
+          <a:lstStyle/>
+          <a:p>
+            <a:pPr algn="ctr"/>
+            <a:r>
+              <a:rPr lang="en-US" sz="2900" dirty="0">
+                <a:solidFill>
+                  <a:schemeClr val="lt1"/>
+                </a:solidFill>
+                <a:latin typeface="Calibri" charset="0"/>
+                <a:cs typeface="Calibri" charset="0"/>
+              </a:rPr>
+              <a:t>[</a:t>
+            </a:r>
+            <a:r>
+              <a:rPr lang="en-US" sz="2900" dirty="0" err="1">
+                <a:solidFill>
+                  <a:schemeClr val="lt1"/>
+                </a:solidFill>
+                <a:latin typeface="Calibri" charset="0"/>
+                <a:cs typeface="Calibri" charset="0"/>
+              </a:rPr>
+              <a:t>MoL</a:t>
+            </a:r>
+            <a:r>
+              <a:rPr lang="en-US" sz="2900" dirty="0">
+                <a:solidFill>
+                  <a:schemeClr val="lt1"/>
+                </a:solidFill>
+                <a:latin typeface="Calibri" charset="0"/>
+                <a:cs typeface="Calibri" charset="0"/>
+              </a:rPr>
+              <a:t>-FNWI] </a:t>
+            </a:r>
+            <a:br>
+              <a:rPr lang="en-US" sz="2900" dirty="0">
+                <a:solidFill>
+                  <a:schemeClr val="lt1"/>
+                </a:solidFill>
+                <a:latin typeface="Calibri" charset="0"/>
+                <a:cs typeface="Calibri" charset="0"/>
+              </a:rPr>
+            </a:br>
+            <a:r>
+              <a:rPr lang="en-US" sz="2900" dirty="0">
+                <a:solidFill>
+                  <a:schemeClr val="lt1"/>
+                </a:solidFill>
+                <a:latin typeface="Calibri" charset="0"/>
+                <a:cs typeface="Calibri" charset="0"/>
+              </a:rPr>
+              <a:t>Logical Methods in Cognitive Science (</a:t>
+            </a:r>
+            <a:r>
+              <a:rPr lang="en-US" sz="2900" dirty="0" err="1">
+                <a:solidFill>
+                  <a:schemeClr val="lt1"/>
+                </a:solidFill>
+                <a:latin typeface="Calibri" charset="0"/>
+                <a:cs typeface="Calibri" charset="0"/>
+              </a:rPr>
+              <a:t>Szymanik</a:t>
+            </a:r>
+            <a:r>
+              <a:rPr lang="en-US" sz="2900" dirty="0">
+                <a:solidFill>
+                  <a:schemeClr val="lt1"/>
+                </a:solidFill>
+                <a:latin typeface="Calibri" charset="0"/>
+                <a:cs typeface="Calibri" charset="0"/>
+              </a:rPr>
+              <a:t>)</a:t>
+            </a:r>
+          </a:p>
+        </p:txBody>
+      </p:sp>
+      <p:sp>
+        <p:nvSpPr>
+          <p:cNvPr id="166" name="Shape 166"/>
+          <p:cNvSpPr/>
+          <p:nvPr/>
+        </p:nvSpPr>
+        <p:spPr>
+          <a:xfrm>
+            <a:off x="30522548" y="13218039"/>
+            <a:ext cx="3276000" cy="2430000"/>
+          </a:xfrm>
+          <a:prstGeom prst="roundRect">
+            <a:avLst>
+              <a:gd name="adj" fmla="val 16667"/>
+            </a:avLst>
+          </a:prstGeom>
+          <a:gradFill flip="none" rotWithShape="1">
+            <a:gsLst>
+              <a:gs pos="0">
+                <a:srgbClr val="C8B2E9"/>
+              </a:gs>
+              <a:gs pos="35000">
+                <a:srgbClr val="D8C9EE"/>
+              </a:gs>
+              <a:gs pos="100000">
+                <a:srgbClr val="F0EAF9"/>
+              </a:gs>
+            </a:gsLst>
+            <a:lin ang="16200000" scaled="0"/>
+          </a:gradFill>
+          <a:ln w="9525" cap="flat">
+            <a:solidFill>
+              <a:srgbClr val="7D60A0"/>
+            </a:solidFill>
+            <a:prstDash val="solid"/>
+            <a:bevel/>
+          </a:ln>
+          <a:effectLst>
+            <a:outerShdw blurRad="38100" dist="20000" dir="5400000" rotWithShape="0">
+              <a:srgbClr val="000000">
+                <a:alpha val="38000"/>
+              </a:srgbClr>
+            </a:outerShdw>
+          </a:effectLst>
+        </p:spPr>
+        <p:txBody>
+          <a:bodyPr wrap="square" lIns="0" tIns="0" rIns="0" bIns="0" numCol="1" anchor="ctr">
+            <a:noAutofit/>
+          </a:bodyPr>
+          <a:lstStyle/>
+          <a:p>
+            <a:pPr lvl="0" algn="ctr">
+              <a:defRPr sz="1800"/>
+            </a:pPr>
+            <a:r>
+              <a:rPr lang="en-US" sz="2900" dirty="0"/>
+              <a:t>[</a:t>
+            </a:r>
+            <a:r>
+              <a:rPr lang="en-US" sz="2900" dirty="0" err="1"/>
+              <a:t>MScB&amp;CS</a:t>
+            </a:r>
+            <a:r>
+              <a:rPr lang="en-US" sz="2900" dirty="0"/>
+              <a:t>] Cognitive Models of Language and Music </a:t>
+            </a:r>
+          </a:p>
+          <a:p>
+            <a:pPr lvl="0" algn="ctr">
+              <a:defRPr sz="1800"/>
+            </a:pPr>
+            <a:r>
+              <a:rPr lang="en-US" sz="2900" dirty="0"/>
+              <a:t>(Lentz)</a:t>
+            </a:r>
+          </a:p>
+        </p:txBody>
+      </p:sp>
+      <p:sp>
+        <p:nvSpPr>
+          <p:cNvPr id="208" name="Shape 208"/>
+          <p:cNvSpPr/>
+          <p:nvPr/>
+        </p:nvSpPr>
+        <p:spPr>
+          <a:xfrm>
+            <a:off x="34519621" y="13218039"/>
+            <a:ext cx="3276000" cy="2430000"/>
+          </a:xfrm>
+          <a:prstGeom prst="roundRect">
+            <a:avLst>
+              <a:gd name="adj" fmla="val 16667"/>
+            </a:avLst>
+          </a:prstGeom>
+          <a:gradFill flip="none" rotWithShape="1">
+            <a:gsLst>
+              <a:gs pos="0">
+                <a:srgbClr val="FFD1BB"/>
+              </a:gs>
+              <a:gs pos="35000">
+                <a:srgbClr val="FFDECF"/>
+              </a:gs>
+              <a:gs pos="100000">
+                <a:srgbClr val="FFF2ED"/>
+              </a:gs>
+            </a:gsLst>
+            <a:lin ang="16200000" scaled="0"/>
+          </a:gradFill>
+          <a:ln w="9525" cap="flat">
+            <a:solidFill>
+              <a:srgbClr val="F69240"/>
+            </a:solidFill>
+            <a:prstDash val="solid"/>
+            <a:bevel/>
+          </a:ln>
+          <a:effectLst>
+            <a:outerShdw blurRad="38100" dist="20000" dir="5400000" rotWithShape="0">
+              <a:srgbClr val="000000">
+                <a:alpha val="38000"/>
+              </a:srgbClr>
+            </a:outerShdw>
+          </a:effectLst>
+        </p:spPr>
+        <p:txBody>
+          <a:bodyPr wrap="square" lIns="0" tIns="0" rIns="0" bIns="0" numCol="1" anchor="ctr">
+            <a:noAutofit/>
+          </a:bodyPr>
+          <a:lstStyle/>
+          <a:p>
+            <a:pPr lvl="0" algn="ctr">
+              <a:defRPr sz="1800"/>
+            </a:pPr>
+            <a:r>
+              <a:rPr lang="en-US" sz="2900" dirty="0"/>
+              <a:t>[</a:t>
+            </a:r>
+            <a:r>
+              <a:rPr lang="en-US" sz="2900" dirty="0" err="1"/>
+              <a:t>MScB&amp;CS</a:t>
+            </a:r>
+            <a:r>
+              <a:rPr lang="en-US" sz="2900" dirty="0"/>
+              <a:t>] </a:t>
+            </a:r>
+            <a:br>
+              <a:rPr lang="en-US" sz="2900" dirty="0"/>
+            </a:br>
+            <a:r>
+              <a:rPr lang="en-US" sz="2900" dirty="0"/>
+              <a:t>How Music Works: Music Cognition (Honing)</a:t>
+            </a:r>
+          </a:p>
+        </p:txBody>
+      </p:sp>
+      <p:sp>
+        <p:nvSpPr>
+          <p:cNvPr id="135" name="Shape 85"/>
+          <p:cNvSpPr/>
+          <p:nvPr/>
+        </p:nvSpPr>
+        <p:spPr>
+          <a:xfrm>
+            <a:off x="27064299" y="13218039"/>
+            <a:ext cx="3276000" cy="2430000"/>
+          </a:xfrm>
+          <a:prstGeom prst="roundRect">
+            <a:avLst>
+              <a:gd name="adj" fmla="val 16667"/>
+            </a:avLst>
+          </a:prstGeom>
+          <a:ln/>
+        </p:spPr>
+        <p:style>
+          <a:lnRef idx="1">
+            <a:schemeClr val="accent1"/>
+          </a:lnRef>
+          <a:fillRef idx="3">
+            <a:schemeClr val="accent1"/>
+          </a:fillRef>
+          <a:effectRef idx="2">
+            <a:schemeClr val="accent1"/>
+          </a:effectRef>
+          <a:fontRef idx="minor">
+            <a:schemeClr val="lt1"/>
+          </a:fontRef>
+        </p:style>
+        <p:txBody>
+          <a:bodyPr wrap="square" lIns="0" tIns="0" rIns="0" bIns="0" numCol="1" anchor="ctr">
+            <a:noAutofit/>
+          </a:bodyPr>
+          <a:lstStyle/>
+          <a:p>
+            <a:pPr algn="ctr"/>
+            <a:r>
+              <a:rPr lang="en-US" sz="2900" dirty="0">
+                <a:solidFill>
+                  <a:schemeClr val="lt1"/>
+                </a:solidFill>
+                <a:latin typeface="Calibri" charset="0"/>
+                <a:cs typeface="Calibri" charset="0"/>
+              </a:rPr>
+              <a:t>[</a:t>
+            </a:r>
+            <a:r>
+              <a:rPr lang="en-US" sz="2900" dirty="0" err="1">
+                <a:solidFill>
+                  <a:schemeClr val="lt1"/>
+                </a:solidFill>
+                <a:latin typeface="Calibri" charset="0"/>
+                <a:cs typeface="Calibri" charset="0"/>
+              </a:rPr>
+              <a:t>MoL</a:t>
+            </a:r>
+            <a:r>
+              <a:rPr lang="en-US" sz="2900" dirty="0">
+                <a:solidFill>
+                  <a:schemeClr val="lt1"/>
+                </a:solidFill>
+                <a:latin typeface="Calibri" charset="0"/>
+                <a:cs typeface="Calibri" charset="0"/>
+              </a:rPr>
+              <a:t>-FNWI] Computational Semantics and Pragmatics (Fernandez)</a:t>
+            </a:r>
+          </a:p>
+        </p:txBody>
+      </p:sp>
+      <p:sp>
+        <p:nvSpPr>
+          <p:cNvPr id="196" name="Shape 196"/>
+          <p:cNvSpPr/>
+          <p:nvPr/>
+        </p:nvSpPr>
+        <p:spPr>
+          <a:xfrm>
+            <a:off x="38835849" y="13202251"/>
+            <a:ext cx="3276000" cy="2430000"/>
+          </a:xfrm>
+          <a:prstGeom prst="roundRect">
+            <a:avLst>
+              <a:gd name="adj" fmla="val 16667"/>
+            </a:avLst>
+          </a:prstGeom>
+          <a:gradFill flip="none" rotWithShape="1">
+            <a:gsLst>
+              <a:gs pos="0">
+                <a:srgbClr val="FFD1BB"/>
+              </a:gs>
+              <a:gs pos="35000">
+                <a:srgbClr val="FFDECF"/>
+              </a:gs>
+              <a:gs pos="100000">
+                <a:srgbClr val="FFF2ED"/>
+              </a:gs>
+            </a:gsLst>
+            <a:lin ang="16200000" scaled="0"/>
+          </a:gradFill>
+          <a:ln w="9525" cap="flat">
+            <a:solidFill>
+              <a:srgbClr val="F69240"/>
+            </a:solidFill>
+            <a:prstDash val="solid"/>
+            <a:bevel/>
+          </a:ln>
+          <a:effectLst>
+            <a:outerShdw blurRad="38100" dist="20000" dir="5400000" rotWithShape="0">
+              <a:srgbClr val="000000">
+                <a:alpha val="38000"/>
+              </a:srgbClr>
+            </a:outerShdw>
+          </a:effectLst>
+        </p:spPr>
+        <p:txBody>
+          <a:bodyPr wrap="square" lIns="0" tIns="0" rIns="0" bIns="0" numCol="1" anchor="ctr">
+            <a:noAutofit/>
+          </a:bodyPr>
+          <a:lstStyle/>
+          <a:p>
+            <a:pPr lvl="0" algn="ctr">
+              <a:defRPr sz="1800"/>
+            </a:pPr>
+            <a:r>
+              <a:rPr lang="en-US" sz="2900" dirty="0"/>
+              <a:t>[</a:t>
+            </a:r>
+            <a:r>
+              <a:rPr lang="en-US" sz="2900" dirty="0" err="1"/>
+              <a:t>MScAI</a:t>
+            </a:r>
+            <a:r>
+              <a:rPr lang="en-US" sz="2900" dirty="0"/>
+              <a:t>] </a:t>
+            </a:r>
+            <a:br>
+              <a:rPr lang="en-US" sz="2900" dirty="0"/>
+            </a:br>
+            <a:r>
+              <a:rPr lang="en-US" sz="2900" dirty="0"/>
+              <a:t>Statistical Methods for Natural Language Semantics</a:t>
+            </a:r>
+            <a:br>
+              <a:rPr lang="en-US" sz="2900" dirty="0"/>
+            </a:br>
+            <a:r>
+              <a:rPr lang="en-US" sz="2900" dirty="0"/>
+              <a:t>(</a:t>
+            </a:r>
+            <a:r>
+              <a:rPr lang="en-US" sz="2900" dirty="0" err="1"/>
+              <a:t>Shutova</a:t>
+            </a:r>
+            <a:r>
+              <a:rPr lang="en-US" sz="2900" dirty="0"/>
+              <a:t>)</a:t>
+            </a:r>
+          </a:p>
+        </p:txBody>
+      </p:sp>
+      <p:sp>
+        <p:nvSpPr>
+          <p:cNvPr id="199" name="Shape 199"/>
+          <p:cNvSpPr/>
+          <p:nvPr/>
+        </p:nvSpPr>
+        <p:spPr>
+          <a:xfrm>
+            <a:off x="38478950" y="10441594"/>
+            <a:ext cx="3118829" cy="2430000"/>
+          </a:xfrm>
+          <a:prstGeom prst="roundRect">
+            <a:avLst>
+              <a:gd name="adj" fmla="val 16667"/>
+            </a:avLst>
+          </a:prstGeom>
+          <a:gradFill flip="none" rotWithShape="1">
+            <a:gsLst>
+              <a:gs pos="0">
+                <a:srgbClr val="FFD1BB"/>
+              </a:gs>
+              <a:gs pos="35000">
+                <a:srgbClr val="FFDECF"/>
+              </a:gs>
+              <a:gs pos="100000">
+                <a:srgbClr val="FFF2ED"/>
+              </a:gs>
+            </a:gsLst>
+            <a:lin ang="16200000" scaled="0"/>
+          </a:gradFill>
+          <a:ln w="9525" cap="flat">
+            <a:solidFill>
+              <a:srgbClr val="F69240"/>
+            </a:solidFill>
+            <a:prstDash val="solid"/>
+            <a:bevel/>
+          </a:ln>
+          <a:effectLst>
+            <a:outerShdw blurRad="38100" dist="20000" dir="5400000" rotWithShape="0">
+              <a:srgbClr val="000000">
+                <a:alpha val="38000"/>
+              </a:srgbClr>
+            </a:outerShdw>
+          </a:effectLst>
+        </p:spPr>
+        <p:txBody>
+          <a:bodyPr wrap="square" lIns="0" tIns="0" rIns="0" bIns="0" numCol="1" anchor="ctr">
+            <a:noAutofit/>
+          </a:bodyPr>
+          <a:lstStyle/>
+          <a:p>
+            <a:pPr lvl="0" algn="ctr">
+              <a:defRPr sz="1800"/>
+            </a:pPr>
+            <a:r>
+              <a:rPr lang="en-US" sz="2900" dirty="0"/>
+              <a:t>[</a:t>
+            </a:r>
+            <a:r>
+              <a:rPr lang="en-US" sz="2900" dirty="0" err="1"/>
+              <a:t>MScAI</a:t>
+            </a:r>
+            <a:r>
+              <a:rPr lang="en-US" sz="2900" dirty="0"/>
+              <a:t>] </a:t>
+            </a:r>
+            <a:br>
+              <a:rPr lang="en-US" sz="2900" dirty="0"/>
+            </a:br>
+            <a:r>
+              <a:rPr lang="en-US" sz="2900" dirty="0"/>
+              <a:t>Natural Language Processing 2 (Sima'an)</a:t>
+            </a:r>
+          </a:p>
+        </p:txBody>
+      </p:sp>
+      <p:sp>
+        <p:nvSpPr>
+          <p:cNvPr id="204" name="Shape 127"/>
+          <p:cNvSpPr/>
+          <p:nvPr/>
+        </p:nvSpPr>
+        <p:spPr>
+          <a:xfrm>
+            <a:off x="27053493" y="10435498"/>
+            <a:ext cx="3276000" cy="2430000"/>
+          </a:xfrm>
+          <a:prstGeom prst="roundRect">
+            <a:avLst>
+              <a:gd name="adj" fmla="val 16667"/>
+            </a:avLst>
+          </a:prstGeom>
+          <a:gradFill flip="none" rotWithShape="1">
+            <a:gsLst>
+              <a:gs pos="0">
+                <a:srgbClr val="DAFEA4"/>
+              </a:gs>
+              <a:gs pos="35000">
+                <a:srgbClr val="E4FDBF"/>
+              </a:gs>
+              <a:gs pos="100000">
+                <a:srgbClr val="F5FFE6"/>
+              </a:gs>
+            </a:gsLst>
+            <a:lin ang="16200000" scaled="0"/>
+          </a:gradFill>
+          <a:ln w="9525" cap="flat">
+            <a:solidFill>
+              <a:srgbClr val="98B955"/>
+            </a:solidFill>
+            <a:prstDash val="solid"/>
+            <a:bevel/>
+          </a:ln>
+          <a:effectLst>
+            <a:outerShdw blurRad="38100" dist="20000" dir="5400000" rotWithShape="0">
+              <a:srgbClr val="000000">
+                <a:alpha val="38000"/>
+              </a:srgbClr>
+            </a:outerShdw>
+          </a:effectLst>
+        </p:spPr>
+        <p:txBody>
+          <a:bodyPr wrap="square" lIns="0" tIns="0" rIns="0" bIns="0" numCol="1" anchor="ctr">
+            <a:noAutofit/>
+          </a:bodyPr>
+          <a:lstStyle/>
+          <a:p>
+            <a:pPr lvl="0" algn="ctr">
+              <a:defRPr sz="1800"/>
+            </a:pPr>
+            <a:r>
+              <a:rPr lang="en-US" sz="2900" dirty="0"/>
+              <a:t>[</a:t>
+            </a:r>
+            <a:r>
+              <a:rPr lang="en-US" sz="2900" dirty="0" err="1"/>
+              <a:t>MScB&amp;CS</a:t>
+            </a:r>
+            <a:r>
+              <a:rPr lang="en-US" sz="2900" dirty="0"/>
+              <a:t>]  Cognition and Language Development (Schaeffer)</a:t>
+            </a:r>
+          </a:p>
+        </p:txBody>
+      </p:sp>
       <p:sp>
         <p:nvSpPr>
           <p:cNvPr id="73" name="Shape 73"/>
@@ -6511,7 +6346,7 @@
         </p:nvSpPr>
         <p:spPr>
           <a:xfrm>
-            <a:off x="38557348" y="21786852"/>
+            <a:off x="30882254" y="222549"/>
             <a:ext cx="3240000" cy="3129368"/>
           </a:xfrm>
           <a:prstGeom prst="ellipse">
@@ -6893,7 +6728,7 @@
         </p:nvSpPr>
         <p:spPr>
           <a:xfrm>
-            <a:off x="34295825" y="27173194"/>
+            <a:off x="34515371" y="27173194"/>
             <a:ext cx="3420000" cy="2430000"/>
           </a:xfrm>
           <a:prstGeom prst="roundRect">
@@ -6980,7 +6815,7 @@
         </p:nvSpPr>
         <p:spPr>
           <a:xfrm>
-            <a:off x="30522548" y="21656389"/>
+            <a:off x="30522548" y="21811674"/>
             <a:ext cx="3276000" cy="2232000"/>
           </a:xfrm>
           <a:prstGeom prst="roundRect">
@@ -7091,7 +6926,7 @@
         </p:nvSpPr>
         <p:spPr>
           <a:xfrm>
-            <a:off x="30681909" y="24410745"/>
+            <a:off x="30863186" y="24410745"/>
             <a:ext cx="3276000" cy="2430000"/>
           </a:xfrm>
           <a:prstGeom prst="roundRect">
@@ -7189,7 +7024,7 @@
         </p:nvGrpSpPr>
         <p:grpSpPr>
           <a:xfrm>
-            <a:off x="34354639" y="21535724"/>
+            <a:off x="38481335" y="24289155"/>
             <a:ext cx="3420000" cy="2579668"/>
             <a:chOff x="34965653" y="21815433"/>
             <a:chExt cx="3632244" cy="2579668"/>
@@ -7323,9 +7158,9 @@
         </p:nvGrpSpPr>
         <p:grpSpPr>
           <a:xfrm>
-            <a:off x="34295826" y="24097082"/>
+            <a:off x="34515371" y="24097082"/>
             <a:ext cx="3420000" cy="2748468"/>
-            <a:chOff x="43107253" y="30726529"/>
+            <a:chOff x="43340423" y="30726529"/>
             <a:chExt cx="3632245" cy="2748468"/>
           </a:xfrm>
         </p:grpSpPr>
@@ -7337,7 +7172,7 @@
           </p:nvSpPr>
           <p:spPr>
             <a:xfrm>
-              <a:off x="43107253" y="31044997"/>
+              <a:off x="43340423" y="31044997"/>
               <a:ext cx="3632245" cy="2430000"/>
             </a:xfrm>
             <a:prstGeom prst="roundRect">
@@ -10163,7 +9998,7 @@
         </p:nvSpPr>
         <p:spPr>
           <a:xfrm flipH="1" flipV="1">
-            <a:off x="40592646" y="6880900"/>
+            <a:off x="40592646" y="9531422"/>
             <a:ext cx="1" cy="650266"/>
           </a:xfrm>
           <a:prstGeom prst="line">
@@ -10205,7 +10040,7 @@
         </p:nvSpPr>
         <p:spPr>
           <a:xfrm>
-            <a:off x="31635218" y="19025956"/>
+            <a:off x="31635218" y="19152080"/>
             <a:ext cx="2414725" cy="2031766"/>
           </a:xfrm>
           <a:prstGeom prst="rect">
@@ -10258,7 +10093,7 @@
         </p:nvSpPr>
         <p:spPr>
           <a:xfrm>
-            <a:off x="34515371" y="18575513"/>
+            <a:off x="34515371" y="18701637"/>
             <a:ext cx="3276000" cy="2268000"/>
           </a:xfrm>
           <a:prstGeom prst="roundRect">
@@ -10397,7 +10232,7 @@
         </p:nvSpPr>
         <p:spPr>
           <a:xfrm>
-            <a:off x="34515371" y="16142825"/>
+            <a:off x="34515371" y="16268949"/>
             <a:ext cx="3276000" cy="2268000"/>
           </a:xfrm>
           <a:prstGeom prst="roundRect">
@@ -10487,7 +10322,7 @@
         </p:nvSpPr>
         <p:spPr>
           <a:xfrm>
-            <a:off x="38684807" y="18419517"/>
+            <a:off x="38621472" y="18715815"/>
             <a:ext cx="3520838" cy="2744812"/>
           </a:xfrm>
           <a:prstGeom prst="roundRect">
@@ -10863,7 +10698,7 @@
         </p:nvSpPr>
         <p:spPr>
           <a:xfrm flipH="1" flipV="1">
-            <a:off x="41822916" y="6880899"/>
+            <a:off x="41822916" y="9531421"/>
             <a:ext cx="0" cy="3340707"/>
           </a:xfrm>
           <a:prstGeom prst="line">
@@ -11068,7 +10903,7 @@
         </p:nvSpPr>
         <p:spPr>
           <a:xfrm>
-            <a:off x="30681909" y="27173194"/>
+            <a:off x="30863186" y="27173194"/>
             <a:ext cx="3276000" cy="2430000"/>
           </a:xfrm>
           <a:prstGeom prst="roundRect">
@@ -11650,6 +11485,231 @@
               </a:defRPr>
             </a:pPr>
             <a:endParaRPr/>
+          </a:p>
+        </p:txBody>
+      </p:sp>
+      <p:sp>
+        <p:nvSpPr>
+          <p:cNvPr id="172" name="Shape 48">
+            <a:extLst>
+              <a:ext uri="{FF2B5EF4-FFF2-40B4-BE49-F238E27FC236}">
+                <a16:creationId xmlns:a16="http://schemas.microsoft.com/office/drawing/2014/main" id="{445181D7-E349-0B4E-A760-76D2E0584B2C}"/>
+              </a:ext>
+            </a:extLst>
+          </p:cNvPr>
+          <p:cNvSpPr txBox="1">
+            <a:spLocks/>
+          </p:cNvSpPr>
+          <p:nvPr/>
+        </p:nvSpPr>
+        <p:spPr>
+          <a:xfrm>
+            <a:off x="27310088" y="4989153"/>
+            <a:ext cx="8288449" cy="4454201"/>
+          </a:xfrm>
+          <a:prstGeom prst="roundRect">
+            <a:avLst>
+              <a:gd name="adj" fmla="val 1358"/>
+            </a:avLst>
+          </a:prstGeom>
+          <a:ln w="76200" cap="flat" cmpd="sng" algn="ctr">
+            <a:solidFill>
+              <a:schemeClr val="dk1"/>
+            </a:solidFill>
+            <a:prstDash val="solid"/>
+            <a:miter lim="400000"/>
+          </a:ln>
+          <a:extLst>
+            <a:ext uri="{C572A759-6A51-4108-AA02-DFA0A04FC94B}">
+              <ma14:wrappingTextBoxFlag xmlns:ma14="http://schemas.microsoft.com/office/mac/drawingml/2011/main" xmlns="" val="1"/>
+            </a:ext>
+          </a:extLst>
+        </p:spPr>
+        <p:style>
+          <a:lnRef idx="2">
+            <a:schemeClr val="dk1"/>
+          </a:lnRef>
+          <a:fillRef idx="1">
+            <a:schemeClr val="lt1"/>
+          </a:fillRef>
+          <a:effectRef idx="0">
+            <a:schemeClr val="dk1"/>
+          </a:effectRef>
+          <a:fontRef idx="minor">
+            <a:schemeClr val="dk1"/>
+          </a:fontRef>
+        </p:style>
+        <p:txBody>
+          <a:bodyPr lIns="208758" tIns="208758" rIns="208758" bIns="208758" anchor="ctr">
+            <a:noAutofit/>
+          </a:bodyPr>
+          <a:lstStyle>
+            <a:lvl1pPr algn="l" defTabSz="2087574">
+              <a:defRPr sz="6000">
+                <a:solidFill>
+                  <a:schemeClr val="dk1"/>
+                </a:solidFill>
+                <a:latin typeface="Calibri" charset="0"/>
+                <a:ea typeface="Calibri" charset="0"/>
+                <a:cs typeface="Calibri" charset="0"/>
+                <a:sym typeface="Calibri"/>
+              </a:defRPr>
+            </a:lvl1pPr>
+            <a:lvl2pPr algn="ctr" defTabSz="2087574">
+              <a:defRPr sz="20200">
+                <a:solidFill>
+                  <a:schemeClr val="dk1"/>
+                </a:solidFill>
+                <a:latin typeface="+mn-lt"/>
+                <a:ea typeface="+mn-ea"/>
+                <a:cs typeface="+mn-cs"/>
+                <a:sym typeface="Calibri"/>
+              </a:defRPr>
+            </a:lvl2pPr>
+            <a:lvl3pPr algn="ctr" defTabSz="2087574">
+              <a:defRPr sz="20200">
+                <a:solidFill>
+                  <a:schemeClr val="dk1"/>
+                </a:solidFill>
+                <a:latin typeface="+mn-lt"/>
+                <a:ea typeface="+mn-ea"/>
+                <a:cs typeface="+mn-cs"/>
+                <a:sym typeface="Calibri"/>
+              </a:defRPr>
+            </a:lvl3pPr>
+            <a:lvl4pPr algn="ctr" defTabSz="2087574">
+              <a:defRPr sz="20200">
+                <a:solidFill>
+                  <a:schemeClr val="dk1"/>
+                </a:solidFill>
+                <a:latin typeface="+mn-lt"/>
+                <a:ea typeface="+mn-ea"/>
+                <a:cs typeface="+mn-cs"/>
+                <a:sym typeface="Calibri"/>
+              </a:defRPr>
+            </a:lvl4pPr>
+            <a:lvl5pPr algn="ctr" defTabSz="2087574">
+              <a:defRPr sz="20200">
+                <a:solidFill>
+                  <a:schemeClr val="dk1"/>
+                </a:solidFill>
+                <a:latin typeface="+mn-lt"/>
+                <a:ea typeface="+mn-ea"/>
+                <a:cs typeface="+mn-cs"/>
+                <a:sym typeface="Calibri"/>
+              </a:defRPr>
+            </a:lvl5pPr>
+            <a:lvl6pPr algn="ctr" defTabSz="2087574">
+              <a:defRPr sz="20200">
+                <a:solidFill>
+                  <a:schemeClr val="dk1"/>
+                </a:solidFill>
+                <a:latin typeface="+mn-lt"/>
+                <a:ea typeface="+mn-ea"/>
+                <a:cs typeface="+mn-cs"/>
+                <a:sym typeface="Calibri"/>
+              </a:defRPr>
+            </a:lvl6pPr>
+            <a:lvl7pPr algn="ctr" defTabSz="2087574">
+              <a:defRPr sz="20200">
+                <a:solidFill>
+                  <a:schemeClr val="dk1"/>
+                </a:solidFill>
+                <a:latin typeface="+mn-lt"/>
+                <a:ea typeface="+mn-ea"/>
+                <a:cs typeface="+mn-cs"/>
+                <a:sym typeface="Calibri"/>
+              </a:defRPr>
+            </a:lvl7pPr>
+            <a:lvl8pPr algn="ctr" defTabSz="2087574">
+              <a:defRPr sz="20200">
+                <a:solidFill>
+                  <a:schemeClr val="dk1"/>
+                </a:solidFill>
+                <a:latin typeface="+mn-lt"/>
+                <a:ea typeface="+mn-ea"/>
+                <a:cs typeface="+mn-cs"/>
+                <a:sym typeface="Calibri"/>
+              </a:defRPr>
+            </a:lvl8pPr>
+            <a:lvl9pPr algn="ctr" defTabSz="2087574">
+              <a:defRPr sz="20200">
+                <a:solidFill>
+                  <a:schemeClr val="dk1"/>
+                </a:solidFill>
+                <a:latin typeface="+mn-lt"/>
+                <a:ea typeface="+mn-ea"/>
+                <a:cs typeface="+mn-cs"/>
+                <a:sym typeface="Calibri"/>
+              </a:defRPr>
+            </a:lvl9pPr>
+          </a:lstStyle>
+          <a:p>
+            <a:pPr>
+              <a:defRPr sz="1800"/>
+            </a:pPr>
+            <a:r>
+              <a:rPr lang="en-US" sz="8000" dirty="0"/>
+              <a:t>Master of Logic 2018/19</a:t>
+            </a:r>
+            <a:br>
+              <a:rPr lang="en-US" sz="9100" dirty="0"/>
+            </a:br>
+            <a:r>
+              <a:rPr lang="en-US" sz="2800" dirty="0">
+                <a:solidFill>
+                  <a:sysClr val="windowText" lastClr="000000"/>
+                </a:solidFill>
+                <a:latin typeface="Calibri"/>
+                <a:ea typeface="Calibri"/>
+                <a:cs typeface="Calibri"/>
+              </a:rPr>
+              <a:t>version: 1 June 2018:</a:t>
+            </a:r>
+            <a:br>
+              <a:rPr lang="en-US" sz="2800" dirty="0">
+                <a:solidFill>
+                  <a:sysClr val="windowText" lastClr="000000"/>
+                </a:solidFill>
+                <a:latin typeface="Calibri"/>
+                <a:ea typeface="Calibri"/>
+                <a:cs typeface="Calibri"/>
+              </a:rPr>
+            </a:br>
+            <a:r>
+              <a:rPr lang="en-US" sz="2800" dirty="0">
+                <a:solidFill>
+                  <a:sysClr val="windowText" lastClr="000000"/>
+                </a:solidFill>
+                <a:latin typeface="Calibri"/>
+                <a:ea typeface="Calibri"/>
+                <a:cs typeface="Calibri"/>
+                <a:hlinkClick r:id="rId3"/>
+              </a:rPr>
+              <a:t>https://github.com/cschaffner/MoLOverviewPoster</a:t>
+            </a:r>
+            <a:br>
+              <a:rPr lang="en-US" sz="2800" dirty="0">
+                <a:solidFill>
+                  <a:sysClr val="windowText" lastClr="000000"/>
+                </a:solidFill>
+                <a:latin typeface="Calibri"/>
+                <a:ea typeface="Calibri"/>
+                <a:cs typeface="Calibri"/>
+              </a:rPr>
+            </a:br>
+            <a:r>
+              <a:rPr lang="en-US" sz="2800" dirty="0">
+                <a:solidFill>
+                  <a:sysClr val="windowText" lastClr="000000"/>
+                </a:solidFill>
+                <a:latin typeface="Calibri"/>
+                <a:ea typeface="Calibri"/>
+                <a:cs typeface="Calibri"/>
+              </a:rPr>
+              <a:t>Suggestions and comments are welcome! </a:t>
+            </a:r>
+            <a:endParaRPr lang="en-US" sz="9100" dirty="0"/>
           </a:p>
         </p:txBody>
       </p:sp>

</xml_diff>

<commit_message>
changing color of Term Rewriting Systems
</commit_message>
<xml_diff>
--- a/MoLOverviewPoster2018.pptx
+++ b/MoLOverviewPoster2018.pptx
@@ -193,7 +193,7 @@
           <a:p>
             <a:fld id="{B179243D-0E3E-4D4F-90E9-F9F1DBB34143}" type="datetimeFigureOut">
               <a:rPr lang="en-US" smtClean="0"/>
-              <a:t>5/31/18</a:t>
+              <a:t>6/2/18</a:t>
             </a:fld>
             <a:endParaRPr lang="en-US"/>
           </a:p>
@@ -2319,7 +2319,7 @@
           </a:ln>
           <a:extLst>
             <a:ext uri="{C572A759-6A51-4108-AA02-DFA0A04FC94B}">
-              <ma14:wrappingTextBoxFlag xmlns="" xmlns:ma14="http://schemas.microsoft.com/office/mac/drawingml/2011/main" val="1"/>
+              <ma14:wrappingTextBoxFlag xmlns:ma14="http://schemas.microsoft.com/office/mac/drawingml/2011/main" xmlns="" val="1"/>
             </a:ext>
           </a:extLst>
         </p:spPr>
@@ -2362,7 +2362,7 @@
           </a:ln>
           <a:extLst>
             <a:ext uri="{C572A759-6A51-4108-AA02-DFA0A04FC94B}">
-              <ma14:wrappingTextBoxFlag xmlns="" xmlns:ma14="http://schemas.microsoft.com/office/mac/drawingml/2011/main" val="1"/>
+              <ma14:wrappingTextBoxFlag xmlns:ma14="http://schemas.microsoft.com/office/mac/drawingml/2011/main" xmlns="" val="1"/>
             </a:ext>
           </a:extLst>
         </p:spPr>
@@ -3639,7 +3639,7 @@
           </a:ln>
           <a:extLst>
             <a:ext uri="{C572A759-6A51-4108-AA02-DFA0A04FC94B}">
-              <ma14:wrappingTextBoxFlag xmlns="" xmlns:ma14="http://schemas.microsoft.com/office/mac/drawingml/2011/main" val="1"/>
+              <ma14:wrappingTextBoxFlag xmlns:ma14="http://schemas.microsoft.com/office/mac/drawingml/2011/main" xmlns="" val="1"/>
             </a:ext>
           </a:extLst>
         </p:spPr>
@@ -3691,7 +3691,7 @@
           </a:ln>
           <a:extLst>
             <a:ext uri="{C572A759-6A51-4108-AA02-DFA0A04FC94B}">
-              <ma14:wrappingTextBoxFlag xmlns="" xmlns:ma14="http://schemas.microsoft.com/office/mac/drawingml/2011/main" val="1"/>
+              <ma14:wrappingTextBoxFlag xmlns:ma14="http://schemas.microsoft.com/office/mac/drawingml/2011/main" xmlns="" val="1"/>
             </a:ext>
           </a:extLst>
         </p:spPr>
@@ -3735,7 +3735,7 @@
           </a:ln>
           <a:extLst>
             <a:ext uri="{C572A759-6A51-4108-AA02-DFA0A04FC94B}">
-              <ma14:wrappingTextBoxFlag xmlns="" xmlns:ma14="http://schemas.microsoft.com/office/mac/drawingml/2011/main" val="1"/>
+              <ma14:wrappingTextBoxFlag xmlns:ma14="http://schemas.microsoft.com/office/mac/drawingml/2011/main" xmlns="" val="1"/>
             </a:ext>
           </a:extLst>
         </p:spPr>
@@ -3795,7 +3795,7 @@
           </a:ln>
           <a:extLst>
             <a:ext uri="{C572A759-6A51-4108-AA02-DFA0A04FC94B}">
-              <ma14:wrappingTextBoxFlag xmlns="" xmlns:ma14="http://schemas.microsoft.com/office/mac/drawingml/2011/main" val="1"/>
+              <ma14:wrappingTextBoxFlag xmlns:ma14="http://schemas.microsoft.com/office/mac/drawingml/2011/main" xmlns="" val="1"/>
             </a:ext>
           </a:extLst>
         </p:spPr>
@@ -4112,7 +4112,7 @@
               </a:ln>
               <a:extLst>
                 <a:ext uri="{C572A759-6A51-4108-AA02-DFA0A04FC94B}">
-                  <ma14:wrappingTextBoxFlag xmlns="" xmlns:ma14="http://schemas.microsoft.com/office/mac/drawingml/2011/main" val="1"/>
+                  <ma14:wrappingTextBoxFlag xmlns:ma14="http://schemas.microsoft.com/office/mac/drawingml/2011/main" xmlns="" val="1"/>
                 </a:ext>
               </a:extLst>
             </p:spPr>
@@ -4250,7 +4250,7 @@
           </a:ln>
           <a:extLst>
             <a:ext uri="{C572A759-6A51-4108-AA02-DFA0A04FC94B}">
-              <ma14:wrappingTextBoxFlag xmlns="" xmlns:ma14="http://schemas.microsoft.com/office/mac/drawingml/2011/main" val="1"/>
+              <ma14:wrappingTextBoxFlag xmlns:ma14="http://schemas.microsoft.com/office/mac/drawingml/2011/main" xmlns="" val="1"/>
             </a:ext>
           </a:extLst>
         </p:spPr>
@@ -4294,7 +4294,7 @@
           </a:ln>
           <a:extLst>
             <a:ext uri="{C572A759-6A51-4108-AA02-DFA0A04FC94B}">
-              <ma14:wrappingTextBoxFlag xmlns="" xmlns:ma14="http://schemas.microsoft.com/office/mac/drawingml/2011/main" val="1"/>
+              <ma14:wrappingTextBoxFlag xmlns:ma14="http://schemas.microsoft.com/office/mac/drawingml/2011/main" xmlns="" val="1"/>
             </a:ext>
           </a:extLst>
         </p:spPr>
@@ -4450,7 +4450,7 @@
             </a:ln>
             <a:extLst>
               <a:ext uri="{C572A759-6A51-4108-AA02-DFA0A04FC94B}">
-                <ma14:wrappingTextBoxFlag xmlns="" xmlns:ma14="http://schemas.microsoft.com/office/mac/drawingml/2011/main" val="1"/>
+                <ma14:wrappingTextBoxFlag xmlns:ma14="http://schemas.microsoft.com/office/mac/drawingml/2011/main" xmlns="" val="1"/>
               </a:ext>
             </a:extLst>
           </p:spPr>
@@ -4503,7 +4503,7 @@
           </a:ln>
           <a:extLst>
             <a:ext uri="{C572A759-6A51-4108-AA02-DFA0A04FC94B}">
-              <ma14:wrappingTextBoxFlag xmlns="" xmlns:ma14="http://schemas.microsoft.com/office/mac/drawingml/2011/main" val="1"/>
+              <ma14:wrappingTextBoxFlag xmlns:ma14="http://schemas.microsoft.com/office/mac/drawingml/2011/main" xmlns="" val="1"/>
             </a:ext>
           </a:extLst>
         </p:spPr>
@@ -7124,7 +7124,7 @@
             </a:ln>
             <a:extLst>
               <a:ext uri="{C572A759-6A51-4108-AA02-DFA0A04FC94B}">
-                <ma14:wrappingTextBoxFlag xmlns="" xmlns:ma14="http://schemas.microsoft.com/office/mac/drawingml/2011/main" val="1"/>
+                <ma14:wrappingTextBoxFlag xmlns:ma14="http://schemas.microsoft.com/office/mac/drawingml/2011/main" xmlns="" val="1"/>
               </a:ext>
             </a:extLst>
           </p:spPr>
@@ -7346,7 +7346,7 @@
             </a:ln>
             <a:extLst>
               <a:ext uri="{C572A759-6A51-4108-AA02-DFA0A04FC94B}">
-                <ma14:wrappingTextBoxFlag xmlns="" xmlns:ma14="http://schemas.microsoft.com/office/mac/drawingml/2011/main" val="1"/>
+                <ma14:wrappingTextBoxFlag xmlns:ma14="http://schemas.microsoft.com/office/mac/drawingml/2011/main" xmlns="" val="1"/>
               </a:ext>
             </a:extLst>
           </p:spPr>
@@ -8075,7 +8075,7 @@
             </a:ln>
             <a:extLst>
               <a:ext uri="{C572A759-6A51-4108-AA02-DFA0A04FC94B}">
-                <ma14:wrappingTextBoxFlag xmlns="" xmlns:ma14="http://schemas.microsoft.com/office/mac/drawingml/2011/main" val="1"/>
+                <ma14:wrappingTextBoxFlag xmlns:ma14="http://schemas.microsoft.com/office/mac/drawingml/2011/main" xmlns="" val="1"/>
               </a:ext>
             </a:extLst>
           </p:spPr>
@@ -8263,7 +8263,7 @@
             </a:ln>
             <a:extLst>
               <a:ext uri="{C572A759-6A51-4108-AA02-DFA0A04FC94B}">
-                <ma14:wrappingTextBoxFlag xmlns="" xmlns:ma14="http://schemas.microsoft.com/office/mac/drawingml/2011/main" val="1"/>
+                <ma14:wrappingTextBoxFlag xmlns:ma14="http://schemas.microsoft.com/office/mac/drawingml/2011/main" xmlns="" val="1"/>
               </a:ext>
             </a:extLst>
           </p:spPr>
@@ -8302,7 +8302,7 @@
           </a:ln>
           <a:extLst>
             <a:ext uri="{C572A759-6A51-4108-AA02-DFA0A04FC94B}">
-              <ma14:wrappingTextBoxFlag xmlns="" xmlns:ma14="http://schemas.microsoft.com/office/mac/drawingml/2011/main" val="1"/>
+              <ma14:wrappingTextBoxFlag xmlns:ma14="http://schemas.microsoft.com/office/mac/drawingml/2011/main" xmlns="" val="1"/>
             </a:ext>
           </a:extLst>
         </p:spPr>
@@ -8522,7 +8522,7 @@
             </a:ln>
             <a:extLst>
               <a:ext uri="{C572A759-6A51-4108-AA02-DFA0A04FC94B}">
-                <ma14:wrappingTextBoxFlag xmlns="" xmlns:ma14="http://schemas.microsoft.com/office/mac/drawingml/2011/main" val="1"/>
+                <ma14:wrappingTextBoxFlag xmlns:ma14="http://schemas.microsoft.com/office/mac/drawingml/2011/main" xmlns="" val="1"/>
               </a:ext>
             </a:extLst>
           </p:spPr>
@@ -9282,7 +9282,7 @@
             </a:ln>
             <a:extLst>
               <a:ext uri="{C572A759-6A51-4108-AA02-DFA0A04FC94B}">
-                <ma14:wrappingTextBoxFlag xmlns="" xmlns:ma14="http://schemas.microsoft.com/office/mac/drawingml/2011/main" val="1"/>
+                <ma14:wrappingTextBoxFlag xmlns:ma14="http://schemas.microsoft.com/office/mac/drawingml/2011/main" xmlns="" val="1"/>
               </a:ext>
             </a:extLst>
           </p:spPr>
@@ -9638,7 +9638,7 @@
               </a:ln>
               <a:extLst>
                 <a:ext uri="{C572A759-6A51-4108-AA02-DFA0A04FC94B}">
-                  <ma14:wrappingTextBoxFlag xmlns="" xmlns:ma14="http://schemas.microsoft.com/office/mac/drawingml/2011/main" val="1"/>
+                  <ma14:wrappingTextBoxFlag xmlns:ma14="http://schemas.microsoft.com/office/mac/drawingml/2011/main" xmlns="" val="1"/>
                 </a:ext>
               </a:extLst>
             </p:spPr>
@@ -9957,7 +9957,7 @@
           </a:ln>
           <a:extLst>
             <a:ext uri="{C572A759-6A51-4108-AA02-DFA0A04FC94B}">
-              <ma14:wrappingTextBoxFlag xmlns="" xmlns:ma14="http://schemas.microsoft.com/office/mac/drawingml/2011/main" val="1"/>
+              <ma14:wrappingTextBoxFlag xmlns:ma14="http://schemas.microsoft.com/office/mac/drawingml/2011/main" xmlns="" val="1"/>
             </a:ext>
           </a:extLst>
         </p:spPr>
@@ -10051,7 +10051,7 @@
           </a:ln>
           <a:extLst>
             <a:ext uri="{C572A759-6A51-4108-AA02-DFA0A04FC94B}">
-              <ma14:wrappingTextBoxFlag xmlns="" xmlns:ma14="http://schemas.microsoft.com/office/mac/drawingml/2011/main" val="1"/>
+              <ma14:wrappingTextBoxFlag xmlns:ma14="http://schemas.microsoft.com/office/mac/drawingml/2011/main" xmlns="" val="1"/>
             </a:ext>
           </a:extLst>
         </p:spPr>
@@ -10473,7 +10473,7 @@
           </a:ln>
           <a:extLst>
             <a:ext uri="{C572A759-6A51-4108-AA02-DFA0A04FC94B}">
-              <ma14:wrappingTextBoxFlag xmlns="" xmlns:ma14="http://schemas.microsoft.com/office/mac/drawingml/2011/main" val="1"/>
+              <ma14:wrappingTextBoxFlag xmlns:ma14="http://schemas.microsoft.com/office/mac/drawingml/2011/main" xmlns="" val="1"/>
             </a:ext>
           </a:extLst>
         </p:spPr>
@@ -10525,7 +10525,7 @@
           </a:ln>
           <a:extLst>
             <a:ext uri="{C572A759-6A51-4108-AA02-DFA0A04FC94B}">
-              <ma14:wrappingTextBoxFlag xmlns="" xmlns:ma14="http://schemas.microsoft.com/office/mac/drawingml/2011/main" val="1"/>
+              <ma14:wrappingTextBoxFlag xmlns:ma14="http://schemas.microsoft.com/office/mac/drawingml/2011/main" xmlns="" val="1"/>
             </a:ext>
           </a:extLst>
         </p:spPr>
@@ -10914,22 +10914,20 @@
           <a:gradFill flip="none" rotWithShape="1">
             <a:gsLst>
               <a:gs pos="0">
-                <a:srgbClr val="C8B2E9"/>
+                <a:srgbClr val="FFD1BB"/>
               </a:gs>
               <a:gs pos="35000">
-                <a:srgbClr val="D8C9EE"/>
+                <a:srgbClr val="FFDECF"/>
               </a:gs>
               <a:gs pos="100000">
-                <a:srgbClr val="FFD1BB"/>
+                <a:srgbClr val="FFF2ED"/>
               </a:gs>
             </a:gsLst>
-            <a:lin ang="5400000" scaled="0"/>
+            <a:lin ang="16200000" scaled="0"/>
           </a:gradFill>
           <a:ln w="9525" cap="flat">
             <a:solidFill>
-              <a:schemeClr val="accent4">
-                <a:lumMod val="75000"/>
-              </a:schemeClr>
+              <a:srgbClr val="F69240"/>
             </a:solidFill>
             <a:prstDash val="solid"/>
             <a:bevel/>
@@ -11529,7 +11527,7 @@
           </a:ln>
           <a:extLst>
             <a:ext uri="{C572A759-6A51-4108-AA02-DFA0A04FC94B}">
-              <ma14:wrappingTextBoxFlag xmlns="" xmlns:ma14="http://schemas.microsoft.com/office/mac/drawingml/2011/main" val="1"/>
+              <ma14:wrappingTextBoxFlag xmlns:ma14="http://schemas.microsoft.com/office/mac/drawingml/2011/main" xmlns="" val="1"/>
             </a:ext>
           </a:extLst>
         </p:spPr>
@@ -11672,7 +11670,7 @@
                 <a:ea typeface="Calibri"/>
                 <a:cs typeface="Calibri"/>
               </a:rPr>
-              <a:t>version: 1 June 2018:</a:t>
+              <a:t>version: 2 June 2018:</a:t>
             </a:r>
             <a:br>
               <a:rPr lang="en-US" sz="2800" dirty="0">

</xml_diff>

<commit_message>
update color of Logical Verification
</commit_message>
<xml_diff>
--- a/MoLOverviewPoster2018.pptx
+++ b/MoLOverviewPoster2018.pptx
@@ -193,7 +193,7 @@
           <a:p>
             <a:fld id="{B179243D-0E3E-4D4F-90E9-F9F1DBB34143}" type="datetimeFigureOut">
               <a:rPr lang="en-US" smtClean="0"/>
-              <a:t>6/2/18</a:t>
+              <a:t>6/14/18</a:t>
             </a:fld>
             <a:endParaRPr lang="en-US"/>
           </a:p>
@@ -2319,7 +2319,7 @@
           </a:ln>
           <a:extLst>
             <a:ext uri="{C572A759-6A51-4108-AA02-DFA0A04FC94B}">
-              <ma14:wrappingTextBoxFlag xmlns:ma14="http://schemas.microsoft.com/office/mac/drawingml/2011/main" xmlns="" val="1"/>
+              <ma14:wrappingTextBoxFlag xmlns="" xmlns:ma14="http://schemas.microsoft.com/office/mac/drawingml/2011/main" val="1"/>
             </a:ext>
           </a:extLst>
         </p:spPr>
@@ -2362,7 +2362,7 @@
           </a:ln>
           <a:extLst>
             <a:ext uri="{C572A759-6A51-4108-AA02-DFA0A04FC94B}">
-              <ma14:wrappingTextBoxFlag xmlns:ma14="http://schemas.microsoft.com/office/mac/drawingml/2011/main" xmlns="" val="1"/>
+              <ma14:wrappingTextBoxFlag xmlns="" xmlns:ma14="http://schemas.microsoft.com/office/mac/drawingml/2011/main" val="1"/>
             </a:ext>
           </a:extLst>
         </p:spPr>
@@ -3639,7 +3639,7 @@
           </a:ln>
           <a:extLst>
             <a:ext uri="{C572A759-6A51-4108-AA02-DFA0A04FC94B}">
-              <ma14:wrappingTextBoxFlag xmlns:ma14="http://schemas.microsoft.com/office/mac/drawingml/2011/main" xmlns="" val="1"/>
+              <ma14:wrappingTextBoxFlag xmlns="" xmlns:ma14="http://schemas.microsoft.com/office/mac/drawingml/2011/main" val="1"/>
             </a:ext>
           </a:extLst>
         </p:spPr>
@@ -3691,7 +3691,7 @@
           </a:ln>
           <a:extLst>
             <a:ext uri="{C572A759-6A51-4108-AA02-DFA0A04FC94B}">
-              <ma14:wrappingTextBoxFlag xmlns:ma14="http://schemas.microsoft.com/office/mac/drawingml/2011/main" xmlns="" val="1"/>
+              <ma14:wrappingTextBoxFlag xmlns="" xmlns:ma14="http://schemas.microsoft.com/office/mac/drawingml/2011/main" val="1"/>
             </a:ext>
           </a:extLst>
         </p:spPr>
@@ -3735,7 +3735,7 @@
           </a:ln>
           <a:extLst>
             <a:ext uri="{C572A759-6A51-4108-AA02-DFA0A04FC94B}">
-              <ma14:wrappingTextBoxFlag xmlns:ma14="http://schemas.microsoft.com/office/mac/drawingml/2011/main" xmlns="" val="1"/>
+              <ma14:wrappingTextBoxFlag xmlns="" xmlns:ma14="http://schemas.microsoft.com/office/mac/drawingml/2011/main" val="1"/>
             </a:ext>
           </a:extLst>
         </p:spPr>
@@ -3795,7 +3795,7 @@
           </a:ln>
           <a:extLst>
             <a:ext uri="{C572A759-6A51-4108-AA02-DFA0A04FC94B}">
-              <ma14:wrappingTextBoxFlag xmlns:ma14="http://schemas.microsoft.com/office/mac/drawingml/2011/main" xmlns="" val="1"/>
+              <ma14:wrappingTextBoxFlag xmlns="" xmlns:ma14="http://schemas.microsoft.com/office/mac/drawingml/2011/main" val="1"/>
             </a:ext>
           </a:extLst>
         </p:spPr>
@@ -4112,7 +4112,7 @@
               </a:ln>
               <a:extLst>
                 <a:ext uri="{C572A759-6A51-4108-AA02-DFA0A04FC94B}">
-                  <ma14:wrappingTextBoxFlag xmlns:ma14="http://schemas.microsoft.com/office/mac/drawingml/2011/main" xmlns="" val="1"/>
+                  <ma14:wrappingTextBoxFlag xmlns="" xmlns:ma14="http://schemas.microsoft.com/office/mac/drawingml/2011/main" val="1"/>
                 </a:ext>
               </a:extLst>
             </p:spPr>
@@ -4250,7 +4250,7 @@
           </a:ln>
           <a:extLst>
             <a:ext uri="{C572A759-6A51-4108-AA02-DFA0A04FC94B}">
-              <ma14:wrappingTextBoxFlag xmlns:ma14="http://schemas.microsoft.com/office/mac/drawingml/2011/main" xmlns="" val="1"/>
+              <ma14:wrappingTextBoxFlag xmlns="" xmlns:ma14="http://schemas.microsoft.com/office/mac/drawingml/2011/main" val="1"/>
             </a:ext>
           </a:extLst>
         </p:spPr>
@@ -4294,7 +4294,7 @@
           </a:ln>
           <a:extLst>
             <a:ext uri="{C572A759-6A51-4108-AA02-DFA0A04FC94B}">
-              <ma14:wrappingTextBoxFlag xmlns:ma14="http://schemas.microsoft.com/office/mac/drawingml/2011/main" xmlns="" val="1"/>
+              <ma14:wrappingTextBoxFlag xmlns="" xmlns:ma14="http://schemas.microsoft.com/office/mac/drawingml/2011/main" val="1"/>
             </a:ext>
           </a:extLst>
         </p:spPr>
@@ -4450,7 +4450,7 @@
             </a:ln>
             <a:extLst>
               <a:ext uri="{C572A759-6A51-4108-AA02-DFA0A04FC94B}">
-                <ma14:wrappingTextBoxFlag xmlns:ma14="http://schemas.microsoft.com/office/mac/drawingml/2011/main" xmlns="" val="1"/>
+                <ma14:wrappingTextBoxFlag xmlns="" xmlns:ma14="http://schemas.microsoft.com/office/mac/drawingml/2011/main" val="1"/>
               </a:ext>
             </a:extLst>
           </p:spPr>
@@ -4503,7 +4503,7 @@
           </a:ln>
           <a:extLst>
             <a:ext uri="{C572A759-6A51-4108-AA02-DFA0A04FC94B}">
-              <ma14:wrappingTextBoxFlag xmlns:ma14="http://schemas.microsoft.com/office/mac/drawingml/2011/main" xmlns="" val="1"/>
+              <ma14:wrappingTextBoxFlag xmlns="" xmlns:ma14="http://schemas.microsoft.com/office/mac/drawingml/2011/main" val="1"/>
             </a:ext>
           </a:extLst>
         </p:spPr>
@@ -7124,7 +7124,7 @@
             </a:ln>
             <a:extLst>
               <a:ext uri="{C572A759-6A51-4108-AA02-DFA0A04FC94B}">
-                <ma14:wrappingTextBoxFlag xmlns:ma14="http://schemas.microsoft.com/office/mac/drawingml/2011/main" xmlns="" val="1"/>
+                <ma14:wrappingTextBoxFlag xmlns="" xmlns:ma14="http://schemas.microsoft.com/office/mac/drawingml/2011/main" val="1"/>
               </a:ext>
             </a:extLst>
           </p:spPr>
@@ -7346,7 +7346,7 @@
             </a:ln>
             <a:extLst>
               <a:ext uri="{C572A759-6A51-4108-AA02-DFA0A04FC94B}">
-                <ma14:wrappingTextBoxFlag xmlns:ma14="http://schemas.microsoft.com/office/mac/drawingml/2011/main" xmlns="" val="1"/>
+                <ma14:wrappingTextBoxFlag xmlns="" xmlns:ma14="http://schemas.microsoft.com/office/mac/drawingml/2011/main" val="1"/>
               </a:ext>
             </a:extLst>
           </p:spPr>
@@ -8075,7 +8075,7 @@
             </a:ln>
             <a:extLst>
               <a:ext uri="{C572A759-6A51-4108-AA02-DFA0A04FC94B}">
-                <ma14:wrappingTextBoxFlag xmlns:ma14="http://schemas.microsoft.com/office/mac/drawingml/2011/main" xmlns="" val="1"/>
+                <ma14:wrappingTextBoxFlag xmlns="" xmlns:ma14="http://schemas.microsoft.com/office/mac/drawingml/2011/main" val="1"/>
               </a:ext>
             </a:extLst>
           </p:spPr>
@@ -8263,7 +8263,7 @@
             </a:ln>
             <a:extLst>
               <a:ext uri="{C572A759-6A51-4108-AA02-DFA0A04FC94B}">
-                <ma14:wrappingTextBoxFlag xmlns:ma14="http://schemas.microsoft.com/office/mac/drawingml/2011/main" xmlns="" val="1"/>
+                <ma14:wrappingTextBoxFlag xmlns="" xmlns:ma14="http://schemas.microsoft.com/office/mac/drawingml/2011/main" val="1"/>
               </a:ext>
             </a:extLst>
           </p:spPr>
@@ -8302,7 +8302,7 @@
           </a:ln>
           <a:extLst>
             <a:ext uri="{C572A759-6A51-4108-AA02-DFA0A04FC94B}">
-              <ma14:wrappingTextBoxFlag xmlns:ma14="http://schemas.microsoft.com/office/mac/drawingml/2011/main" xmlns="" val="1"/>
+              <ma14:wrappingTextBoxFlag xmlns="" xmlns:ma14="http://schemas.microsoft.com/office/mac/drawingml/2011/main" val="1"/>
             </a:ext>
           </a:extLst>
         </p:spPr>
@@ -8522,7 +8522,7 @@
             </a:ln>
             <a:extLst>
               <a:ext uri="{C572A759-6A51-4108-AA02-DFA0A04FC94B}">
-                <ma14:wrappingTextBoxFlag xmlns:ma14="http://schemas.microsoft.com/office/mac/drawingml/2011/main" xmlns="" val="1"/>
+                <ma14:wrappingTextBoxFlag xmlns="" xmlns:ma14="http://schemas.microsoft.com/office/mac/drawingml/2011/main" val="1"/>
               </a:ext>
             </a:extLst>
           </p:spPr>
@@ -9282,7 +9282,7 @@
             </a:ln>
             <a:extLst>
               <a:ext uri="{C572A759-6A51-4108-AA02-DFA0A04FC94B}">
-                <ma14:wrappingTextBoxFlag xmlns:ma14="http://schemas.microsoft.com/office/mac/drawingml/2011/main" xmlns="" val="1"/>
+                <ma14:wrappingTextBoxFlag xmlns="" xmlns:ma14="http://schemas.microsoft.com/office/mac/drawingml/2011/main" val="1"/>
               </a:ext>
             </a:extLst>
           </p:spPr>
@@ -9638,7 +9638,7 @@
               </a:ln>
               <a:extLst>
                 <a:ext uri="{C572A759-6A51-4108-AA02-DFA0A04FC94B}">
-                  <ma14:wrappingTextBoxFlag xmlns:ma14="http://schemas.microsoft.com/office/mac/drawingml/2011/main" xmlns="" val="1"/>
+                  <ma14:wrappingTextBoxFlag xmlns="" xmlns:ma14="http://schemas.microsoft.com/office/mac/drawingml/2011/main" val="1"/>
                 </a:ext>
               </a:extLst>
             </p:spPr>
@@ -9957,7 +9957,7 @@
           </a:ln>
           <a:extLst>
             <a:ext uri="{C572A759-6A51-4108-AA02-DFA0A04FC94B}">
-              <ma14:wrappingTextBoxFlag xmlns:ma14="http://schemas.microsoft.com/office/mac/drawingml/2011/main" xmlns="" val="1"/>
+              <ma14:wrappingTextBoxFlag xmlns="" xmlns:ma14="http://schemas.microsoft.com/office/mac/drawingml/2011/main" val="1"/>
             </a:ext>
           </a:extLst>
         </p:spPr>
@@ -10051,7 +10051,7 @@
           </a:ln>
           <a:extLst>
             <a:ext uri="{C572A759-6A51-4108-AA02-DFA0A04FC94B}">
-              <ma14:wrappingTextBoxFlag xmlns:ma14="http://schemas.microsoft.com/office/mac/drawingml/2011/main" xmlns="" val="1"/>
+              <ma14:wrappingTextBoxFlag xmlns="" xmlns:ma14="http://schemas.microsoft.com/office/mac/drawingml/2011/main" val="1"/>
             </a:ext>
           </a:extLst>
         </p:spPr>
@@ -10473,7 +10473,7 @@
           </a:ln>
           <a:extLst>
             <a:ext uri="{C572A759-6A51-4108-AA02-DFA0A04FC94B}">
-              <ma14:wrappingTextBoxFlag xmlns:ma14="http://schemas.microsoft.com/office/mac/drawingml/2011/main" xmlns="" val="1"/>
+              <ma14:wrappingTextBoxFlag xmlns="" xmlns:ma14="http://schemas.microsoft.com/office/mac/drawingml/2011/main" val="1"/>
             </a:ext>
           </a:extLst>
         </p:spPr>
@@ -10525,7 +10525,7 @@
           </a:ln>
           <a:extLst>
             <a:ext uri="{C572A759-6A51-4108-AA02-DFA0A04FC94B}">
-              <ma14:wrappingTextBoxFlag xmlns:ma14="http://schemas.microsoft.com/office/mac/drawingml/2011/main" xmlns="" val="1"/>
+              <ma14:wrappingTextBoxFlag xmlns="" xmlns:ma14="http://schemas.microsoft.com/office/mac/drawingml/2011/main" val="1"/>
             </a:ext>
           </a:extLst>
         </p:spPr>
@@ -11374,20 +11374,20 @@
           <a:gradFill flip="none" rotWithShape="1">
             <a:gsLst>
               <a:gs pos="0">
-                <a:srgbClr val="FFD1BB"/>
+                <a:srgbClr val="DAFEA4"/>
               </a:gs>
               <a:gs pos="35000">
-                <a:srgbClr val="FFDECF"/>
+                <a:srgbClr val="E4FDBF"/>
               </a:gs>
               <a:gs pos="100000">
-                <a:srgbClr val="FFF2ED"/>
+                <a:srgbClr val="F5FFE6"/>
               </a:gs>
             </a:gsLst>
             <a:lin ang="16200000" scaled="0"/>
           </a:gradFill>
           <a:ln w="9525" cap="flat">
             <a:solidFill>
-              <a:srgbClr val="F69240"/>
+              <a:srgbClr val="98B955"/>
             </a:solidFill>
             <a:prstDash val="solid"/>
             <a:bevel/>
@@ -11406,9 +11406,7 @@
           </a:bodyPr>
           <a:lstStyle/>
           <a:p>
-            <a:pPr lvl="0" algn="ctr">
-              <a:defRPr sz="1800"/>
-            </a:pPr>
+            <a:pPr algn="ctr"/>
             <a:r>
               <a:rPr lang="en-US" sz="2900" dirty="0"/>
               <a:t>[</a:t>
@@ -11433,15 +11431,7 @@
             </a:br>
             <a:r>
               <a:rPr lang="en-US" sz="2900" dirty="0"/>
-              <a:t>(</a:t>
-            </a:r>
-            <a:r>
-              <a:rPr lang="en-US" sz="3200" dirty="0"/>
-              <a:t>Blanchette</a:t>
-            </a:r>
-            <a:r>
-              <a:rPr lang="en-US" sz="2900" dirty="0"/>
-              <a:t>)</a:t>
+              <a:t>(Blanchette)</a:t>
             </a:r>
           </a:p>
         </p:txBody>
@@ -11527,7 +11517,7 @@
           </a:ln>
           <a:extLst>
             <a:ext uri="{C572A759-6A51-4108-AA02-DFA0A04FC94B}">
-              <ma14:wrappingTextBoxFlag xmlns:ma14="http://schemas.microsoft.com/office/mac/drawingml/2011/main" xmlns="" val="1"/>
+              <ma14:wrappingTextBoxFlag xmlns="" xmlns:ma14="http://schemas.microsoft.com/office/mac/drawingml/2011/main" val="1"/>
             </a:ext>
           </a:extLst>
         </p:spPr>
@@ -11670,7 +11660,7 @@
                 <a:ea typeface="Calibri"/>
                 <a:cs typeface="Calibri"/>
               </a:rPr>
-              <a:t>version: 2 June 2018:</a:t>
+              <a:t>version: 14 June 2018:</a:t>
             </a:r>
             <a:br>
               <a:rPr lang="en-US" sz="2800" dirty="0">

</xml_diff>

<commit_message>
greyed out Rationality, Cognition and Reasoning 2018
</commit_message>
<xml_diff>
--- a/MoLOverviewPoster2018.pptx
+++ b/MoLOverviewPoster2018.pptx
@@ -193,7 +193,7 @@
           <a:p>
             <a:fld id="{B179243D-0E3E-4D4F-90E9-F9F1DBB34143}" type="datetimeFigureOut">
               <a:rPr lang="en-US" smtClean="0"/>
-              <a:t>8/24/18</a:t>
+              <a:t>8/29/18</a:t>
             </a:fld>
             <a:endParaRPr lang="en-US"/>
           </a:p>
@@ -2319,7 +2319,7 @@
           </a:ln>
           <a:extLst>
             <a:ext uri="{C572A759-6A51-4108-AA02-DFA0A04FC94B}">
-              <ma14:wrappingTextBoxFlag xmlns:ma14="http://schemas.microsoft.com/office/mac/drawingml/2011/main" xmlns="" val="1"/>
+              <ma14:wrappingTextBoxFlag xmlns="" xmlns:ma14="http://schemas.microsoft.com/office/mac/drawingml/2011/main" val="1"/>
             </a:ext>
           </a:extLst>
         </p:spPr>
@@ -2362,7 +2362,7 @@
           </a:ln>
           <a:extLst>
             <a:ext uri="{C572A759-6A51-4108-AA02-DFA0A04FC94B}">
-              <ma14:wrappingTextBoxFlag xmlns:ma14="http://schemas.microsoft.com/office/mac/drawingml/2011/main" xmlns="" val="1"/>
+              <ma14:wrappingTextBoxFlag xmlns="" xmlns:ma14="http://schemas.microsoft.com/office/mac/drawingml/2011/main" val="1"/>
             </a:ext>
           </a:extLst>
         </p:spPr>
@@ -3639,7 +3639,7 @@
           </a:ln>
           <a:extLst>
             <a:ext uri="{C572A759-6A51-4108-AA02-DFA0A04FC94B}">
-              <ma14:wrappingTextBoxFlag xmlns:ma14="http://schemas.microsoft.com/office/mac/drawingml/2011/main" xmlns="" val="1"/>
+              <ma14:wrappingTextBoxFlag xmlns="" xmlns:ma14="http://schemas.microsoft.com/office/mac/drawingml/2011/main" val="1"/>
             </a:ext>
           </a:extLst>
         </p:spPr>
@@ -3691,7 +3691,7 @@
           </a:ln>
           <a:extLst>
             <a:ext uri="{C572A759-6A51-4108-AA02-DFA0A04FC94B}">
-              <ma14:wrappingTextBoxFlag xmlns:ma14="http://schemas.microsoft.com/office/mac/drawingml/2011/main" xmlns="" val="1"/>
+              <ma14:wrappingTextBoxFlag xmlns="" xmlns:ma14="http://schemas.microsoft.com/office/mac/drawingml/2011/main" val="1"/>
             </a:ext>
           </a:extLst>
         </p:spPr>
@@ -3735,7 +3735,7 @@
           </a:ln>
           <a:extLst>
             <a:ext uri="{C572A759-6A51-4108-AA02-DFA0A04FC94B}">
-              <ma14:wrappingTextBoxFlag xmlns:ma14="http://schemas.microsoft.com/office/mac/drawingml/2011/main" xmlns="" val="1"/>
+              <ma14:wrappingTextBoxFlag xmlns="" xmlns:ma14="http://schemas.microsoft.com/office/mac/drawingml/2011/main" val="1"/>
             </a:ext>
           </a:extLst>
         </p:spPr>
@@ -3795,7 +3795,7 @@
           </a:ln>
           <a:extLst>
             <a:ext uri="{C572A759-6A51-4108-AA02-DFA0A04FC94B}">
-              <ma14:wrappingTextBoxFlag xmlns:ma14="http://schemas.microsoft.com/office/mac/drawingml/2011/main" xmlns="" val="1"/>
+              <ma14:wrappingTextBoxFlag xmlns="" xmlns:ma14="http://schemas.microsoft.com/office/mac/drawingml/2011/main" val="1"/>
             </a:ext>
           </a:extLst>
         </p:spPr>
@@ -4112,7 +4112,7 @@
               </a:ln>
               <a:extLst>
                 <a:ext uri="{C572A759-6A51-4108-AA02-DFA0A04FC94B}">
-                  <ma14:wrappingTextBoxFlag xmlns:ma14="http://schemas.microsoft.com/office/mac/drawingml/2011/main" xmlns="" val="1"/>
+                  <ma14:wrappingTextBoxFlag xmlns="" xmlns:ma14="http://schemas.microsoft.com/office/mac/drawingml/2011/main" val="1"/>
                 </a:ext>
               </a:extLst>
             </p:spPr>
@@ -4250,7 +4250,7 @@
           </a:ln>
           <a:extLst>
             <a:ext uri="{C572A759-6A51-4108-AA02-DFA0A04FC94B}">
-              <ma14:wrappingTextBoxFlag xmlns:ma14="http://schemas.microsoft.com/office/mac/drawingml/2011/main" xmlns="" val="1"/>
+              <ma14:wrappingTextBoxFlag xmlns="" xmlns:ma14="http://schemas.microsoft.com/office/mac/drawingml/2011/main" val="1"/>
             </a:ext>
           </a:extLst>
         </p:spPr>
@@ -4294,7 +4294,7 @@
           </a:ln>
           <a:extLst>
             <a:ext uri="{C572A759-6A51-4108-AA02-DFA0A04FC94B}">
-              <ma14:wrappingTextBoxFlag xmlns:ma14="http://schemas.microsoft.com/office/mac/drawingml/2011/main" xmlns="" val="1"/>
+              <ma14:wrappingTextBoxFlag xmlns="" xmlns:ma14="http://schemas.microsoft.com/office/mac/drawingml/2011/main" val="1"/>
             </a:ext>
           </a:extLst>
         </p:spPr>
@@ -4450,7 +4450,7 @@
             </a:ln>
             <a:extLst>
               <a:ext uri="{C572A759-6A51-4108-AA02-DFA0A04FC94B}">
-                <ma14:wrappingTextBoxFlag xmlns:ma14="http://schemas.microsoft.com/office/mac/drawingml/2011/main" xmlns="" val="1"/>
+                <ma14:wrappingTextBoxFlag xmlns="" xmlns:ma14="http://schemas.microsoft.com/office/mac/drawingml/2011/main" val="1"/>
               </a:ext>
             </a:extLst>
           </p:spPr>
@@ -4503,7 +4503,7 @@
           </a:ln>
           <a:extLst>
             <a:ext uri="{C572A759-6A51-4108-AA02-DFA0A04FC94B}">
-              <ma14:wrappingTextBoxFlag xmlns:ma14="http://schemas.microsoft.com/office/mac/drawingml/2011/main" xmlns="" val="1"/>
+              <ma14:wrappingTextBoxFlag xmlns="" xmlns:ma14="http://schemas.microsoft.com/office/mac/drawingml/2011/main" val="1"/>
             </a:ext>
           </a:extLst>
         </p:spPr>
@@ -5608,91 +5608,132 @@
         <p:spPr>
           <a:xfrm>
             <a:off x="18562021" y="3817287"/>
-            <a:ext cx="3276000" cy="2430000"/>
+            <a:ext cx="3276000" cy="2739202"/>
           </a:xfrm>
           <a:prstGeom prst="roundRect">
             <a:avLst>
               <a:gd name="adj" fmla="val 16667"/>
             </a:avLst>
           </a:prstGeom>
-          <a:gradFill flip="none" rotWithShape="1">
-            <a:gsLst>
-              <a:gs pos="0">
-                <a:srgbClr val="3F80CE"/>
-              </a:gs>
-              <a:gs pos="100000">
-                <a:srgbClr val="A2C3FF"/>
-              </a:gs>
-            </a:gsLst>
-            <a:lin ang="16200000" scaled="0"/>
-          </a:gradFill>
-          <a:ln w="9525" cap="flat">
-            <a:solidFill>
-              <a:srgbClr val="4A7EBB"/>
-            </a:solidFill>
-            <a:prstDash val="solid"/>
-            <a:bevel/>
+          <a:ln>
+            <a:noFill/>
           </a:ln>
-          <a:effectLst>
-            <a:outerShdw blurRad="38100" dist="23000" dir="5400000" rotWithShape="0">
-              <a:srgbClr val="000000">
-                <a:alpha val="35000"/>
-              </a:srgbClr>
-            </a:outerShdw>
-          </a:effectLst>
         </p:spPr>
+        <p:style>
+          <a:lnRef idx="1">
+            <a:schemeClr val="dk1"/>
+          </a:lnRef>
+          <a:fillRef idx="2">
+            <a:schemeClr val="dk1"/>
+          </a:fillRef>
+          <a:effectRef idx="1">
+            <a:schemeClr val="dk1"/>
+          </a:effectRef>
+          <a:fontRef idx="minor">
+            <a:schemeClr val="dk1"/>
+          </a:fontRef>
+        </p:style>
         <p:txBody>
           <a:bodyPr wrap="square" lIns="0" tIns="0" rIns="0" bIns="0" numCol="1" anchor="ctr">
             <a:noAutofit/>
           </a:bodyPr>
           <a:lstStyle/>
           <a:p>
-            <a:pPr lvl="0" algn="ctr">
-              <a:defRPr sz="1800">
-                <a:solidFill>
-                  <a:srgbClr val="000000"/>
-                </a:solidFill>
-              </a:defRPr>
-            </a:pPr>
+            <a:pPr algn="ctr"/>
             <a:r>
               <a:rPr lang="en-US" sz="2900" dirty="0">
                 <a:solidFill>
-                  <a:srgbClr val="FFFFFF"/>
-                </a:solidFill>
+                  <a:schemeClr val="dk1">
+                    <a:alpha val="25000"/>
+                  </a:schemeClr>
+                </a:solidFill>
+                <a:latin typeface="Calibri" charset="0"/>
+                <a:ea typeface="+mn-ea"/>
+                <a:cs typeface="Calibri" charset="0"/>
               </a:rPr>
               <a:t>[MoL-FGW] Rationality, Cognition and Reasoning </a:t>
             </a:r>
             <a:br>
               <a:rPr lang="en-US" sz="2900" dirty="0">
                 <a:solidFill>
-                  <a:srgbClr val="FFFFFF"/>
-                </a:solidFill>
+                  <a:schemeClr val="dk1">
+                    <a:alpha val="25000"/>
+                  </a:schemeClr>
+                </a:solidFill>
+                <a:latin typeface="Calibri" charset="0"/>
+                <a:ea typeface="+mn-ea"/>
+                <a:cs typeface="Calibri" charset="0"/>
               </a:rPr>
             </a:br>
             <a:r>
               <a:rPr lang="en-US" sz="2900" dirty="0">
                 <a:solidFill>
-                  <a:srgbClr val="FFFFFF"/>
-                </a:solidFill>
+                  <a:schemeClr val="dk1">
+                    <a:alpha val="25000"/>
+                  </a:schemeClr>
+                </a:solidFill>
+                <a:latin typeface="Calibri" charset="0"/>
+                <a:ea typeface="+mn-ea"/>
+                <a:cs typeface="Calibri" charset="0"/>
               </a:rPr>
               <a:t>(van </a:t>
             </a:r>
             <a:r>
               <a:rPr lang="en-US" sz="2900" dirty="0" err="1">
                 <a:solidFill>
-                  <a:srgbClr val="FFFFFF"/>
-                </a:solidFill>
+                  <a:schemeClr val="dk1">
+                    <a:alpha val="25000"/>
+                  </a:schemeClr>
+                </a:solidFill>
+                <a:latin typeface="Calibri" charset="0"/>
+                <a:ea typeface="+mn-ea"/>
+                <a:cs typeface="Calibri" charset="0"/>
               </a:rPr>
               <a:t>Lambalgen</a:t>
             </a:r>
             <a:r>
               <a:rPr lang="en-US" sz="2900" dirty="0">
                 <a:solidFill>
-                  <a:srgbClr val="FFFFFF"/>
-                </a:solidFill>
+                  <a:schemeClr val="dk1">
+                    <a:alpha val="25000"/>
+                  </a:schemeClr>
+                </a:solidFill>
+                <a:latin typeface="Calibri" charset="0"/>
+                <a:ea typeface="+mn-ea"/>
+                <a:cs typeface="Calibri" charset="0"/>
               </a:rPr>
               <a:t>)</a:t>
             </a:r>
+            <a:br>
+              <a:rPr lang="en-US" sz="2900" dirty="0">
+                <a:solidFill>
+                  <a:schemeClr val="dk1">
+                    <a:alpha val="25000"/>
+                  </a:schemeClr>
+                </a:solidFill>
+                <a:latin typeface="Calibri" charset="0"/>
+                <a:ea typeface="+mn-ea"/>
+                <a:cs typeface="Calibri" charset="0"/>
+              </a:rPr>
+            </a:br>
+            <a:r>
+              <a:rPr lang="en-US" sz="2900" dirty="0">
+                <a:latin typeface="Calibri" charset="0"/>
+                <a:ea typeface="Calibri" charset="0"/>
+                <a:cs typeface="Calibri" charset="0"/>
+              </a:rPr>
+              <a:t>in 2019/20 only</a:t>
+            </a:r>
+            <a:endParaRPr lang="en-US" sz="2900" dirty="0">
+              <a:solidFill>
+                <a:schemeClr val="dk1">
+                  <a:alpha val="25000"/>
+                </a:schemeClr>
+              </a:solidFill>
+              <a:latin typeface="Calibri" charset="0"/>
+              <a:ea typeface="+mn-ea"/>
+              <a:cs typeface="Calibri" charset="0"/>
+            </a:endParaRPr>
           </a:p>
         </p:txBody>
       </p:sp>
@@ -7183,7 +7224,7 @@
             </a:ln>
             <a:extLst>
               <a:ext uri="{C572A759-6A51-4108-AA02-DFA0A04FC94B}">
-                <ma14:wrappingTextBoxFlag xmlns:ma14="http://schemas.microsoft.com/office/mac/drawingml/2011/main" xmlns="" val="1"/>
+                <ma14:wrappingTextBoxFlag xmlns="" xmlns:ma14="http://schemas.microsoft.com/office/mac/drawingml/2011/main" val="1"/>
               </a:ext>
             </a:extLst>
           </p:spPr>
@@ -7405,7 +7446,7 @@
             </a:ln>
             <a:extLst>
               <a:ext uri="{C572A759-6A51-4108-AA02-DFA0A04FC94B}">
-                <ma14:wrappingTextBoxFlag xmlns:ma14="http://schemas.microsoft.com/office/mac/drawingml/2011/main" xmlns="" val="1"/>
+                <ma14:wrappingTextBoxFlag xmlns="" xmlns:ma14="http://schemas.microsoft.com/office/mac/drawingml/2011/main" val="1"/>
               </a:ext>
             </a:extLst>
           </p:spPr>
@@ -8134,7 +8175,7 @@
             </a:ln>
             <a:extLst>
               <a:ext uri="{C572A759-6A51-4108-AA02-DFA0A04FC94B}">
-                <ma14:wrappingTextBoxFlag xmlns:ma14="http://schemas.microsoft.com/office/mac/drawingml/2011/main" xmlns="" val="1"/>
+                <ma14:wrappingTextBoxFlag xmlns="" xmlns:ma14="http://schemas.microsoft.com/office/mac/drawingml/2011/main" val="1"/>
               </a:ext>
             </a:extLst>
           </p:spPr>
@@ -8322,7 +8363,7 @@
             </a:ln>
             <a:extLst>
               <a:ext uri="{C572A759-6A51-4108-AA02-DFA0A04FC94B}">
-                <ma14:wrappingTextBoxFlag xmlns:ma14="http://schemas.microsoft.com/office/mac/drawingml/2011/main" xmlns="" val="1"/>
+                <ma14:wrappingTextBoxFlag xmlns="" xmlns:ma14="http://schemas.microsoft.com/office/mac/drawingml/2011/main" val="1"/>
               </a:ext>
             </a:extLst>
           </p:spPr>
@@ -8361,7 +8402,7 @@
           </a:ln>
           <a:extLst>
             <a:ext uri="{C572A759-6A51-4108-AA02-DFA0A04FC94B}">
-              <ma14:wrappingTextBoxFlag xmlns:ma14="http://schemas.microsoft.com/office/mac/drawingml/2011/main" xmlns="" val="1"/>
+              <ma14:wrappingTextBoxFlag xmlns="" xmlns:ma14="http://schemas.microsoft.com/office/mac/drawingml/2011/main" val="1"/>
             </a:ext>
           </a:extLst>
         </p:spPr>
@@ -8581,7 +8622,7 @@
             </a:ln>
             <a:extLst>
               <a:ext uri="{C572A759-6A51-4108-AA02-DFA0A04FC94B}">
-                <ma14:wrappingTextBoxFlag xmlns:ma14="http://schemas.microsoft.com/office/mac/drawingml/2011/main" xmlns="" val="1"/>
+                <ma14:wrappingTextBoxFlag xmlns="" xmlns:ma14="http://schemas.microsoft.com/office/mac/drawingml/2011/main" val="1"/>
               </a:ext>
             </a:extLst>
           </p:spPr>
@@ -9341,7 +9382,7 @@
             </a:ln>
             <a:extLst>
               <a:ext uri="{C572A759-6A51-4108-AA02-DFA0A04FC94B}">
-                <ma14:wrappingTextBoxFlag xmlns:ma14="http://schemas.microsoft.com/office/mac/drawingml/2011/main" xmlns="" val="1"/>
+                <ma14:wrappingTextBoxFlag xmlns="" xmlns:ma14="http://schemas.microsoft.com/office/mac/drawingml/2011/main" val="1"/>
               </a:ext>
             </a:extLst>
           </p:spPr>
@@ -9697,7 +9738,7 @@
               </a:ln>
               <a:extLst>
                 <a:ext uri="{C572A759-6A51-4108-AA02-DFA0A04FC94B}">
-                  <ma14:wrappingTextBoxFlag xmlns:ma14="http://schemas.microsoft.com/office/mac/drawingml/2011/main" xmlns="" val="1"/>
+                  <ma14:wrappingTextBoxFlag xmlns="" xmlns:ma14="http://schemas.microsoft.com/office/mac/drawingml/2011/main" val="1"/>
                 </a:ext>
               </a:extLst>
             </p:spPr>
@@ -10016,7 +10057,7 @@
           </a:ln>
           <a:extLst>
             <a:ext uri="{C572A759-6A51-4108-AA02-DFA0A04FC94B}">
-              <ma14:wrappingTextBoxFlag xmlns:ma14="http://schemas.microsoft.com/office/mac/drawingml/2011/main" xmlns="" val="1"/>
+              <ma14:wrappingTextBoxFlag xmlns="" xmlns:ma14="http://schemas.microsoft.com/office/mac/drawingml/2011/main" val="1"/>
             </a:ext>
           </a:extLst>
         </p:spPr>
@@ -10110,7 +10151,7 @@
           </a:ln>
           <a:extLst>
             <a:ext uri="{C572A759-6A51-4108-AA02-DFA0A04FC94B}">
-              <ma14:wrappingTextBoxFlag xmlns:ma14="http://schemas.microsoft.com/office/mac/drawingml/2011/main" xmlns="" val="1"/>
+              <ma14:wrappingTextBoxFlag xmlns="" xmlns:ma14="http://schemas.microsoft.com/office/mac/drawingml/2011/main" val="1"/>
             </a:ext>
           </a:extLst>
         </p:spPr>
@@ -10532,7 +10573,7 @@
           </a:ln>
           <a:extLst>
             <a:ext uri="{C572A759-6A51-4108-AA02-DFA0A04FC94B}">
-              <ma14:wrappingTextBoxFlag xmlns:ma14="http://schemas.microsoft.com/office/mac/drawingml/2011/main" xmlns="" val="1"/>
+              <ma14:wrappingTextBoxFlag xmlns="" xmlns:ma14="http://schemas.microsoft.com/office/mac/drawingml/2011/main" val="1"/>
             </a:ext>
           </a:extLst>
         </p:spPr>
@@ -10584,7 +10625,7 @@
           </a:ln>
           <a:extLst>
             <a:ext uri="{C572A759-6A51-4108-AA02-DFA0A04FC94B}">
-              <ma14:wrappingTextBoxFlag xmlns:ma14="http://schemas.microsoft.com/office/mac/drawingml/2011/main" xmlns="" val="1"/>
+              <ma14:wrappingTextBoxFlag xmlns="" xmlns:ma14="http://schemas.microsoft.com/office/mac/drawingml/2011/main" val="1"/>
             </a:ext>
           </a:extLst>
         </p:spPr>
@@ -11576,7 +11617,7 @@
           </a:ln>
           <a:extLst>
             <a:ext uri="{C572A759-6A51-4108-AA02-DFA0A04FC94B}">
-              <ma14:wrappingTextBoxFlag xmlns:ma14="http://schemas.microsoft.com/office/mac/drawingml/2011/main" xmlns="" val="1"/>
+              <ma14:wrappingTextBoxFlag xmlns="" xmlns:ma14="http://schemas.microsoft.com/office/mac/drawingml/2011/main" val="1"/>
             </a:ext>
           </a:extLst>
         </p:spPr>
@@ -11719,7 +11760,7 @@
                 <a:ea typeface="Calibri"/>
                 <a:cs typeface="Calibri"/>
               </a:rPr>
-              <a:t>version: </a:t>
+              <a:t>version</a:t>
             </a:r>
             <a:r>
               <a:rPr lang="en-US" sz="2800">
@@ -11730,7 +11771,7 @@
                 <a:ea typeface="Calibri"/>
                 <a:cs typeface="Calibri"/>
               </a:rPr>
-              <a:t>24 August </a:t>
+              <a:t>: 29 August </a:t>
             </a:r>
             <a:r>
               <a:rPr lang="en-US" sz="2800" dirty="0">

</xml_diff>